<commit_message>
added legend in instruction.pptx
</commit_message>
<xml_diff>
--- a/XPlanningEvaluation/data/instruction/instruction.pptx
+++ b/XPlanningEvaluation/data/instruction/instruction.pptx
@@ -3890,6 +3890,168 @@
           </a:p>
         </p:txBody>
       </p:sp>
+      <p:sp>
+        <p:nvSpPr>
+          <p:cNvPr id="3" name="TextBox 2">
+            <a:extLst>
+              <a:ext uri="{FF2B5EF4-FFF2-40B4-BE49-F238E27FC236}">
+                <a16:creationId xmlns:a16="http://schemas.microsoft.com/office/drawing/2014/main" id="{5DEAEC43-0640-AB4E-98C6-FC7443CDF770}"/>
+              </a:ext>
+            </a:extLst>
+          </p:cNvPr>
+          <p:cNvSpPr txBox="1"/>
+          <p:nvPr/>
+        </p:nvSpPr>
+        <p:spPr>
+          <a:xfrm>
+            <a:off x="3550750" y="1448558"/>
+            <a:ext cx="1266629" cy="369332"/>
+          </a:xfrm>
+          <a:prstGeom prst="rect">
+            <a:avLst/>
+          </a:prstGeom>
+          <a:noFill/>
+        </p:spPr>
+        <p:txBody>
+          <a:bodyPr wrap="none" rtlCol="0">
+            <a:spAutoFit/>
+          </a:bodyPr>
+          <a:lstStyle/>
+          <a:p>
+            <a:r>
+              <a:rPr lang="en-US" dirty="0">
+                <a:solidFill>
+                  <a:schemeClr val="accent6">
+                    <a:lumMod val="75000"/>
+                  </a:schemeClr>
+                </a:solidFill>
+              </a:rPr>
+              <a:t>Public Zone</a:t>
+            </a:r>
+          </a:p>
+        </p:txBody>
+      </p:sp>
+      <p:sp>
+        <p:nvSpPr>
+          <p:cNvPr id="12" name="TextBox 11">
+            <a:extLst>
+              <a:ext uri="{FF2B5EF4-FFF2-40B4-BE49-F238E27FC236}">
+                <a16:creationId xmlns:a16="http://schemas.microsoft.com/office/drawing/2014/main" id="{40BC0126-A564-9640-BA29-43CE3B906A09}"/>
+              </a:ext>
+            </a:extLst>
+          </p:cNvPr>
+          <p:cNvSpPr txBox="1"/>
+          <p:nvPr/>
+        </p:nvSpPr>
+        <p:spPr>
+          <a:xfrm>
+            <a:off x="3508657" y="4559300"/>
+            <a:ext cx="1351588" cy="369332"/>
+          </a:xfrm>
+          <a:prstGeom prst="rect">
+            <a:avLst/>
+          </a:prstGeom>
+          <a:noFill/>
+        </p:spPr>
+        <p:txBody>
+          <a:bodyPr wrap="none" rtlCol="0">
+            <a:spAutoFit/>
+          </a:bodyPr>
+          <a:lstStyle/>
+          <a:p>
+            <a:r>
+              <a:rPr lang="en-US" dirty="0">
+                <a:solidFill>
+                  <a:srgbClr val="C00000"/>
+                </a:solidFill>
+              </a:rPr>
+              <a:t>Private Zone</a:t>
+            </a:r>
+          </a:p>
+        </p:txBody>
+      </p:sp>
+      <p:sp>
+        <p:nvSpPr>
+          <p:cNvPr id="13" name="TextBox 12">
+            <a:extLst>
+              <a:ext uri="{FF2B5EF4-FFF2-40B4-BE49-F238E27FC236}">
+                <a16:creationId xmlns:a16="http://schemas.microsoft.com/office/drawing/2014/main" id="{862F2D74-AD86-D148-8D62-1FBBCB7F58FA}"/>
+              </a:ext>
+            </a:extLst>
+          </p:cNvPr>
+          <p:cNvSpPr txBox="1"/>
+          <p:nvPr/>
+        </p:nvSpPr>
+        <p:spPr>
+          <a:xfrm>
+            <a:off x="461916" y="1446768"/>
+            <a:ext cx="1880579" cy="369332"/>
+          </a:xfrm>
+          <a:prstGeom prst="rect">
+            <a:avLst/>
+          </a:prstGeom>
+          <a:noFill/>
+        </p:spPr>
+        <p:txBody>
+          <a:bodyPr wrap="none" rtlCol="0">
+            <a:spAutoFit/>
+          </a:bodyPr>
+          <a:lstStyle/>
+          <a:p>
+            <a:r>
+              <a:rPr lang="en-US" dirty="0">
+                <a:solidFill>
+                  <a:schemeClr val="accent4">
+                    <a:lumMod val="75000"/>
+                  </a:schemeClr>
+                </a:solidFill>
+              </a:rPr>
+              <a:t>Semi-Private Zone</a:t>
+            </a:r>
+          </a:p>
+        </p:txBody>
+      </p:sp>
+      <p:sp>
+        <p:nvSpPr>
+          <p:cNvPr id="18" name="TextBox 17">
+            <a:extLst>
+              <a:ext uri="{FF2B5EF4-FFF2-40B4-BE49-F238E27FC236}">
+                <a16:creationId xmlns:a16="http://schemas.microsoft.com/office/drawing/2014/main" id="{7D1BC639-9C82-284C-95DA-266AF36CFA83}"/>
+              </a:ext>
+            </a:extLst>
+          </p:cNvPr>
+          <p:cNvSpPr txBox="1"/>
+          <p:nvPr/>
+        </p:nvSpPr>
+        <p:spPr>
+          <a:xfrm rot="5400000">
+            <a:off x="6606687" y="2611020"/>
+            <a:ext cx="1266629" cy="369332"/>
+          </a:xfrm>
+          <a:prstGeom prst="rect">
+            <a:avLst/>
+          </a:prstGeom>
+          <a:noFill/>
+        </p:spPr>
+        <p:txBody>
+          <a:bodyPr wrap="none" rtlCol="0">
+            <a:spAutoFit/>
+          </a:bodyPr>
+          <a:lstStyle/>
+          <a:p>
+            <a:r>
+              <a:rPr lang="en-US" dirty="0">
+                <a:solidFill>
+                  <a:schemeClr val="accent6">
+                    <a:lumMod val="75000"/>
+                  </a:schemeClr>
+                </a:solidFill>
+              </a:rPr>
+              <a:t>Public Zone</a:t>
+            </a:r>
+          </a:p>
+        </p:txBody>
+      </p:sp>
     </p:spTree>
     <p:extLst>
       <p:ext uri="{BB962C8B-B14F-4D97-AF65-F5344CB8AC3E}">
@@ -5252,6 +5414,660 @@
               <a:r>
                 <a:rPr lang="en-US" sz="1600" dirty="0"/>
                 <a:t>11</a:t>
+              </a:r>
+            </a:p>
+          </p:txBody>
+        </p:sp>
+      </p:grpSp>
+      <p:grpSp>
+        <p:nvGrpSpPr>
+          <p:cNvPr id="48" name="Group 47">
+            <a:extLst>
+              <a:ext uri="{FF2B5EF4-FFF2-40B4-BE49-F238E27FC236}">
+                <a16:creationId xmlns:a16="http://schemas.microsoft.com/office/drawing/2014/main" id="{557D0B2B-7226-7C45-A98D-66310EE4AC7A}"/>
+              </a:ext>
+            </a:extLst>
+          </p:cNvPr>
+          <p:cNvGrpSpPr/>
+          <p:nvPr/>
+        </p:nvGrpSpPr>
+        <p:grpSpPr>
+          <a:xfrm>
+            <a:off x="7377469" y="1790903"/>
+            <a:ext cx="2847622" cy="646331"/>
+            <a:chOff x="7982744" y="2124109"/>
+            <a:chExt cx="2847622" cy="646331"/>
+          </a:xfrm>
+        </p:grpSpPr>
+        <p:grpSp>
+          <p:nvGrpSpPr>
+            <p:cNvPr id="35" name="Group 34">
+              <a:extLst>
+                <a:ext uri="{FF2B5EF4-FFF2-40B4-BE49-F238E27FC236}">
+                  <a16:creationId xmlns:a16="http://schemas.microsoft.com/office/drawing/2014/main" id="{BC047401-85D3-9E4B-912F-BC5333E76F2D}"/>
+                </a:ext>
+              </a:extLst>
+            </p:cNvPr>
+            <p:cNvGrpSpPr/>
+            <p:nvPr/>
+          </p:nvGrpSpPr>
+          <p:grpSpPr>
+            <a:xfrm>
+              <a:off x="7982744" y="2218674"/>
+              <a:ext cx="1258951" cy="457200"/>
+              <a:chOff x="7641950" y="1954436"/>
+              <a:chExt cx="1258951" cy="457200"/>
+            </a:xfrm>
+          </p:grpSpPr>
+          <p:pic>
+            <p:nvPicPr>
+              <p:cNvPr id="32" name="Picture 31">
+                <a:extLst>
+                  <a:ext uri="{FF2B5EF4-FFF2-40B4-BE49-F238E27FC236}">
+                    <a16:creationId xmlns:a16="http://schemas.microsoft.com/office/drawing/2014/main" id="{63210227-9AA1-0A4A-B553-A6EA2615B132}"/>
+                  </a:ext>
+                </a:extLst>
+              </p:cNvPr>
+              <p:cNvPicPr>
+                <a:picLocks noChangeAspect="1"/>
+              </p:cNvPicPr>
+              <p:nvPr/>
+            </p:nvPicPr>
+            <p:blipFill rotWithShape="1">
+              <a:blip r:embed="rId2"/>
+              <a:srcRect l="26302" t="1905" r="24095"/>
+              <a:stretch/>
+            </p:blipFill>
+            <p:spPr>
+              <a:xfrm>
+                <a:off x="7641950" y="1954436"/>
+                <a:ext cx="308249" cy="457200"/>
+              </a:xfrm>
+              <a:prstGeom prst="rect">
+                <a:avLst/>
+              </a:prstGeom>
+            </p:spPr>
+          </p:pic>
+          <p:sp>
+            <p:nvSpPr>
+              <p:cNvPr id="34" name="Oval 33">
+                <a:extLst>
+                  <a:ext uri="{FF2B5EF4-FFF2-40B4-BE49-F238E27FC236}">
+                    <a16:creationId xmlns:a16="http://schemas.microsoft.com/office/drawing/2014/main" id="{17993555-341E-5542-97E0-CA2CB1FFEB5D}"/>
+                  </a:ext>
+                </a:extLst>
+              </p:cNvPr>
+              <p:cNvSpPr>
+                <a:spLocks noChangeAspect="1"/>
+              </p:cNvSpPr>
+              <p:nvPr/>
+            </p:nvSpPr>
+            <p:spPr>
+              <a:xfrm>
+                <a:off x="8626581" y="2045876"/>
+                <a:ext cx="274320" cy="274320"/>
+              </a:xfrm>
+              <a:prstGeom prst="ellipse">
+                <a:avLst/>
+              </a:prstGeom>
+              <a:solidFill>
+                <a:srgbClr val="92D050"/>
+              </a:solidFill>
+              <a:ln w="19050">
+                <a:solidFill>
+                  <a:schemeClr val="tx1"/>
+                </a:solidFill>
+              </a:ln>
+            </p:spPr>
+            <p:style>
+              <a:lnRef idx="2">
+                <a:schemeClr val="accent1">
+                  <a:shade val="50000"/>
+                </a:schemeClr>
+              </a:lnRef>
+              <a:fillRef idx="1">
+                <a:schemeClr val="accent1"/>
+              </a:fillRef>
+              <a:effectRef idx="0">
+                <a:schemeClr val="accent1"/>
+              </a:effectRef>
+              <a:fontRef idx="minor">
+                <a:schemeClr val="lt1"/>
+              </a:fontRef>
+            </p:style>
+            <p:txBody>
+              <a:bodyPr rtlCol="0" anchor="ctr"/>
+              <a:lstStyle/>
+              <a:p>
+                <a:pPr algn="ctr"/>
+                <a:endParaRPr lang="en-US" sz="1600" dirty="0">
+                  <a:solidFill>
+                    <a:schemeClr val="tx1"/>
+                  </a:solidFill>
+                </a:endParaRPr>
+              </a:p>
+            </p:txBody>
+          </p:sp>
+          <p:cxnSp>
+            <p:nvCxnSpPr>
+              <p:cNvPr id="4" name="Straight Arrow Connector 3">
+                <a:extLst>
+                  <a:ext uri="{FF2B5EF4-FFF2-40B4-BE49-F238E27FC236}">
+                    <a16:creationId xmlns:a16="http://schemas.microsoft.com/office/drawing/2014/main" id="{9CD223E6-AF0D-5448-9292-06C8DE9423C3}"/>
+                  </a:ext>
+                </a:extLst>
+              </p:cNvPr>
+              <p:cNvCxnSpPr>
+                <a:stCxn id="32" idx="3"/>
+                <a:endCxn id="34" idx="2"/>
+              </p:cNvCxnSpPr>
+              <p:nvPr/>
+            </p:nvCxnSpPr>
+            <p:spPr>
+              <a:xfrm>
+                <a:off x="7950199" y="2183036"/>
+                <a:ext cx="676382" cy="0"/>
+              </a:xfrm>
+              <a:prstGeom prst="straightConnector1">
+                <a:avLst/>
+              </a:prstGeom>
+              <a:ln>
+                <a:solidFill>
+                  <a:schemeClr val="tx1"/>
+                </a:solidFill>
+                <a:prstDash val="dash"/>
+                <a:tailEnd type="triangle"/>
+              </a:ln>
+            </p:spPr>
+            <p:style>
+              <a:lnRef idx="1">
+                <a:schemeClr val="accent1"/>
+              </a:lnRef>
+              <a:fillRef idx="0">
+                <a:schemeClr val="accent1"/>
+              </a:fillRef>
+              <a:effectRef idx="0">
+                <a:schemeClr val="accent1"/>
+              </a:effectRef>
+              <a:fontRef idx="minor">
+                <a:schemeClr val="tx1"/>
+              </a:fontRef>
+            </p:style>
+          </p:cxnSp>
+        </p:grpSp>
+        <p:sp>
+          <p:nvSpPr>
+            <p:cNvPr id="45" name="TextBox 44">
+              <a:extLst>
+                <a:ext uri="{FF2B5EF4-FFF2-40B4-BE49-F238E27FC236}">
+                  <a16:creationId xmlns:a16="http://schemas.microsoft.com/office/drawing/2014/main" id="{3EF46F9D-61E7-3C4F-A582-350F38162ACF}"/>
+                </a:ext>
+              </a:extLst>
+            </p:cNvPr>
+            <p:cNvSpPr txBox="1"/>
+            <p:nvPr/>
+          </p:nvSpPr>
+          <p:spPr>
+            <a:xfrm>
+              <a:off x="9428572" y="2124109"/>
+              <a:ext cx="1401794" cy="646331"/>
+            </a:xfrm>
+            <a:prstGeom prst="rect">
+              <a:avLst/>
+            </a:prstGeom>
+            <a:noFill/>
+          </p:spPr>
+          <p:txBody>
+            <a:bodyPr wrap="none" rtlCol="0">
+              <a:spAutoFit/>
+            </a:bodyPr>
+            <a:lstStyle/>
+            <a:p>
+              <a:r>
+                <a:rPr lang="en-US" i="1" dirty="0"/>
+                <a:t>Not Intrusive</a:t>
+              </a:r>
+            </a:p>
+            <a:p>
+              <a:r>
+                <a:rPr lang="en-US" dirty="0"/>
+                <a:t>(Penalty = 0)</a:t>
+              </a:r>
+            </a:p>
+          </p:txBody>
+        </p:sp>
+      </p:grpSp>
+      <p:grpSp>
+        <p:nvGrpSpPr>
+          <p:cNvPr id="49" name="Group 48">
+            <a:extLst>
+              <a:ext uri="{FF2B5EF4-FFF2-40B4-BE49-F238E27FC236}">
+                <a16:creationId xmlns:a16="http://schemas.microsoft.com/office/drawing/2014/main" id="{D2C2B3A9-592B-A443-9251-34E5FD8BC9B5}"/>
+              </a:ext>
+            </a:extLst>
+          </p:cNvPr>
+          <p:cNvGrpSpPr/>
+          <p:nvPr/>
+        </p:nvGrpSpPr>
+        <p:grpSpPr>
+          <a:xfrm>
+            <a:off x="7377469" y="2667016"/>
+            <a:ext cx="3492315" cy="646331"/>
+            <a:chOff x="7988807" y="3149548"/>
+            <a:chExt cx="3492315" cy="646331"/>
+          </a:xfrm>
+        </p:grpSpPr>
+        <p:grpSp>
+          <p:nvGrpSpPr>
+            <p:cNvPr id="37" name="Group 36">
+              <a:extLst>
+                <a:ext uri="{FF2B5EF4-FFF2-40B4-BE49-F238E27FC236}">
+                  <a16:creationId xmlns:a16="http://schemas.microsoft.com/office/drawing/2014/main" id="{40764367-BDF8-D34B-9A5F-0ED238AC6A03}"/>
+                </a:ext>
+              </a:extLst>
+            </p:cNvPr>
+            <p:cNvGrpSpPr/>
+            <p:nvPr/>
+          </p:nvGrpSpPr>
+          <p:grpSpPr>
+            <a:xfrm>
+              <a:off x="7988807" y="3249198"/>
+              <a:ext cx="1252334" cy="457200"/>
+              <a:chOff x="7648567" y="1959521"/>
+              <a:chExt cx="1252334" cy="457200"/>
+            </a:xfrm>
+          </p:grpSpPr>
+          <p:pic>
+            <p:nvPicPr>
+              <p:cNvPr id="38" name="Picture 37">
+                <a:extLst>
+                  <a:ext uri="{FF2B5EF4-FFF2-40B4-BE49-F238E27FC236}">
+                    <a16:creationId xmlns:a16="http://schemas.microsoft.com/office/drawing/2014/main" id="{194598AB-46D5-6249-9948-5FFAF83D7D5E}"/>
+                  </a:ext>
+                </a:extLst>
+              </p:cNvPr>
+              <p:cNvPicPr>
+                <a:picLocks noChangeAspect="1"/>
+              </p:cNvPicPr>
+              <p:nvPr/>
+            </p:nvPicPr>
+            <p:blipFill rotWithShape="1">
+              <a:blip r:embed="rId2"/>
+              <a:srcRect l="26302" t="1905" r="24095"/>
+              <a:stretch/>
+            </p:blipFill>
+            <p:spPr>
+              <a:xfrm>
+                <a:off x="7648567" y="1959521"/>
+                <a:ext cx="308249" cy="457200"/>
+              </a:xfrm>
+              <a:prstGeom prst="rect">
+                <a:avLst/>
+              </a:prstGeom>
+            </p:spPr>
+          </p:pic>
+          <p:sp>
+            <p:nvSpPr>
+              <p:cNvPr id="39" name="Oval 38">
+                <a:extLst>
+                  <a:ext uri="{FF2B5EF4-FFF2-40B4-BE49-F238E27FC236}">
+                    <a16:creationId xmlns:a16="http://schemas.microsoft.com/office/drawing/2014/main" id="{3B478CF2-C349-5244-9632-6F7943DD7A94}"/>
+                  </a:ext>
+                </a:extLst>
+              </p:cNvPr>
+              <p:cNvSpPr>
+                <a:spLocks noChangeAspect="1"/>
+              </p:cNvSpPr>
+              <p:nvPr/>
+            </p:nvSpPr>
+            <p:spPr>
+              <a:xfrm>
+                <a:off x="8626581" y="2045876"/>
+                <a:ext cx="274320" cy="274320"/>
+              </a:xfrm>
+              <a:prstGeom prst="ellipse">
+                <a:avLst/>
+              </a:prstGeom>
+              <a:solidFill>
+                <a:srgbClr val="FFFF00"/>
+              </a:solidFill>
+              <a:ln w="19050">
+                <a:solidFill>
+                  <a:schemeClr val="tx1"/>
+                </a:solidFill>
+              </a:ln>
+            </p:spPr>
+            <p:style>
+              <a:lnRef idx="2">
+                <a:schemeClr val="accent1">
+                  <a:shade val="50000"/>
+                </a:schemeClr>
+              </a:lnRef>
+              <a:fillRef idx="1">
+                <a:schemeClr val="accent1"/>
+              </a:fillRef>
+              <a:effectRef idx="0">
+                <a:schemeClr val="accent1"/>
+              </a:effectRef>
+              <a:fontRef idx="minor">
+                <a:schemeClr val="lt1"/>
+              </a:fontRef>
+            </p:style>
+            <p:txBody>
+              <a:bodyPr rtlCol="0" anchor="ctr"/>
+              <a:lstStyle/>
+              <a:p>
+                <a:pPr algn="ctr"/>
+                <a:endParaRPr lang="en-US" sz="1600" dirty="0">
+                  <a:solidFill>
+                    <a:schemeClr val="tx1"/>
+                  </a:solidFill>
+                </a:endParaRPr>
+              </a:p>
+            </p:txBody>
+          </p:sp>
+          <p:cxnSp>
+            <p:nvCxnSpPr>
+              <p:cNvPr id="40" name="Straight Arrow Connector 39">
+                <a:extLst>
+                  <a:ext uri="{FF2B5EF4-FFF2-40B4-BE49-F238E27FC236}">
+                    <a16:creationId xmlns:a16="http://schemas.microsoft.com/office/drawing/2014/main" id="{D98924C8-DB69-F146-9140-F6043F49033E}"/>
+                  </a:ext>
+                </a:extLst>
+              </p:cNvPr>
+              <p:cNvCxnSpPr>
+                <a:stCxn id="38" idx="3"/>
+                <a:endCxn id="39" idx="2"/>
+              </p:cNvCxnSpPr>
+              <p:nvPr/>
+            </p:nvCxnSpPr>
+            <p:spPr>
+              <a:xfrm flipV="1">
+                <a:off x="7956816" y="2183036"/>
+                <a:ext cx="669765" cy="5085"/>
+              </a:xfrm>
+              <a:prstGeom prst="straightConnector1">
+                <a:avLst/>
+              </a:prstGeom>
+              <a:ln>
+                <a:solidFill>
+                  <a:schemeClr val="tx1"/>
+                </a:solidFill>
+                <a:prstDash val="dash"/>
+                <a:tailEnd type="triangle"/>
+              </a:ln>
+            </p:spPr>
+            <p:style>
+              <a:lnRef idx="1">
+                <a:schemeClr val="accent1"/>
+              </a:lnRef>
+              <a:fillRef idx="0">
+                <a:schemeClr val="accent1"/>
+              </a:fillRef>
+              <a:effectRef idx="0">
+                <a:schemeClr val="accent1"/>
+              </a:effectRef>
+              <a:fontRef idx="minor">
+                <a:schemeClr val="tx1"/>
+              </a:fontRef>
+            </p:style>
+          </p:cxnSp>
+        </p:grpSp>
+        <p:sp>
+          <p:nvSpPr>
+            <p:cNvPr id="46" name="TextBox 45">
+              <a:extLst>
+                <a:ext uri="{FF2B5EF4-FFF2-40B4-BE49-F238E27FC236}">
+                  <a16:creationId xmlns:a16="http://schemas.microsoft.com/office/drawing/2014/main" id="{55439356-B5F3-D344-939C-6530DC06E10C}"/>
+                </a:ext>
+              </a:extLst>
+            </p:cNvPr>
+            <p:cNvSpPr txBox="1"/>
+            <p:nvPr/>
+          </p:nvSpPr>
+          <p:spPr>
+            <a:xfrm>
+              <a:off x="9428572" y="3149548"/>
+              <a:ext cx="2052550" cy="646331"/>
+            </a:xfrm>
+            <a:prstGeom prst="rect">
+              <a:avLst/>
+            </a:prstGeom>
+            <a:noFill/>
+          </p:spPr>
+          <p:txBody>
+            <a:bodyPr wrap="none" rtlCol="0">
+              <a:spAutoFit/>
+            </a:bodyPr>
+            <a:lstStyle/>
+            <a:p>
+              <a:r>
+                <a:rPr lang="en-US" i="1" dirty="0"/>
+                <a:t>Somewhat Intrusive</a:t>
+              </a:r>
+            </a:p>
+            <a:p>
+              <a:r>
+                <a:rPr lang="en-US" dirty="0"/>
+                <a:t>(Penalty = 1)</a:t>
+              </a:r>
+            </a:p>
+          </p:txBody>
+        </p:sp>
+      </p:grpSp>
+      <p:grpSp>
+        <p:nvGrpSpPr>
+          <p:cNvPr id="50" name="Group 49">
+            <a:extLst>
+              <a:ext uri="{FF2B5EF4-FFF2-40B4-BE49-F238E27FC236}">
+                <a16:creationId xmlns:a16="http://schemas.microsoft.com/office/drawing/2014/main" id="{909102DE-6FEC-DE42-9F50-618DFAB270E6}"/>
+              </a:ext>
+            </a:extLst>
+          </p:cNvPr>
+          <p:cNvGrpSpPr/>
+          <p:nvPr/>
+        </p:nvGrpSpPr>
+        <p:grpSpPr>
+          <a:xfrm>
+            <a:off x="7377469" y="3513301"/>
+            <a:ext cx="2920656" cy="646331"/>
+            <a:chOff x="7982743" y="4156495"/>
+            <a:chExt cx="2920656" cy="646331"/>
+          </a:xfrm>
+        </p:grpSpPr>
+        <p:grpSp>
+          <p:nvGrpSpPr>
+            <p:cNvPr id="41" name="Group 40">
+              <a:extLst>
+                <a:ext uri="{FF2B5EF4-FFF2-40B4-BE49-F238E27FC236}">
+                  <a16:creationId xmlns:a16="http://schemas.microsoft.com/office/drawing/2014/main" id="{663F8405-4801-B743-977D-58BB35876ED6}"/>
+                </a:ext>
+              </a:extLst>
+            </p:cNvPr>
+            <p:cNvGrpSpPr/>
+            <p:nvPr/>
+          </p:nvGrpSpPr>
+          <p:grpSpPr>
+            <a:xfrm>
+              <a:off x="7982743" y="4247935"/>
+              <a:ext cx="1264987" cy="457200"/>
+              <a:chOff x="7635914" y="1954436"/>
+              <a:chExt cx="1264987" cy="457200"/>
+            </a:xfrm>
+          </p:grpSpPr>
+          <p:pic>
+            <p:nvPicPr>
+              <p:cNvPr id="42" name="Picture 41">
+                <a:extLst>
+                  <a:ext uri="{FF2B5EF4-FFF2-40B4-BE49-F238E27FC236}">
+                    <a16:creationId xmlns:a16="http://schemas.microsoft.com/office/drawing/2014/main" id="{CBAEEF48-EA22-5F46-A552-C67D3D90E7FA}"/>
+                  </a:ext>
+                </a:extLst>
+              </p:cNvPr>
+              <p:cNvPicPr>
+                <a:picLocks noChangeAspect="1"/>
+              </p:cNvPicPr>
+              <p:nvPr/>
+            </p:nvPicPr>
+            <p:blipFill rotWithShape="1">
+              <a:blip r:embed="rId2"/>
+              <a:srcRect l="26302" t="1905" r="24095"/>
+              <a:stretch/>
+            </p:blipFill>
+            <p:spPr>
+              <a:xfrm>
+                <a:off x="7635914" y="1954436"/>
+                <a:ext cx="308249" cy="457200"/>
+              </a:xfrm>
+              <a:prstGeom prst="rect">
+                <a:avLst/>
+              </a:prstGeom>
+            </p:spPr>
+          </p:pic>
+          <p:sp>
+            <p:nvSpPr>
+              <p:cNvPr id="43" name="Oval 42">
+                <a:extLst>
+                  <a:ext uri="{FF2B5EF4-FFF2-40B4-BE49-F238E27FC236}">
+                    <a16:creationId xmlns:a16="http://schemas.microsoft.com/office/drawing/2014/main" id="{F24AAB30-2332-7F41-AD61-BD6E88673063}"/>
+                  </a:ext>
+                </a:extLst>
+              </p:cNvPr>
+              <p:cNvSpPr>
+                <a:spLocks noChangeAspect="1"/>
+              </p:cNvSpPr>
+              <p:nvPr/>
+            </p:nvSpPr>
+            <p:spPr>
+              <a:xfrm>
+                <a:off x="8626581" y="2045876"/>
+                <a:ext cx="274320" cy="274320"/>
+              </a:xfrm>
+              <a:prstGeom prst="ellipse">
+                <a:avLst/>
+              </a:prstGeom>
+              <a:solidFill>
+                <a:srgbClr val="FF0000"/>
+              </a:solidFill>
+              <a:ln w="19050">
+                <a:solidFill>
+                  <a:schemeClr val="tx1"/>
+                </a:solidFill>
+              </a:ln>
+            </p:spPr>
+            <p:style>
+              <a:lnRef idx="2">
+                <a:schemeClr val="accent1">
+                  <a:shade val="50000"/>
+                </a:schemeClr>
+              </a:lnRef>
+              <a:fillRef idx="1">
+                <a:schemeClr val="accent1"/>
+              </a:fillRef>
+              <a:effectRef idx="0">
+                <a:schemeClr val="accent1"/>
+              </a:effectRef>
+              <a:fontRef idx="minor">
+                <a:schemeClr val="lt1"/>
+              </a:fontRef>
+            </p:style>
+            <p:txBody>
+              <a:bodyPr rtlCol="0" anchor="ctr"/>
+              <a:lstStyle/>
+              <a:p>
+                <a:pPr algn="ctr"/>
+                <a:endParaRPr lang="en-US" sz="1600" dirty="0">
+                  <a:solidFill>
+                    <a:schemeClr val="tx1"/>
+                  </a:solidFill>
+                </a:endParaRPr>
+              </a:p>
+            </p:txBody>
+          </p:sp>
+          <p:cxnSp>
+            <p:nvCxnSpPr>
+              <p:cNvPr id="44" name="Straight Arrow Connector 43">
+                <a:extLst>
+                  <a:ext uri="{FF2B5EF4-FFF2-40B4-BE49-F238E27FC236}">
+                    <a16:creationId xmlns:a16="http://schemas.microsoft.com/office/drawing/2014/main" id="{607831A4-E09D-234F-ADA9-40EE543EC48C}"/>
+                  </a:ext>
+                </a:extLst>
+              </p:cNvPr>
+              <p:cNvCxnSpPr>
+                <a:stCxn id="42" idx="3"/>
+                <a:endCxn id="43" idx="2"/>
+              </p:cNvCxnSpPr>
+              <p:nvPr/>
+            </p:nvCxnSpPr>
+            <p:spPr>
+              <a:xfrm>
+                <a:off x="7944163" y="2183036"/>
+                <a:ext cx="682418" cy="0"/>
+              </a:xfrm>
+              <a:prstGeom prst="straightConnector1">
+                <a:avLst/>
+              </a:prstGeom>
+              <a:ln>
+                <a:solidFill>
+                  <a:schemeClr val="tx1"/>
+                </a:solidFill>
+                <a:prstDash val="dash"/>
+                <a:tailEnd type="triangle"/>
+              </a:ln>
+            </p:spPr>
+            <p:style>
+              <a:lnRef idx="1">
+                <a:schemeClr val="accent1"/>
+              </a:lnRef>
+              <a:fillRef idx="0">
+                <a:schemeClr val="accent1"/>
+              </a:fillRef>
+              <a:effectRef idx="0">
+                <a:schemeClr val="accent1"/>
+              </a:effectRef>
+              <a:fontRef idx="minor">
+                <a:schemeClr val="tx1"/>
+              </a:fontRef>
+            </p:style>
+          </p:cxnSp>
+        </p:grpSp>
+        <p:sp>
+          <p:nvSpPr>
+            <p:cNvPr id="47" name="TextBox 46">
+              <a:extLst>
+                <a:ext uri="{FF2B5EF4-FFF2-40B4-BE49-F238E27FC236}">
+                  <a16:creationId xmlns:a16="http://schemas.microsoft.com/office/drawing/2014/main" id="{D50B0B8D-5DBB-B64E-B0B4-01AFE979ECA7}"/>
+                </a:ext>
+              </a:extLst>
+            </p:cNvPr>
+            <p:cNvSpPr txBox="1"/>
+            <p:nvPr/>
+          </p:nvSpPr>
+          <p:spPr>
+            <a:xfrm>
+              <a:off x="9428572" y="4156495"/>
+              <a:ext cx="1474827" cy="646331"/>
+            </a:xfrm>
+            <a:prstGeom prst="rect">
+              <a:avLst/>
+            </a:prstGeom>
+            <a:noFill/>
+          </p:spPr>
+          <p:txBody>
+            <a:bodyPr wrap="none" rtlCol="0">
+              <a:spAutoFit/>
+            </a:bodyPr>
+            <a:lstStyle/>
+            <a:p>
+              <a:r>
+                <a:rPr lang="en-US" i="1" dirty="0"/>
+                <a:t>Very Intrusive</a:t>
+              </a:r>
+            </a:p>
+            <a:p>
+              <a:r>
+                <a:rPr lang="en-US" dirty="0"/>
+                <a:t>(Penalty = 3)</a:t>
               </a:r>
             </a:p>
           </p:txBody>
@@ -17699,6 +18515,168 @@
           </a:p>
         </p:txBody>
       </p:sp>
+      <p:sp>
+        <p:nvSpPr>
+          <p:cNvPr id="3" name="TextBox 2">
+            <a:extLst>
+              <a:ext uri="{FF2B5EF4-FFF2-40B4-BE49-F238E27FC236}">
+                <a16:creationId xmlns:a16="http://schemas.microsoft.com/office/drawing/2014/main" id="{4F26FB3B-0772-AC4D-8C11-065C2267BA0A}"/>
+              </a:ext>
+            </a:extLst>
+          </p:cNvPr>
+          <p:cNvSpPr txBox="1"/>
+          <p:nvPr/>
+        </p:nvSpPr>
+        <p:spPr>
+          <a:xfrm>
+            <a:off x="3690412" y="1202415"/>
+            <a:ext cx="1668149" cy="369332"/>
+          </a:xfrm>
+          <a:prstGeom prst="rect">
+            <a:avLst/>
+          </a:prstGeom>
+          <a:noFill/>
+        </p:spPr>
+        <p:txBody>
+          <a:bodyPr wrap="none" rtlCol="0">
+            <a:spAutoFit/>
+          </a:bodyPr>
+          <a:lstStyle/>
+          <a:p>
+            <a:r>
+              <a:rPr lang="en-US" dirty="0"/>
+              <a:t>Sparse Obstacle</a:t>
+            </a:r>
+          </a:p>
+        </p:txBody>
+      </p:sp>
+      <p:sp>
+        <p:nvSpPr>
+          <p:cNvPr id="4" name="TextBox 3">
+            <a:extLst>
+              <a:ext uri="{FF2B5EF4-FFF2-40B4-BE49-F238E27FC236}">
+                <a16:creationId xmlns:a16="http://schemas.microsoft.com/office/drawing/2014/main" id="{3DE68D51-8360-364F-9F24-7FB1D8E7DC90}"/>
+              </a:ext>
+            </a:extLst>
+          </p:cNvPr>
+          <p:cNvSpPr txBox="1"/>
+          <p:nvPr/>
+        </p:nvSpPr>
+        <p:spPr>
+          <a:xfrm>
+            <a:off x="3324652" y="4774133"/>
+            <a:ext cx="1633652" cy="369332"/>
+          </a:xfrm>
+          <a:prstGeom prst="rect">
+            <a:avLst/>
+          </a:prstGeom>
+          <a:noFill/>
+        </p:spPr>
+        <p:txBody>
+          <a:bodyPr wrap="none" rtlCol="0">
+            <a:spAutoFit/>
+          </a:bodyPr>
+          <a:lstStyle/>
+          <a:p>
+            <a:r>
+              <a:rPr lang="en-US" dirty="0"/>
+              <a:t>Dense Obstacle</a:t>
+            </a:r>
+          </a:p>
+        </p:txBody>
+      </p:sp>
+      <p:cxnSp>
+        <p:nvCxnSpPr>
+          <p:cNvPr id="6" name="Curved Connector 5">
+            <a:extLst>
+              <a:ext uri="{FF2B5EF4-FFF2-40B4-BE49-F238E27FC236}">
+                <a16:creationId xmlns:a16="http://schemas.microsoft.com/office/drawing/2014/main" id="{2B4ACC8F-0356-1A44-9D95-F92CBCE7BB7E}"/>
+              </a:ext>
+            </a:extLst>
+          </p:cNvPr>
+          <p:cNvCxnSpPr>
+            <a:cxnSpLocks/>
+            <a:stCxn id="3" idx="2"/>
+          </p:cNvCxnSpPr>
+          <p:nvPr/>
+        </p:nvCxnSpPr>
+        <p:spPr>
+          <a:xfrm rot="16200000" flipH="1">
+            <a:off x="4398676" y="1697557"/>
+            <a:ext cx="644892" cy="393271"/>
+          </a:xfrm>
+          <a:prstGeom prst="curvedConnector3">
+            <a:avLst>
+              <a:gd name="adj1" fmla="val 50000"/>
+            </a:avLst>
+          </a:prstGeom>
+          <a:ln w="38100">
+            <a:solidFill>
+              <a:srgbClr val="FF0000"/>
+            </a:solidFill>
+            <a:tailEnd type="triangle"/>
+          </a:ln>
+        </p:spPr>
+        <p:style>
+          <a:lnRef idx="1">
+            <a:schemeClr val="accent1"/>
+          </a:lnRef>
+          <a:fillRef idx="0">
+            <a:schemeClr val="accent1"/>
+          </a:fillRef>
+          <a:effectRef idx="0">
+            <a:schemeClr val="accent1"/>
+          </a:effectRef>
+          <a:fontRef idx="minor">
+            <a:schemeClr val="tx1"/>
+          </a:fontRef>
+        </p:style>
+      </p:cxnSp>
+      <p:cxnSp>
+        <p:nvCxnSpPr>
+          <p:cNvPr id="18" name="Curved Connector 17">
+            <a:extLst>
+              <a:ext uri="{FF2B5EF4-FFF2-40B4-BE49-F238E27FC236}">
+                <a16:creationId xmlns:a16="http://schemas.microsoft.com/office/drawing/2014/main" id="{772AEF88-3F1A-7746-AF02-8593E52353B8}"/>
+              </a:ext>
+            </a:extLst>
+          </p:cNvPr>
+          <p:cNvCxnSpPr>
+            <a:cxnSpLocks/>
+            <a:stCxn id="4" idx="0"/>
+          </p:cNvCxnSpPr>
+          <p:nvPr/>
+        </p:nvCxnSpPr>
+        <p:spPr>
+          <a:xfrm rot="16200000" flipV="1">
+            <a:off x="3378684" y="4011338"/>
+            <a:ext cx="898681" cy="626909"/>
+          </a:xfrm>
+          <a:prstGeom prst="curvedConnector3">
+            <a:avLst/>
+          </a:prstGeom>
+          <a:ln w="38100">
+            <a:solidFill>
+              <a:srgbClr val="FF0000"/>
+            </a:solidFill>
+            <a:tailEnd type="triangle"/>
+          </a:ln>
+        </p:spPr>
+        <p:style>
+          <a:lnRef idx="1">
+            <a:schemeClr val="accent1"/>
+          </a:lnRef>
+          <a:fillRef idx="0">
+            <a:schemeClr val="accent1"/>
+          </a:fillRef>
+          <a:effectRef idx="0">
+            <a:schemeClr val="accent1"/>
+          </a:effectRef>
+          <a:fontRef idx="minor">
+            <a:schemeClr val="tx1"/>
+          </a:fontRef>
+        </p:style>
+      </p:cxnSp>
     </p:spTree>
     <p:extLst>
       <p:ext uri="{BB962C8B-B14F-4D97-AF65-F5344CB8AC3E}">
@@ -19114,6 +20092,856 @@
           </a:p>
         </p:txBody>
       </p:sp>
+      <p:grpSp>
+        <p:nvGrpSpPr>
+          <p:cNvPr id="5" name="Group 4">
+            <a:extLst>
+              <a:ext uri="{FF2B5EF4-FFF2-40B4-BE49-F238E27FC236}">
+                <a16:creationId xmlns:a16="http://schemas.microsoft.com/office/drawing/2014/main" id="{858C1DA1-7323-314D-9FFD-DBE4450AAEB4}"/>
+              </a:ext>
+            </a:extLst>
+          </p:cNvPr>
+          <p:cNvGrpSpPr/>
+          <p:nvPr/>
+        </p:nvGrpSpPr>
+        <p:grpSpPr>
+          <a:xfrm>
+            <a:off x="7274720" y="2252568"/>
+            <a:ext cx="2566106" cy="369332"/>
+            <a:chOff x="7514448" y="2233629"/>
+            <a:chExt cx="2566106" cy="369332"/>
+          </a:xfrm>
+        </p:grpSpPr>
+        <p:sp>
+          <p:nvSpPr>
+            <p:cNvPr id="2" name="TextBox 1">
+              <a:extLst>
+                <a:ext uri="{FF2B5EF4-FFF2-40B4-BE49-F238E27FC236}">
+                  <a16:creationId xmlns:a16="http://schemas.microsoft.com/office/drawing/2014/main" id="{932BCCB3-439E-EA4B-8BA4-B5B16FC3E413}"/>
+                </a:ext>
+              </a:extLst>
+            </p:cNvPr>
+            <p:cNvSpPr txBox="1"/>
+            <p:nvPr/>
+          </p:nvSpPr>
+          <p:spPr>
+            <a:xfrm>
+              <a:off x="7514448" y="2233629"/>
+              <a:ext cx="2143498" cy="369332"/>
+            </a:xfrm>
+            <a:prstGeom prst="rect">
+              <a:avLst/>
+            </a:prstGeom>
+            <a:noFill/>
+          </p:spPr>
+          <p:txBody>
+            <a:bodyPr wrap="square" rtlCol="0">
+              <a:spAutoFit/>
+            </a:bodyPr>
+            <a:lstStyle/>
+            <a:p>
+              <a:r>
+                <a:rPr lang="en-US" dirty="0"/>
+                <a:t>SO = Sparse Obstacle</a:t>
+              </a:r>
+            </a:p>
+          </p:txBody>
+        </p:sp>
+        <p:grpSp>
+          <p:nvGrpSpPr>
+            <p:cNvPr id="33" name="Group 32">
+              <a:extLst>
+                <a:ext uri="{FF2B5EF4-FFF2-40B4-BE49-F238E27FC236}">
+                  <a16:creationId xmlns:a16="http://schemas.microsoft.com/office/drawing/2014/main" id="{5295A4E3-992A-B846-B751-FDB38F28F32D}"/>
+                </a:ext>
+              </a:extLst>
+            </p:cNvPr>
+            <p:cNvGrpSpPr/>
+            <p:nvPr/>
+          </p:nvGrpSpPr>
+          <p:grpSpPr>
+            <a:xfrm>
+              <a:off x="9714794" y="2270775"/>
+              <a:ext cx="365760" cy="295041"/>
+              <a:chOff x="7803055" y="2574583"/>
+              <a:chExt cx="365760" cy="295041"/>
+            </a:xfrm>
+          </p:grpSpPr>
+          <p:sp>
+            <p:nvSpPr>
+              <p:cNvPr id="34" name="Cube 33">
+                <a:extLst>
+                  <a:ext uri="{FF2B5EF4-FFF2-40B4-BE49-F238E27FC236}">
+                    <a16:creationId xmlns:a16="http://schemas.microsoft.com/office/drawing/2014/main" id="{5A672916-C506-3344-882D-9E52BEE27CE9}"/>
+                  </a:ext>
+                </a:extLst>
+              </p:cNvPr>
+              <p:cNvSpPr>
+                <a:spLocks noChangeAspect="1"/>
+              </p:cNvSpPr>
+              <p:nvPr/>
+            </p:nvSpPr>
+            <p:spPr>
+              <a:xfrm>
+                <a:off x="7803055" y="2686744"/>
+                <a:ext cx="182880" cy="182880"/>
+              </a:xfrm>
+              <a:prstGeom prst="cube">
+                <a:avLst/>
+              </a:prstGeom>
+              <a:solidFill>
+                <a:schemeClr val="accent4">
+                  <a:lumMod val="75000"/>
+                </a:schemeClr>
+              </a:solidFill>
+              <a:ln>
+                <a:solidFill>
+                  <a:schemeClr val="tx1"/>
+                </a:solidFill>
+              </a:ln>
+            </p:spPr>
+            <p:style>
+              <a:lnRef idx="2">
+                <a:schemeClr val="accent1">
+                  <a:shade val="50000"/>
+                </a:schemeClr>
+              </a:lnRef>
+              <a:fillRef idx="1">
+                <a:schemeClr val="accent1"/>
+              </a:fillRef>
+              <a:effectRef idx="0">
+                <a:schemeClr val="accent1"/>
+              </a:effectRef>
+              <a:fontRef idx="minor">
+                <a:schemeClr val="lt1"/>
+              </a:fontRef>
+            </p:style>
+            <p:txBody>
+              <a:bodyPr rtlCol="0" anchor="ctr"/>
+              <a:lstStyle/>
+              <a:p>
+                <a:pPr algn="ctr"/>
+                <a:endParaRPr lang="en-US"/>
+              </a:p>
+            </p:txBody>
+          </p:sp>
+          <p:sp>
+            <p:nvSpPr>
+              <p:cNvPr id="35" name="Cube 34">
+                <a:extLst>
+                  <a:ext uri="{FF2B5EF4-FFF2-40B4-BE49-F238E27FC236}">
+                    <a16:creationId xmlns:a16="http://schemas.microsoft.com/office/drawing/2014/main" id="{9100D794-0B89-3244-87D0-F4F55D17059D}"/>
+                  </a:ext>
+                </a:extLst>
+              </p:cNvPr>
+              <p:cNvSpPr>
+                <a:spLocks noChangeAspect="1"/>
+              </p:cNvSpPr>
+              <p:nvPr/>
+            </p:nvSpPr>
+            <p:spPr>
+              <a:xfrm>
+                <a:off x="7985935" y="2686744"/>
+                <a:ext cx="182880" cy="182880"/>
+              </a:xfrm>
+              <a:prstGeom prst="cube">
+                <a:avLst/>
+              </a:prstGeom>
+              <a:solidFill>
+                <a:schemeClr val="accent4">
+                  <a:lumMod val="75000"/>
+                </a:schemeClr>
+              </a:solidFill>
+              <a:ln>
+                <a:solidFill>
+                  <a:schemeClr val="tx1"/>
+                </a:solidFill>
+              </a:ln>
+            </p:spPr>
+            <p:style>
+              <a:lnRef idx="2">
+                <a:schemeClr val="accent1">
+                  <a:shade val="50000"/>
+                </a:schemeClr>
+              </a:lnRef>
+              <a:fillRef idx="1">
+                <a:schemeClr val="accent1"/>
+              </a:fillRef>
+              <a:effectRef idx="0">
+                <a:schemeClr val="accent1"/>
+              </a:effectRef>
+              <a:fontRef idx="minor">
+                <a:schemeClr val="lt1"/>
+              </a:fontRef>
+            </p:style>
+            <p:txBody>
+              <a:bodyPr rtlCol="0" anchor="ctr"/>
+              <a:lstStyle/>
+              <a:p>
+                <a:pPr algn="ctr"/>
+                <a:endParaRPr lang="en-US"/>
+              </a:p>
+            </p:txBody>
+          </p:sp>
+          <p:sp>
+            <p:nvSpPr>
+              <p:cNvPr id="60" name="Cube 59">
+                <a:extLst>
+                  <a:ext uri="{FF2B5EF4-FFF2-40B4-BE49-F238E27FC236}">
+                    <a16:creationId xmlns:a16="http://schemas.microsoft.com/office/drawing/2014/main" id="{F141884D-CB3C-6E41-BA82-78C0F19DB70B}"/>
+                  </a:ext>
+                </a:extLst>
+              </p:cNvPr>
+              <p:cNvSpPr>
+                <a:spLocks noChangeAspect="1"/>
+              </p:cNvSpPr>
+              <p:nvPr/>
+            </p:nvSpPr>
+            <p:spPr>
+              <a:xfrm>
+                <a:off x="7803055" y="2574583"/>
+                <a:ext cx="182880" cy="182880"/>
+              </a:xfrm>
+              <a:prstGeom prst="cube">
+                <a:avLst/>
+              </a:prstGeom>
+              <a:solidFill>
+                <a:schemeClr val="accent4">
+                  <a:lumMod val="75000"/>
+                </a:schemeClr>
+              </a:solidFill>
+              <a:ln>
+                <a:solidFill>
+                  <a:schemeClr val="tx1"/>
+                </a:solidFill>
+              </a:ln>
+            </p:spPr>
+            <p:style>
+              <a:lnRef idx="2">
+                <a:schemeClr val="accent1">
+                  <a:shade val="50000"/>
+                </a:schemeClr>
+              </a:lnRef>
+              <a:fillRef idx="1">
+                <a:schemeClr val="accent1"/>
+              </a:fillRef>
+              <a:effectRef idx="0">
+                <a:schemeClr val="accent1"/>
+              </a:effectRef>
+              <a:fontRef idx="minor">
+                <a:schemeClr val="lt1"/>
+              </a:fontRef>
+            </p:style>
+            <p:txBody>
+              <a:bodyPr rtlCol="0" anchor="ctr"/>
+              <a:lstStyle/>
+              <a:p>
+                <a:pPr algn="ctr"/>
+                <a:endParaRPr lang="en-US"/>
+              </a:p>
+            </p:txBody>
+          </p:sp>
+          <p:sp>
+            <p:nvSpPr>
+              <p:cNvPr id="61" name="Cube 60">
+                <a:extLst>
+                  <a:ext uri="{FF2B5EF4-FFF2-40B4-BE49-F238E27FC236}">
+                    <a16:creationId xmlns:a16="http://schemas.microsoft.com/office/drawing/2014/main" id="{8644481D-7725-5D4D-B4FF-9E686837A8C6}"/>
+                  </a:ext>
+                </a:extLst>
+              </p:cNvPr>
+              <p:cNvSpPr>
+                <a:spLocks noChangeAspect="1"/>
+              </p:cNvSpPr>
+              <p:nvPr/>
+            </p:nvSpPr>
+            <p:spPr>
+              <a:xfrm>
+                <a:off x="7985935" y="2574583"/>
+                <a:ext cx="182880" cy="182880"/>
+              </a:xfrm>
+              <a:prstGeom prst="cube">
+                <a:avLst/>
+              </a:prstGeom>
+              <a:solidFill>
+                <a:schemeClr val="accent4">
+                  <a:lumMod val="75000"/>
+                </a:schemeClr>
+              </a:solidFill>
+              <a:ln>
+                <a:solidFill>
+                  <a:schemeClr val="tx1"/>
+                </a:solidFill>
+              </a:ln>
+            </p:spPr>
+            <p:style>
+              <a:lnRef idx="2">
+                <a:schemeClr val="accent1">
+                  <a:shade val="50000"/>
+                </a:schemeClr>
+              </a:lnRef>
+              <a:fillRef idx="1">
+                <a:schemeClr val="accent1"/>
+              </a:fillRef>
+              <a:effectRef idx="0">
+                <a:schemeClr val="accent1"/>
+              </a:effectRef>
+              <a:fontRef idx="minor">
+                <a:schemeClr val="lt1"/>
+              </a:fontRef>
+            </p:style>
+            <p:txBody>
+              <a:bodyPr rtlCol="0" anchor="ctr"/>
+              <a:lstStyle/>
+              <a:p>
+                <a:pPr algn="ctr"/>
+                <a:endParaRPr lang="en-US"/>
+              </a:p>
+            </p:txBody>
+          </p:sp>
+        </p:grpSp>
+      </p:grpSp>
+      <p:grpSp>
+        <p:nvGrpSpPr>
+          <p:cNvPr id="6" name="Group 5">
+            <a:extLst>
+              <a:ext uri="{FF2B5EF4-FFF2-40B4-BE49-F238E27FC236}">
+                <a16:creationId xmlns:a16="http://schemas.microsoft.com/office/drawing/2014/main" id="{A63338A0-F40A-B548-B5D3-394B3BC4AE13}"/>
+              </a:ext>
+            </a:extLst>
+          </p:cNvPr>
+          <p:cNvGrpSpPr/>
+          <p:nvPr/>
+        </p:nvGrpSpPr>
+        <p:grpSpPr>
+          <a:xfrm>
+            <a:off x="7274720" y="3514641"/>
+            <a:ext cx="2917172" cy="369332"/>
+            <a:chOff x="7514448" y="3331792"/>
+            <a:chExt cx="2917172" cy="369332"/>
+          </a:xfrm>
+        </p:grpSpPr>
+        <p:sp>
+          <p:nvSpPr>
+            <p:cNvPr id="66" name="TextBox 65">
+              <a:extLst>
+                <a:ext uri="{FF2B5EF4-FFF2-40B4-BE49-F238E27FC236}">
+                  <a16:creationId xmlns:a16="http://schemas.microsoft.com/office/drawing/2014/main" id="{6DDFAEAC-DD1D-1641-8A35-A009EBC01C36}"/>
+                </a:ext>
+              </a:extLst>
+            </p:cNvPr>
+            <p:cNvSpPr txBox="1"/>
+            <p:nvPr/>
+          </p:nvSpPr>
+          <p:spPr>
+            <a:xfrm>
+              <a:off x="7514448" y="3331792"/>
+              <a:ext cx="2143498" cy="369332"/>
+            </a:xfrm>
+            <a:prstGeom prst="rect">
+              <a:avLst/>
+            </a:prstGeom>
+            <a:noFill/>
+          </p:spPr>
+          <p:txBody>
+            <a:bodyPr wrap="square" rtlCol="0">
+              <a:spAutoFit/>
+            </a:bodyPr>
+            <a:lstStyle/>
+            <a:p>
+              <a:r>
+                <a:rPr lang="en-US" dirty="0"/>
+                <a:t>DO = Dense Obstacle</a:t>
+              </a:r>
+            </a:p>
+          </p:txBody>
+        </p:sp>
+        <p:grpSp>
+          <p:nvGrpSpPr>
+            <p:cNvPr id="72" name="Group 71">
+              <a:extLst>
+                <a:ext uri="{FF2B5EF4-FFF2-40B4-BE49-F238E27FC236}">
+                  <a16:creationId xmlns:a16="http://schemas.microsoft.com/office/drawing/2014/main" id="{9EBF9603-0140-4D49-84B6-54613712ED2B}"/>
+                </a:ext>
+              </a:extLst>
+            </p:cNvPr>
+            <p:cNvGrpSpPr/>
+            <p:nvPr/>
+          </p:nvGrpSpPr>
+          <p:grpSpPr>
+            <a:xfrm>
+              <a:off x="9700100" y="3368938"/>
+              <a:ext cx="731520" cy="295041"/>
+              <a:chOff x="9699621" y="3380438"/>
+              <a:chExt cx="731520" cy="295041"/>
+            </a:xfrm>
+          </p:grpSpPr>
+          <p:sp>
+            <p:nvSpPr>
+              <p:cNvPr id="73" name="Cube 72">
+                <a:extLst>
+                  <a:ext uri="{FF2B5EF4-FFF2-40B4-BE49-F238E27FC236}">
+                    <a16:creationId xmlns:a16="http://schemas.microsoft.com/office/drawing/2014/main" id="{FD096FC5-6BAE-FE48-AA69-26EDDBAF655B}"/>
+                  </a:ext>
+                </a:extLst>
+              </p:cNvPr>
+              <p:cNvSpPr>
+                <a:spLocks noChangeAspect="1"/>
+              </p:cNvSpPr>
+              <p:nvPr/>
+            </p:nvSpPr>
+            <p:spPr>
+              <a:xfrm>
+                <a:off x="9882501" y="3492599"/>
+                <a:ext cx="182880" cy="182880"/>
+              </a:xfrm>
+              <a:prstGeom prst="cube">
+                <a:avLst/>
+              </a:prstGeom>
+              <a:solidFill>
+                <a:schemeClr val="accent4">
+                  <a:lumMod val="75000"/>
+                </a:schemeClr>
+              </a:solidFill>
+              <a:ln>
+                <a:solidFill>
+                  <a:schemeClr val="tx1"/>
+                </a:solidFill>
+              </a:ln>
+            </p:spPr>
+            <p:style>
+              <a:lnRef idx="2">
+                <a:schemeClr val="accent1">
+                  <a:shade val="50000"/>
+                </a:schemeClr>
+              </a:lnRef>
+              <a:fillRef idx="1">
+                <a:schemeClr val="accent1"/>
+              </a:fillRef>
+              <a:effectRef idx="0">
+                <a:schemeClr val="accent1"/>
+              </a:effectRef>
+              <a:fontRef idx="minor">
+                <a:schemeClr val="lt1"/>
+              </a:fontRef>
+            </p:style>
+            <p:txBody>
+              <a:bodyPr rtlCol="0" anchor="ctr"/>
+              <a:lstStyle/>
+              <a:p>
+                <a:pPr algn="ctr"/>
+                <a:endParaRPr lang="en-US"/>
+              </a:p>
+            </p:txBody>
+          </p:sp>
+          <p:sp>
+            <p:nvSpPr>
+              <p:cNvPr id="74" name="Cube 73">
+                <a:extLst>
+                  <a:ext uri="{FF2B5EF4-FFF2-40B4-BE49-F238E27FC236}">
+                    <a16:creationId xmlns:a16="http://schemas.microsoft.com/office/drawing/2014/main" id="{3E6EF6F1-F028-714C-B710-C39F9AD39C2C}"/>
+                  </a:ext>
+                </a:extLst>
+              </p:cNvPr>
+              <p:cNvSpPr>
+                <a:spLocks noChangeAspect="1"/>
+              </p:cNvSpPr>
+              <p:nvPr/>
+            </p:nvSpPr>
+            <p:spPr>
+              <a:xfrm>
+                <a:off x="10065381" y="3492599"/>
+                <a:ext cx="182880" cy="182880"/>
+              </a:xfrm>
+              <a:prstGeom prst="cube">
+                <a:avLst/>
+              </a:prstGeom>
+              <a:solidFill>
+                <a:schemeClr val="accent4">
+                  <a:lumMod val="75000"/>
+                </a:schemeClr>
+              </a:solidFill>
+              <a:ln>
+                <a:solidFill>
+                  <a:schemeClr val="tx1"/>
+                </a:solidFill>
+              </a:ln>
+            </p:spPr>
+            <p:style>
+              <a:lnRef idx="2">
+                <a:schemeClr val="accent1">
+                  <a:shade val="50000"/>
+                </a:schemeClr>
+              </a:lnRef>
+              <a:fillRef idx="1">
+                <a:schemeClr val="accent1"/>
+              </a:fillRef>
+              <a:effectRef idx="0">
+                <a:schemeClr val="accent1"/>
+              </a:effectRef>
+              <a:fontRef idx="minor">
+                <a:schemeClr val="lt1"/>
+              </a:fontRef>
+            </p:style>
+            <p:txBody>
+              <a:bodyPr rtlCol="0" anchor="ctr"/>
+              <a:lstStyle/>
+              <a:p>
+                <a:pPr algn="ctr"/>
+                <a:endParaRPr lang="en-US"/>
+              </a:p>
+            </p:txBody>
+          </p:sp>
+          <p:sp>
+            <p:nvSpPr>
+              <p:cNvPr id="75" name="Cube 74">
+                <a:extLst>
+                  <a:ext uri="{FF2B5EF4-FFF2-40B4-BE49-F238E27FC236}">
+                    <a16:creationId xmlns:a16="http://schemas.microsoft.com/office/drawing/2014/main" id="{2C7C830A-3578-8E4C-9ACF-0BA2E9FDFE5E}"/>
+                  </a:ext>
+                </a:extLst>
+              </p:cNvPr>
+              <p:cNvSpPr>
+                <a:spLocks noChangeAspect="1"/>
+              </p:cNvSpPr>
+              <p:nvPr/>
+            </p:nvSpPr>
+            <p:spPr>
+              <a:xfrm>
+                <a:off x="9882501" y="3380438"/>
+                <a:ext cx="182880" cy="182880"/>
+              </a:xfrm>
+              <a:prstGeom prst="cube">
+                <a:avLst/>
+              </a:prstGeom>
+              <a:solidFill>
+                <a:schemeClr val="accent4">
+                  <a:lumMod val="75000"/>
+                </a:schemeClr>
+              </a:solidFill>
+              <a:ln>
+                <a:solidFill>
+                  <a:schemeClr val="tx1"/>
+                </a:solidFill>
+              </a:ln>
+            </p:spPr>
+            <p:style>
+              <a:lnRef idx="2">
+                <a:schemeClr val="accent1">
+                  <a:shade val="50000"/>
+                </a:schemeClr>
+              </a:lnRef>
+              <a:fillRef idx="1">
+                <a:schemeClr val="accent1"/>
+              </a:fillRef>
+              <a:effectRef idx="0">
+                <a:schemeClr val="accent1"/>
+              </a:effectRef>
+              <a:fontRef idx="minor">
+                <a:schemeClr val="lt1"/>
+              </a:fontRef>
+            </p:style>
+            <p:txBody>
+              <a:bodyPr rtlCol="0" anchor="ctr"/>
+              <a:lstStyle/>
+              <a:p>
+                <a:pPr algn="ctr"/>
+                <a:endParaRPr lang="en-US"/>
+              </a:p>
+            </p:txBody>
+          </p:sp>
+          <p:sp>
+            <p:nvSpPr>
+              <p:cNvPr id="76" name="Cube 75">
+                <a:extLst>
+                  <a:ext uri="{FF2B5EF4-FFF2-40B4-BE49-F238E27FC236}">
+                    <a16:creationId xmlns:a16="http://schemas.microsoft.com/office/drawing/2014/main" id="{568F1CAB-AEAF-AF48-978C-8C5415C04E44}"/>
+                  </a:ext>
+                </a:extLst>
+              </p:cNvPr>
+              <p:cNvSpPr>
+                <a:spLocks noChangeAspect="1"/>
+              </p:cNvSpPr>
+              <p:nvPr/>
+            </p:nvSpPr>
+            <p:spPr>
+              <a:xfrm>
+                <a:off x="10065381" y="3380438"/>
+                <a:ext cx="182880" cy="182880"/>
+              </a:xfrm>
+              <a:prstGeom prst="cube">
+                <a:avLst/>
+              </a:prstGeom>
+              <a:solidFill>
+                <a:schemeClr val="accent4">
+                  <a:lumMod val="75000"/>
+                </a:schemeClr>
+              </a:solidFill>
+              <a:ln>
+                <a:solidFill>
+                  <a:schemeClr val="tx1"/>
+                </a:solidFill>
+              </a:ln>
+            </p:spPr>
+            <p:style>
+              <a:lnRef idx="2">
+                <a:schemeClr val="accent1">
+                  <a:shade val="50000"/>
+                </a:schemeClr>
+              </a:lnRef>
+              <a:fillRef idx="1">
+                <a:schemeClr val="accent1"/>
+              </a:fillRef>
+              <a:effectRef idx="0">
+                <a:schemeClr val="accent1"/>
+              </a:effectRef>
+              <a:fontRef idx="minor">
+                <a:schemeClr val="lt1"/>
+              </a:fontRef>
+            </p:style>
+            <p:txBody>
+              <a:bodyPr rtlCol="0" anchor="ctr"/>
+              <a:lstStyle/>
+              <a:p>
+                <a:pPr algn="ctr"/>
+                <a:endParaRPr lang="en-US"/>
+              </a:p>
+            </p:txBody>
+          </p:sp>
+          <p:sp>
+            <p:nvSpPr>
+              <p:cNvPr id="77" name="Cube 76">
+                <a:extLst>
+                  <a:ext uri="{FF2B5EF4-FFF2-40B4-BE49-F238E27FC236}">
+                    <a16:creationId xmlns:a16="http://schemas.microsoft.com/office/drawing/2014/main" id="{6BA3038D-F1D1-9249-B2F5-CE61CB32C6FA}"/>
+                  </a:ext>
+                </a:extLst>
+              </p:cNvPr>
+              <p:cNvSpPr>
+                <a:spLocks noChangeAspect="1"/>
+              </p:cNvSpPr>
+              <p:nvPr/>
+            </p:nvSpPr>
+            <p:spPr>
+              <a:xfrm>
+                <a:off x="10248261" y="3492599"/>
+                <a:ext cx="182880" cy="182880"/>
+              </a:xfrm>
+              <a:prstGeom prst="cube">
+                <a:avLst/>
+              </a:prstGeom>
+              <a:solidFill>
+                <a:schemeClr val="accent4">
+                  <a:lumMod val="75000"/>
+                </a:schemeClr>
+              </a:solidFill>
+              <a:ln>
+                <a:solidFill>
+                  <a:schemeClr val="tx1"/>
+                </a:solidFill>
+              </a:ln>
+            </p:spPr>
+            <p:style>
+              <a:lnRef idx="2">
+                <a:schemeClr val="accent1">
+                  <a:shade val="50000"/>
+                </a:schemeClr>
+              </a:lnRef>
+              <a:fillRef idx="1">
+                <a:schemeClr val="accent1"/>
+              </a:fillRef>
+              <a:effectRef idx="0">
+                <a:schemeClr val="accent1"/>
+              </a:effectRef>
+              <a:fontRef idx="minor">
+                <a:schemeClr val="lt1"/>
+              </a:fontRef>
+            </p:style>
+            <p:txBody>
+              <a:bodyPr rtlCol="0" anchor="ctr"/>
+              <a:lstStyle/>
+              <a:p>
+                <a:pPr algn="ctr"/>
+                <a:endParaRPr lang="en-US"/>
+              </a:p>
+            </p:txBody>
+          </p:sp>
+          <p:sp>
+            <p:nvSpPr>
+              <p:cNvPr id="78" name="Cube 77">
+                <a:extLst>
+                  <a:ext uri="{FF2B5EF4-FFF2-40B4-BE49-F238E27FC236}">
+                    <a16:creationId xmlns:a16="http://schemas.microsoft.com/office/drawing/2014/main" id="{1E09A203-9663-D142-BBE4-09E31750B8C3}"/>
+                  </a:ext>
+                </a:extLst>
+              </p:cNvPr>
+              <p:cNvSpPr>
+                <a:spLocks noChangeAspect="1"/>
+              </p:cNvSpPr>
+              <p:nvPr/>
+            </p:nvSpPr>
+            <p:spPr>
+              <a:xfrm>
+                <a:off x="10248261" y="3380438"/>
+                <a:ext cx="182880" cy="182880"/>
+              </a:xfrm>
+              <a:prstGeom prst="cube">
+                <a:avLst/>
+              </a:prstGeom>
+              <a:solidFill>
+                <a:schemeClr val="accent4">
+                  <a:lumMod val="75000"/>
+                </a:schemeClr>
+              </a:solidFill>
+              <a:ln>
+                <a:solidFill>
+                  <a:schemeClr val="tx1"/>
+                </a:solidFill>
+              </a:ln>
+            </p:spPr>
+            <p:style>
+              <a:lnRef idx="2">
+                <a:schemeClr val="accent1">
+                  <a:shade val="50000"/>
+                </a:schemeClr>
+              </a:lnRef>
+              <a:fillRef idx="1">
+                <a:schemeClr val="accent1"/>
+              </a:fillRef>
+              <a:effectRef idx="0">
+                <a:schemeClr val="accent1"/>
+              </a:effectRef>
+              <a:fontRef idx="minor">
+                <a:schemeClr val="lt1"/>
+              </a:fontRef>
+            </p:style>
+            <p:txBody>
+              <a:bodyPr rtlCol="0" anchor="ctr"/>
+              <a:lstStyle/>
+              <a:p>
+                <a:pPr algn="ctr"/>
+                <a:endParaRPr lang="en-US"/>
+              </a:p>
+            </p:txBody>
+          </p:sp>
+          <p:sp>
+            <p:nvSpPr>
+              <p:cNvPr id="79" name="Cube 78">
+                <a:extLst>
+                  <a:ext uri="{FF2B5EF4-FFF2-40B4-BE49-F238E27FC236}">
+                    <a16:creationId xmlns:a16="http://schemas.microsoft.com/office/drawing/2014/main" id="{6CD9A0FF-4E70-FE4B-AB3C-D8C3E493C5AE}"/>
+                  </a:ext>
+                </a:extLst>
+              </p:cNvPr>
+              <p:cNvSpPr>
+                <a:spLocks noChangeAspect="1"/>
+              </p:cNvSpPr>
+              <p:nvPr/>
+            </p:nvSpPr>
+            <p:spPr>
+              <a:xfrm>
+                <a:off x="9699621" y="3492599"/>
+                <a:ext cx="182880" cy="182880"/>
+              </a:xfrm>
+              <a:prstGeom prst="cube">
+                <a:avLst/>
+              </a:prstGeom>
+              <a:solidFill>
+                <a:schemeClr val="accent4">
+                  <a:lumMod val="75000"/>
+                </a:schemeClr>
+              </a:solidFill>
+              <a:ln>
+                <a:solidFill>
+                  <a:schemeClr val="tx1"/>
+                </a:solidFill>
+              </a:ln>
+            </p:spPr>
+            <p:style>
+              <a:lnRef idx="2">
+                <a:schemeClr val="accent1">
+                  <a:shade val="50000"/>
+                </a:schemeClr>
+              </a:lnRef>
+              <a:fillRef idx="1">
+                <a:schemeClr val="accent1"/>
+              </a:fillRef>
+              <a:effectRef idx="0">
+                <a:schemeClr val="accent1"/>
+              </a:effectRef>
+              <a:fontRef idx="minor">
+                <a:schemeClr val="lt1"/>
+              </a:fontRef>
+            </p:style>
+            <p:txBody>
+              <a:bodyPr rtlCol="0" anchor="ctr"/>
+              <a:lstStyle/>
+              <a:p>
+                <a:pPr algn="ctr"/>
+                <a:endParaRPr lang="en-US"/>
+              </a:p>
+            </p:txBody>
+          </p:sp>
+          <p:sp>
+            <p:nvSpPr>
+              <p:cNvPr id="80" name="Cube 79">
+                <a:extLst>
+                  <a:ext uri="{FF2B5EF4-FFF2-40B4-BE49-F238E27FC236}">
+                    <a16:creationId xmlns:a16="http://schemas.microsoft.com/office/drawing/2014/main" id="{1618F2A3-0204-FC4A-80B0-F6E1C4ECF478}"/>
+                  </a:ext>
+                </a:extLst>
+              </p:cNvPr>
+              <p:cNvSpPr>
+                <a:spLocks noChangeAspect="1"/>
+              </p:cNvSpPr>
+              <p:nvPr/>
+            </p:nvSpPr>
+            <p:spPr>
+              <a:xfrm>
+                <a:off x="9699621" y="3380438"/>
+                <a:ext cx="182880" cy="182880"/>
+              </a:xfrm>
+              <a:prstGeom prst="cube">
+                <a:avLst/>
+              </a:prstGeom>
+              <a:solidFill>
+                <a:schemeClr val="accent4">
+                  <a:lumMod val="75000"/>
+                </a:schemeClr>
+              </a:solidFill>
+              <a:ln>
+                <a:solidFill>
+                  <a:schemeClr val="tx1"/>
+                </a:solidFill>
+              </a:ln>
+            </p:spPr>
+            <p:style>
+              <a:lnRef idx="2">
+                <a:schemeClr val="accent1">
+                  <a:shade val="50000"/>
+                </a:schemeClr>
+              </a:lnRef>
+              <a:fillRef idx="1">
+                <a:schemeClr val="accent1"/>
+              </a:fillRef>
+              <a:effectRef idx="0">
+                <a:schemeClr val="accent1"/>
+              </a:effectRef>
+              <a:fontRef idx="minor">
+                <a:schemeClr val="lt1"/>
+              </a:fontRef>
+            </p:style>
+            <p:txBody>
+              <a:bodyPr rtlCol="0" anchor="ctr"/>
+              <a:lstStyle/>
+              <a:p>
+                <a:pPr algn="ctr"/>
+                <a:endParaRPr lang="en-US"/>
+              </a:p>
+            </p:txBody>
+          </p:sp>
+        </p:grpSp>
+      </p:grpSp>
     </p:spTree>
     <p:extLst>
       <p:ext uri="{BB962C8B-B14F-4D97-AF65-F5344CB8AC3E}">

</xml_diff>

<commit_message>
instruction.pptx: use SO and DO in collision table
</commit_message>
<xml_diff>
--- a/XPlanningEvaluation/data/instruction/instruction.pptx
+++ b/XPlanningEvaluation/data/instruction/instruction.pptx
@@ -5871,7 +5871,7 @@
           <p:nvPr>
             <p:extLst>
               <p:ext uri="{D42A27DB-BD31-4B8C-83A1-F6EECF244321}">
-                <p14:modId xmlns:p14="http://schemas.microsoft.com/office/powerpoint/2010/main" val="3534743995"/>
+                <p14:modId xmlns:p14="http://schemas.microsoft.com/office/powerpoint/2010/main" val="1717341180"/>
               </p:ext>
             </p:extLst>
           </p:nvPr>
@@ -5976,7 +5976,7 @@
                       </a:r>
                     </a:p>
                   </a:txBody>
-                  <a:tcPr anchor="ctr"/>
+                  <a:tcPr/>
                 </a:tc>
                 <a:tc>
                   <a:txBody>
@@ -6016,7 +6016,7 @@
                       </a:r>
                     </a:p>
                   </a:txBody>
-                  <a:tcPr anchor="ctr"/>
+                  <a:tcPr/>
                 </a:tc>
                 <a:tc>
                   <a:txBody>
@@ -6056,7 +6056,7 @@
                       </a:r>
                     </a:p>
                   </a:txBody>
-                  <a:tcPr anchor="ctr"/>
+                  <a:tcPr/>
                 </a:tc>
                 <a:tc>
                   <a:txBody>
@@ -6296,10 +6296,10 @@
       </p:grpSp>
       <p:grpSp>
         <p:nvGrpSpPr>
-          <p:cNvPr id="10" name="Group 9">
+          <p:cNvPr id="15" name="Group 14">
             <a:extLst>
               <a:ext uri="{FF2B5EF4-FFF2-40B4-BE49-F238E27FC236}">
-                <a16:creationId xmlns:a16="http://schemas.microsoft.com/office/drawing/2014/main" id="{4FC8CDA7-781D-5F48-97C4-0DFF9A7EC055}"/>
+                <a16:creationId xmlns:a16="http://schemas.microsoft.com/office/drawing/2014/main" id="{ECEA290B-0616-B242-BAC6-DEB0AAB4DF29}"/>
               </a:ext>
             </a:extLst>
           </p:cNvPr>
@@ -6308,461 +6308,331 @@
         </p:nvGrpSpPr>
         <p:grpSpPr>
           <a:xfrm>
-            <a:off x="1703028" y="3445431"/>
-            <a:ext cx="4985348" cy="937824"/>
-            <a:chOff x="1712788" y="3479093"/>
-            <a:chExt cx="4985348" cy="937824"/>
+            <a:off x="675748" y="4105742"/>
+            <a:ext cx="365760" cy="295041"/>
+            <a:chOff x="7803055" y="2574583"/>
+            <a:chExt cx="365760" cy="295041"/>
           </a:xfrm>
         </p:grpSpPr>
-        <p:grpSp>
-          <p:nvGrpSpPr>
-            <p:cNvPr id="70" name="Group 69">
-              <a:extLst>
-                <a:ext uri="{FF2B5EF4-FFF2-40B4-BE49-F238E27FC236}">
-                  <a16:creationId xmlns:a16="http://schemas.microsoft.com/office/drawing/2014/main" id="{26CD5723-6F2F-274A-94B9-0C3A4DA1B2F8}"/>
-                </a:ext>
-              </a:extLst>
-            </p:cNvPr>
-            <p:cNvGrpSpPr/>
-            <p:nvPr/>
-          </p:nvGrpSpPr>
-          <p:grpSpPr>
-            <a:xfrm>
-              <a:off x="1712788" y="3479093"/>
-              <a:ext cx="1711709" cy="937824"/>
-              <a:chOff x="2622917" y="3818672"/>
-              <a:chExt cx="1711709" cy="937824"/>
-            </a:xfrm>
-          </p:grpSpPr>
-          <p:pic>
-            <p:nvPicPr>
-              <p:cNvPr id="13" name="Picture 12">
-                <a:extLst>
-                  <a:ext uri="{FF2B5EF4-FFF2-40B4-BE49-F238E27FC236}">
-                    <a16:creationId xmlns:a16="http://schemas.microsoft.com/office/drawing/2014/main" id="{A5237C1C-7D65-1C4F-9F0E-90EEC18F3C72}"/>
-                  </a:ext>
-                </a:extLst>
-              </p:cNvPr>
-              <p:cNvPicPr>
-                <a:picLocks noChangeAspect="1"/>
-              </p:cNvPicPr>
-              <p:nvPr/>
-            </p:nvPicPr>
-            <p:blipFill rotWithShape="1">
-              <a:blip r:embed="rId2"/>
-              <a:srcRect l="26302" t="1905" r="24095"/>
-              <a:stretch/>
-            </p:blipFill>
-            <p:spPr>
-              <a:xfrm>
-                <a:off x="2622917" y="3875211"/>
-                <a:ext cx="431549" cy="640080"/>
-              </a:xfrm>
-              <a:prstGeom prst="rect">
-                <a:avLst/>
-              </a:prstGeom>
-            </p:spPr>
-          </p:pic>
-          <p:sp>
-            <p:nvSpPr>
-              <p:cNvPr id="14" name="Right Arrow 13">
-                <a:extLst>
-                  <a:ext uri="{FF2B5EF4-FFF2-40B4-BE49-F238E27FC236}">
-                    <a16:creationId xmlns:a16="http://schemas.microsoft.com/office/drawing/2014/main" id="{A520BE55-5968-8F4E-9A7F-2ECEE1272B8D}"/>
-                  </a:ext>
-                </a:extLst>
-              </p:cNvPr>
-              <p:cNvSpPr/>
-              <p:nvPr/>
-            </p:nvSpPr>
-            <p:spPr>
-              <a:xfrm>
-                <a:off x="3237346" y="4195251"/>
-                <a:ext cx="1097280" cy="182880"/>
-              </a:xfrm>
-              <a:prstGeom prst="rightArrow">
-                <a:avLst/>
-              </a:prstGeom>
-              <a:solidFill>
-                <a:schemeClr val="accent1">
-                  <a:lumMod val="75000"/>
-                </a:schemeClr>
-              </a:solidFill>
-            </p:spPr>
-            <p:style>
-              <a:lnRef idx="2">
-                <a:schemeClr val="accent1">
-                  <a:shade val="50000"/>
-                </a:schemeClr>
-              </a:lnRef>
-              <a:fillRef idx="1">
-                <a:schemeClr val="accent1"/>
-              </a:fillRef>
-              <a:effectRef idx="0">
-                <a:schemeClr val="accent1"/>
-              </a:effectRef>
-              <a:fontRef idx="minor">
-                <a:schemeClr val="lt1"/>
-              </a:fontRef>
-            </p:style>
-            <p:txBody>
-              <a:bodyPr rtlCol="0" anchor="ctr"/>
-              <a:lstStyle/>
-              <a:p>
-                <a:pPr algn="ctr"/>
-                <a:endParaRPr lang="en-US"/>
-              </a:p>
-            </p:txBody>
-          </p:sp>
-          <p:grpSp>
-            <p:nvGrpSpPr>
-              <p:cNvPr id="15" name="Group 14">
-                <a:extLst>
-                  <a:ext uri="{FF2B5EF4-FFF2-40B4-BE49-F238E27FC236}">
-                    <a16:creationId xmlns:a16="http://schemas.microsoft.com/office/drawing/2014/main" id="{ECEA290B-0616-B242-BAC6-DEB0AAB4DF29}"/>
-                  </a:ext>
-                </a:extLst>
-              </p:cNvPr>
-              <p:cNvGrpSpPr/>
-              <p:nvPr/>
-            </p:nvGrpSpPr>
-            <p:grpSpPr>
-              <a:xfrm>
-                <a:off x="3600240" y="3818672"/>
-                <a:ext cx="365760" cy="295041"/>
-                <a:chOff x="7803055" y="2574583"/>
-                <a:chExt cx="365760" cy="295041"/>
-              </a:xfrm>
-            </p:grpSpPr>
-            <p:sp>
-              <p:nvSpPr>
-                <p:cNvPr id="17" name="Cube 16">
-                  <a:extLst>
-                    <a:ext uri="{FF2B5EF4-FFF2-40B4-BE49-F238E27FC236}">
-                      <a16:creationId xmlns:a16="http://schemas.microsoft.com/office/drawing/2014/main" id="{0571F3CA-DE91-0F4E-88CC-1DEB0B39294D}"/>
-                    </a:ext>
-                  </a:extLst>
-                </p:cNvPr>
-                <p:cNvSpPr>
-                  <a:spLocks noChangeAspect="1"/>
-                </p:cNvSpPr>
-                <p:nvPr/>
-              </p:nvSpPr>
-              <p:spPr>
-                <a:xfrm>
-                  <a:off x="7803055" y="2686744"/>
-                  <a:ext cx="182880" cy="182880"/>
-                </a:xfrm>
-                <a:prstGeom prst="cube">
-                  <a:avLst/>
-                </a:prstGeom>
-                <a:solidFill>
-                  <a:schemeClr val="accent4">
-                    <a:lumMod val="75000"/>
-                  </a:schemeClr>
-                </a:solidFill>
-                <a:ln>
-                  <a:solidFill>
-                    <a:schemeClr val="tx1"/>
-                  </a:solidFill>
-                </a:ln>
-              </p:spPr>
-              <p:style>
-                <a:lnRef idx="2">
-                  <a:schemeClr val="accent1">
-                    <a:shade val="50000"/>
-                  </a:schemeClr>
-                </a:lnRef>
-                <a:fillRef idx="1">
-                  <a:schemeClr val="accent1"/>
-                </a:fillRef>
-                <a:effectRef idx="0">
-                  <a:schemeClr val="accent1"/>
-                </a:effectRef>
-                <a:fontRef idx="minor">
-                  <a:schemeClr val="lt1"/>
-                </a:fontRef>
-              </p:style>
-              <p:txBody>
-                <a:bodyPr rtlCol="0" anchor="ctr"/>
-                <a:lstStyle/>
-                <a:p>
-                  <a:pPr algn="ctr"/>
-                  <a:endParaRPr lang="en-US"/>
-                </a:p>
-              </p:txBody>
-            </p:sp>
-            <p:sp>
-              <p:nvSpPr>
-                <p:cNvPr id="18" name="Cube 17">
-                  <a:extLst>
-                    <a:ext uri="{FF2B5EF4-FFF2-40B4-BE49-F238E27FC236}">
-                      <a16:creationId xmlns:a16="http://schemas.microsoft.com/office/drawing/2014/main" id="{38A9D1D2-E18B-2641-8445-D5CA3B2F4A57}"/>
-                    </a:ext>
-                  </a:extLst>
-                </p:cNvPr>
-                <p:cNvSpPr>
-                  <a:spLocks noChangeAspect="1"/>
-                </p:cNvSpPr>
-                <p:nvPr/>
-              </p:nvSpPr>
-              <p:spPr>
-                <a:xfrm>
-                  <a:off x="7985935" y="2686744"/>
-                  <a:ext cx="182880" cy="182880"/>
-                </a:xfrm>
-                <a:prstGeom prst="cube">
-                  <a:avLst/>
-                </a:prstGeom>
-                <a:solidFill>
-                  <a:schemeClr val="accent4">
-                    <a:lumMod val="75000"/>
-                  </a:schemeClr>
-                </a:solidFill>
-                <a:ln>
-                  <a:solidFill>
-                    <a:schemeClr val="tx1"/>
-                  </a:solidFill>
-                </a:ln>
-              </p:spPr>
-              <p:style>
-                <a:lnRef idx="2">
-                  <a:schemeClr val="accent1">
-                    <a:shade val="50000"/>
-                  </a:schemeClr>
-                </a:lnRef>
-                <a:fillRef idx="1">
-                  <a:schemeClr val="accent1"/>
-                </a:fillRef>
-                <a:effectRef idx="0">
-                  <a:schemeClr val="accent1"/>
-                </a:effectRef>
-                <a:fontRef idx="minor">
-                  <a:schemeClr val="lt1"/>
-                </a:fontRef>
-              </p:style>
-              <p:txBody>
-                <a:bodyPr rtlCol="0" anchor="ctr"/>
-                <a:lstStyle/>
-                <a:p>
-                  <a:pPr algn="ctr"/>
-                  <a:endParaRPr lang="en-US"/>
-                </a:p>
-              </p:txBody>
-            </p:sp>
-            <p:sp>
-              <p:nvSpPr>
-                <p:cNvPr id="19" name="Cube 18">
-                  <a:extLst>
-                    <a:ext uri="{FF2B5EF4-FFF2-40B4-BE49-F238E27FC236}">
-                      <a16:creationId xmlns:a16="http://schemas.microsoft.com/office/drawing/2014/main" id="{434BC0A4-28BE-914B-8E12-8F8444AB7859}"/>
-                    </a:ext>
-                  </a:extLst>
-                </p:cNvPr>
-                <p:cNvSpPr>
-                  <a:spLocks noChangeAspect="1"/>
-                </p:cNvSpPr>
-                <p:nvPr/>
-              </p:nvSpPr>
-              <p:spPr>
-                <a:xfrm>
-                  <a:off x="7803055" y="2574583"/>
-                  <a:ext cx="182880" cy="182880"/>
-                </a:xfrm>
-                <a:prstGeom prst="cube">
-                  <a:avLst/>
-                </a:prstGeom>
-                <a:solidFill>
-                  <a:schemeClr val="accent4">
-                    <a:lumMod val="75000"/>
-                  </a:schemeClr>
-                </a:solidFill>
-                <a:ln>
-                  <a:solidFill>
-                    <a:schemeClr val="tx1"/>
-                  </a:solidFill>
-                </a:ln>
-              </p:spPr>
-              <p:style>
-                <a:lnRef idx="2">
-                  <a:schemeClr val="accent1">
-                    <a:shade val="50000"/>
-                  </a:schemeClr>
-                </a:lnRef>
-                <a:fillRef idx="1">
-                  <a:schemeClr val="accent1"/>
-                </a:fillRef>
-                <a:effectRef idx="0">
-                  <a:schemeClr val="accent1"/>
-                </a:effectRef>
-                <a:fontRef idx="minor">
-                  <a:schemeClr val="lt1"/>
-                </a:fontRef>
-              </p:style>
-              <p:txBody>
-                <a:bodyPr rtlCol="0" anchor="ctr"/>
-                <a:lstStyle/>
-                <a:p>
-                  <a:pPr algn="ctr"/>
-                  <a:endParaRPr lang="en-US"/>
-                </a:p>
-              </p:txBody>
-            </p:sp>
-            <p:sp>
-              <p:nvSpPr>
-                <p:cNvPr id="20" name="Cube 19">
-                  <a:extLst>
-                    <a:ext uri="{FF2B5EF4-FFF2-40B4-BE49-F238E27FC236}">
-                      <a16:creationId xmlns:a16="http://schemas.microsoft.com/office/drawing/2014/main" id="{AA5DDF93-CB78-0B4D-A3C8-B1C41C934FA5}"/>
-                    </a:ext>
-                  </a:extLst>
-                </p:cNvPr>
-                <p:cNvSpPr>
-                  <a:spLocks noChangeAspect="1"/>
-                </p:cNvSpPr>
-                <p:nvPr/>
-              </p:nvSpPr>
-              <p:spPr>
-                <a:xfrm>
-                  <a:off x="7985935" y="2574583"/>
-                  <a:ext cx="182880" cy="182880"/>
-                </a:xfrm>
-                <a:prstGeom prst="cube">
-                  <a:avLst/>
-                </a:prstGeom>
-                <a:solidFill>
-                  <a:schemeClr val="accent4">
-                    <a:lumMod val="75000"/>
-                  </a:schemeClr>
-                </a:solidFill>
-                <a:ln>
-                  <a:solidFill>
-                    <a:schemeClr val="tx1"/>
-                  </a:solidFill>
-                </a:ln>
-              </p:spPr>
-              <p:style>
-                <a:lnRef idx="2">
-                  <a:schemeClr val="accent1">
-                    <a:shade val="50000"/>
-                  </a:schemeClr>
-                </a:lnRef>
-                <a:fillRef idx="1">
-                  <a:schemeClr val="accent1"/>
-                </a:fillRef>
-                <a:effectRef idx="0">
-                  <a:schemeClr val="accent1"/>
-                </a:effectRef>
-                <a:fontRef idx="minor">
-                  <a:schemeClr val="lt1"/>
-                </a:fontRef>
-              </p:style>
-              <p:txBody>
-                <a:bodyPr rtlCol="0" anchor="ctr"/>
-                <a:lstStyle/>
-                <a:p>
-                  <a:pPr algn="ctr"/>
-                  <a:endParaRPr lang="en-US"/>
-                </a:p>
-              </p:txBody>
-            </p:sp>
-          </p:grpSp>
-          <p:sp>
-            <p:nvSpPr>
-              <p:cNvPr id="16" name="TextBox 15">
-                <a:extLst>
-                  <a:ext uri="{FF2B5EF4-FFF2-40B4-BE49-F238E27FC236}">
-                    <a16:creationId xmlns:a16="http://schemas.microsoft.com/office/drawing/2014/main" id="{4AD4F83C-5298-B246-86D8-4334CF882E53}"/>
-                  </a:ext>
-                </a:extLst>
-              </p:cNvPr>
-              <p:cNvSpPr txBox="1"/>
-              <p:nvPr/>
-            </p:nvSpPr>
-            <p:spPr>
-              <a:xfrm>
-                <a:off x="3341600" y="4387164"/>
-                <a:ext cx="888769" cy="369332"/>
-              </a:xfrm>
-              <a:prstGeom prst="rect">
-                <a:avLst/>
-              </a:prstGeom>
-              <a:noFill/>
-            </p:spPr>
-            <p:txBody>
-              <a:bodyPr wrap="none" rtlCol="0">
-                <a:spAutoFit/>
-              </a:bodyPr>
-              <a:lstStyle/>
-              <a:p>
-                <a:r>
-                  <a:rPr lang="en-US" dirty="0"/>
-                  <a:t>0.7 m/s</a:t>
-                </a:r>
-              </a:p>
-            </p:txBody>
-          </p:sp>
-        </p:grpSp>
         <p:sp>
           <p:nvSpPr>
-            <p:cNvPr id="12" name="TextBox 11">
-              <a:extLst>
-                <a:ext uri="{FF2B5EF4-FFF2-40B4-BE49-F238E27FC236}">
-                  <a16:creationId xmlns:a16="http://schemas.microsoft.com/office/drawing/2014/main" id="{EFBC5898-DDC6-064E-9B61-0A01AC41CB4A}"/>
-                </a:ext>
-              </a:extLst>
-            </p:cNvPr>
-            <p:cNvSpPr txBox="1"/>
+            <p:cNvPr id="17" name="Cube 16">
+              <a:extLst>
+                <a:ext uri="{FF2B5EF4-FFF2-40B4-BE49-F238E27FC236}">
+                  <a16:creationId xmlns:a16="http://schemas.microsoft.com/office/drawing/2014/main" id="{0571F3CA-DE91-0F4E-88CC-1DEB0B39294D}"/>
+                </a:ext>
+              </a:extLst>
+            </p:cNvPr>
+            <p:cNvSpPr>
+              <a:spLocks noChangeAspect="1"/>
+            </p:cNvSpPr>
             <p:nvPr/>
           </p:nvSpPr>
           <p:spPr>
             <a:xfrm>
-              <a:off x="3523677" y="3594062"/>
-              <a:ext cx="3174459" cy="707886"/>
-            </a:xfrm>
-            <a:prstGeom prst="rect">
+              <a:off x="7803055" y="2686744"/>
+              <a:ext cx="182880" cy="182880"/>
+            </a:xfrm>
+            <a:prstGeom prst="cube">
               <a:avLst/>
             </a:prstGeom>
-            <a:noFill/>
+            <a:solidFill>
+              <a:schemeClr val="accent4">
+                <a:lumMod val="75000"/>
+              </a:schemeClr>
+            </a:solidFill>
+            <a:ln>
+              <a:solidFill>
+                <a:schemeClr val="tx1"/>
+              </a:solidFill>
+            </a:ln>
           </p:spPr>
+          <p:style>
+            <a:lnRef idx="2">
+              <a:schemeClr val="accent1">
+                <a:shade val="50000"/>
+              </a:schemeClr>
+            </a:lnRef>
+            <a:fillRef idx="1">
+              <a:schemeClr val="accent1"/>
+            </a:fillRef>
+            <a:effectRef idx="0">
+              <a:schemeClr val="accent1"/>
+            </a:effectRef>
+            <a:fontRef idx="minor">
+              <a:schemeClr val="lt1"/>
+            </a:fontRef>
+          </p:style>
           <p:txBody>
-            <a:bodyPr wrap="none" rtlCol="0">
-              <a:spAutoFit/>
-            </a:bodyPr>
+            <a:bodyPr rtlCol="0" anchor="ctr"/>
             <a:lstStyle/>
             <a:p>
-              <a:r>
-                <a:rPr lang="en-US" sz="2000" dirty="0"/>
-                <a:t>Probability of collision = </a:t>
-              </a:r>
-              <a:r>
-                <a:rPr lang="en-US" sz="2000" b="1" dirty="0"/>
-                <a:t>20%</a:t>
-              </a:r>
+              <a:pPr algn="ctr"/>
+              <a:endParaRPr lang="en-US"/>
             </a:p>
+          </p:txBody>
+        </p:sp>
+        <p:sp>
+          <p:nvSpPr>
+            <p:cNvPr id="18" name="Cube 17">
+              <a:extLst>
+                <a:ext uri="{FF2B5EF4-FFF2-40B4-BE49-F238E27FC236}">
+                  <a16:creationId xmlns:a16="http://schemas.microsoft.com/office/drawing/2014/main" id="{38A9D1D2-E18B-2641-8445-D5CA3B2F4A57}"/>
+                </a:ext>
+              </a:extLst>
+            </p:cNvPr>
+            <p:cNvSpPr>
+              <a:spLocks noChangeAspect="1"/>
+            </p:cNvSpPr>
+            <p:nvPr/>
+          </p:nvSpPr>
+          <p:spPr>
+            <a:xfrm>
+              <a:off x="7985935" y="2686744"/>
+              <a:ext cx="182880" cy="182880"/>
+            </a:xfrm>
+            <a:prstGeom prst="cube">
+              <a:avLst/>
+            </a:prstGeom>
+            <a:solidFill>
+              <a:schemeClr val="accent4">
+                <a:lumMod val="75000"/>
+              </a:schemeClr>
+            </a:solidFill>
+            <a:ln>
+              <a:solidFill>
+                <a:schemeClr val="tx1"/>
+              </a:solidFill>
+            </a:ln>
+          </p:spPr>
+          <p:style>
+            <a:lnRef idx="2">
+              <a:schemeClr val="accent1">
+                <a:shade val="50000"/>
+              </a:schemeClr>
+            </a:lnRef>
+            <a:fillRef idx="1">
+              <a:schemeClr val="accent1"/>
+            </a:fillRef>
+            <a:effectRef idx="0">
+              <a:schemeClr val="accent1"/>
+            </a:effectRef>
+            <a:fontRef idx="minor">
+              <a:schemeClr val="lt1"/>
+            </a:fontRef>
+          </p:style>
+          <p:txBody>
+            <a:bodyPr rtlCol="0" anchor="ctr"/>
+            <a:lstStyle/>
             <a:p>
-              <a:r>
-                <a:rPr lang="en-US" sz="2000" dirty="0"/>
-                <a:t>(Expected collision = </a:t>
-              </a:r>
-              <a:r>
-                <a:rPr lang="en-US" sz="2000" b="1" dirty="0"/>
-                <a:t>0.2</a:t>
-              </a:r>
-              <a:r>
-                <a:rPr lang="en-US" sz="2000" dirty="0"/>
-                <a:t>)</a:t>
-              </a:r>
+              <a:pPr algn="ctr"/>
+              <a:endParaRPr lang="en-US"/>
+            </a:p>
+          </p:txBody>
+        </p:sp>
+        <p:sp>
+          <p:nvSpPr>
+            <p:cNvPr id="19" name="Cube 18">
+              <a:extLst>
+                <a:ext uri="{FF2B5EF4-FFF2-40B4-BE49-F238E27FC236}">
+                  <a16:creationId xmlns:a16="http://schemas.microsoft.com/office/drawing/2014/main" id="{434BC0A4-28BE-914B-8E12-8F8444AB7859}"/>
+                </a:ext>
+              </a:extLst>
+            </p:cNvPr>
+            <p:cNvSpPr>
+              <a:spLocks noChangeAspect="1"/>
+            </p:cNvSpPr>
+            <p:nvPr/>
+          </p:nvSpPr>
+          <p:spPr>
+            <a:xfrm>
+              <a:off x="7803055" y="2574583"/>
+              <a:ext cx="182880" cy="182880"/>
+            </a:xfrm>
+            <a:prstGeom prst="cube">
+              <a:avLst/>
+            </a:prstGeom>
+            <a:solidFill>
+              <a:schemeClr val="accent4">
+                <a:lumMod val="75000"/>
+              </a:schemeClr>
+            </a:solidFill>
+            <a:ln>
+              <a:solidFill>
+                <a:schemeClr val="tx1"/>
+              </a:solidFill>
+            </a:ln>
+          </p:spPr>
+          <p:style>
+            <a:lnRef idx="2">
+              <a:schemeClr val="accent1">
+                <a:shade val="50000"/>
+              </a:schemeClr>
+            </a:lnRef>
+            <a:fillRef idx="1">
+              <a:schemeClr val="accent1"/>
+            </a:fillRef>
+            <a:effectRef idx="0">
+              <a:schemeClr val="accent1"/>
+            </a:effectRef>
+            <a:fontRef idx="minor">
+              <a:schemeClr val="lt1"/>
+            </a:fontRef>
+          </p:style>
+          <p:txBody>
+            <a:bodyPr rtlCol="0" anchor="ctr"/>
+            <a:lstStyle/>
+            <a:p>
+              <a:pPr algn="ctr"/>
+              <a:endParaRPr lang="en-US"/>
+            </a:p>
+          </p:txBody>
+        </p:sp>
+        <p:sp>
+          <p:nvSpPr>
+            <p:cNvPr id="20" name="Cube 19">
+              <a:extLst>
+                <a:ext uri="{FF2B5EF4-FFF2-40B4-BE49-F238E27FC236}">
+                  <a16:creationId xmlns:a16="http://schemas.microsoft.com/office/drawing/2014/main" id="{AA5DDF93-CB78-0B4D-A3C8-B1C41C934FA5}"/>
+                </a:ext>
+              </a:extLst>
+            </p:cNvPr>
+            <p:cNvSpPr>
+              <a:spLocks noChangeAspect="1"/>
+            </p:cNvSpPr>
+            <p:nvPr/>
+          </p:nvSpPr>
+          <p:spPr>
+            <a:xfrm>
+              <a:off x="7985935" y="2574583"/>
+              <a:ext cx="182880" cy="182880"/>
+            </a:xfrm>
+            <a:prstGeom prst="cube">
+              <a:avLst/>
+            </a:prstGeom>
+            <a:solidFill>
+              <a:schemeClr val="accent4">
+                <a:lumMod val="75000"/>
+              </a:schemeClr>
+            </a:solidFill>
+            <a:ln>
+              <a:solidFill>
+                <a:schemeClr val="tx1"/>
+              </a:solidFill>
+            </a:ln>
+          </p:spPr>
+          <p:style>
+            <a:lnRef idx="2">
+              <a:schemeClr val="accent1">
+                <a:shade val="50000"/>
+              </a:schemeClr>
+            </a:lnRef>
+            <a:fillRef idx="1">
+              <a:schemeClr val="accent1"/>
+            </a:fillRef>
+            <a:effectRef idx="0">
+              <a:schemeClr val="accent1"/>
+            </a:effectRef>
+            <a:fontRef idx="minor">
+              <a:schemeClr val="lt1"/>
+            </a:fontRef>
+          </p:style>
+          <p:txBody>
+            <a:bodyPr rtlCol="0" anchor="ctr"/>
+            <a:lstStyle/>
+            <a:p>
+              <a:pPr algn="ctr"/>
+              <a:endParaRPr lang="en-US"/>
             </a:p>
           </p:txBody>
         </p:sp>
       </p:grpSp>
+      <p:pic>
+        <p:nvPicPr>
+          <p:cNvPr id="24" name="Picture 23">
+            <a:extLst>
+              <a:ext uri="{FF2B5EF4-FFF2-40B4-BE49-F238E27FC236}">
+                <a16:creationId xmlns:a16="http://schemas.microsoft.com/office/drawing/2014/main" id="{BF3B4DBD-9F4A-774F-A45C-E43D7BF0873D}"/>
+              </a:ext>
+            </a:extLst>
+          </p:cNvPr>
+          <p:cNvPicPr>
+            <a:picLocks noChangeAspect="1"/>
+          </p:cNvPicPr>
+          <p:nvPr/>
+        </p:nvPicPr>
+        <p:blipFill rotWithShape="1">
+          <a:blip r:embed="rId2"/>
+          <a:srcRect l="26302" t="1905" r="24095"/>
+          <a:stretch/>
+        </p:blipFill>
+        <p:spPr>
+          <a:xfrm>
+            <a:off x="1703028" y="5133398"/>
+            <a:ext cx="431549" cy="640080"/>
+          </a:xfrm>
+          <a:prstGeom prst="rect">
+            <a:avLst/>
+          </a:prstGeom>
+        </p:spPr>
+      </p:pic>
+      <p:sp>
+        <p:nvSpPr>
+          <p:cNvPr id="25" name="Right Arrow 24">
+            <a:extLst>
+              <a:ext uri="{FF2B5EF4-FFF2-40B4-BE49-F238E27FC236}">
+                <a16:creationId xmlns:a16="http://schemas.microsoft.com/office/drawing/2014/main" id="{805675BB-10BF-774F-85F3-B59050FBE809}"/>
+              </a:ext>
+            </a:extLst>
+          </p:cNvPr>
+          <p:cNvSpPr/>
+          <p:nvPr/>
+        </p:nvSpPr>
+        <p:spPr>
+          <a:xfrm>
+            <a:off x="2317457" y="5453438"/>
+            <a:ext cx="1097280" cy="182880"/>
+          </a:xfrm>
+          <a:prstGeom prst="rightArrow">
+            <a:avLst/>
+          </a:prstGeom>
+          <a:solidFill>
+            <a:schemeClr val="accent1">
+              <a:lumMod val="75000"/>
+            </a:schemeClr>
+          </a:solidFill>
+        </p:spPr>
+        <p:style>
+          <a:lnRef idx="2">
+            <a:schemeClr val="accent1">
+              <a:shade val="50000"/>
+            </a:schemeClr>
+          </a:lnRef>
+          <a:fillRef idx="1">
+            <a:schemeClr val="accent1"/>
+          </a:fillRef>
+          <a:effectRef idx="0">
+            <a:schemeClr val="accent1"/>
+          </a:effectRef>
+          <a:fontRef idx="minor">
+            <a:schemeClr val="lt1"/>
+          </a:fontRef>
+        </p:style>
+        <p:txBody>
+          <a:bodyPr rtlCol="0" anchor="ctr"/>
+          <a:lstStyle/>
+          <a:p>
+            <a:pPr algn="ctr"/>
+            <a:endParaRPr lang="en-US"/>
+          </a:p>
+        </p:txBody>
+      </p:sp>
       <p:grpSp>
         <p:nvGrpSpPr>
-          <p:cNvPr id="21" name="Group 20">
+          <p:cNvPr id="26" name="Group 25">
             <a:extLst>
               <a:ext uri="{FF2B5EF4-FFF2-40B4-BE49-F238E27FC236}">
-                <a16:creationId xmlns:a16="http://schemas.microsoft.com/office/drawing/2014/main" id="{C7509A3C-7145-B943-90B5-8FA2C42BF0DF}"/>
+                <a16:creationId xmlns:a16="http://schemas.microsoft.com/office/drawing/2014/main" id="{11C48470-85BC-B644-BC9A-5E12EFC1F6D5}"/>
               </a:ext>
             </a:extLst>
           </p:cNvPr>
@@ -6771,687 +6641,565 @@
         </p:nvGrpSpPr>
         <p:grpSpPr>
           <a:xfrm>
-            <a:off x="1703028" y="5103726"/>
-            <a:ext cx="5001406" cy="901924"/>
-            <a:chOff x="1703028" y="5165658"/>
-            <a:chExt cx="5001406" cy="901924"/>
+            <a:off x="492868" y="5773478"/>
+            <a:ext cx="731520" cy="295041"/>
+            <a:chOff x="9699621" y="3380438"/>
+            <a:chExt cx="731520" cy="295041"/>
           </a:xfrm>
         </p:grpSpPr>
-        <p:grpSp>
-          <p:nvGrpSpPr>
-            <p:cNvPr id="68" name="Group 67">
-              <a:extLst>
-                <a:ext uri="{FF2B5EF4-FFF2-40B4-BE49-F238E27FC236}">
-                  <a16:creationId xmlns:a16="http://schemas.microsoft.com/office/drawing/2014/main" id="{80038F7F-5487-DB41-AC1D-05C8BC59E350}"/>
-                </a:ext>
-              </a:extLst>
-            </p:cNvPr>
-            <p:cNvGrpSpPr/>
-            <p:nvPr/>
-          </p:nvGrpSpPr>
-          <p:grpSpPr>
-            <a:xfrm>
-              <a:off x="1703028" y="5165658"/>
-              <a:ext cx="1711709" cy="901924"/>
-              <a:chOff x="2622917" y="5458831"/>
-              <a:chExt cx="1711709" cy="901924"/>
-            </a:xfrm>
-          </p:grpSpPr>
-          <p:pic>
-            <p:nvPicPr>
-              <p:cNvPr id="24" name="Picture 23">
-                <a:extLst>
-                  <a:ext uri="{FF2B5EF4-FFF2-40B4-BE49-F238E27FC236}">
-                    <a16:creationId xmlns:a16="http://schemas.microsoft.com/office/drawing/2014/main" id="{BF3B4DBD-9F4A-774F-A45C-E43D7BF0873D}"/>
-                  </a:ext>
-                </a:extLst>
-              </p:cNvPr>
-              <p:cNvPicPr>
-                <a:picLocks noChangeAspect="1"/>
-              </p:cNvPicPr>
-              <p:nvPr/>
-            </p:nvPicPr>
-            <p:blipFill rotWithShape="1">
-              <a:blip r:embed="rId2"/>
-              <a:srcRect l="26302" t="1905" r="24095"/>
-              <a:stretch/>
-            </p:blipFill>
-            <p:spPr>
-              <a:xfrm>
-                <a:off x="2622917" y="5488503"/>
-                <a:ext cx="431549" cy="640080"/>
-              </a:xfrm>
-              <a:prstGeom prst="rect">
-                <a:avLst/>
-              </a:prstGeom>
-            </p:spPr>
-          </p:pic>
-          <p:sp>
-            <p:nvSpPr>
-              <p:cNvPr id="25" name="Right Arrow 24">
-                <a:extLst>
-                  <a:ext uri="{FF2B5EF4-FFF2-40B4-BE49-F238E27FC236}">
-                    <a16:creationId xmlns:a16="http://schemas.microsoft.com/office/drawing/2014/main" id="{805675BB-10BF-774F-85F3-B59050FBE809}"/>
-                  </a:ext>
-                </a:extLst>
-              </p:cNvPr>
-              <p:cNvSpPr/>
-              <p:nvPr/>
-            </p:nvSpPr>
-            <p:spPr>
-              <a:xfrm>
-                <a:off x="3237346" y="5808543"/>
-                <a:ext cx="1097280" cy="182880"/>
-              </a:xfrm>
-              <a:prstGeom prst="rightArrow">
-                <a:avLst/>
-              </a:prstGeom>
-              <a:solidFill>
-                <a:schemeClr val="accent1">
-                  <a:lumMod val="75000"/>
-                </a:schemeClr>
-              </a:solidFill>
-            </p:spPr>
-            <p:style>
-              <a:lnRef idx="2">
-                <a:schemeClr val="accent1">
-                  <a:shade val="50000"/>
-                </a:schemeClr>
-              </a:lnRef>
-              <a:fillRef idx="1">
-                <a:schemeClr val="accent1"/>
-              </a:fillRef>
-              <a:effectRef idx="0">
-                <a:schemeClr val="accent1"/>
-              </a:effectRef>
-              <a:fontRef idx="minor">
-                <a:schemeClr val="lt1"/>
-              </a:fontRef>
-            </p:style>
-            <p:txBody>
-              <a:bodyPr rtlCol="0" anchor="ctr"/>
-              <a:lstStyle/>
-              <a:p>
-                <a:pPr algn="ctr"/>
-                <a:endParaRPr lang="en-US"/>
-              </a:p>
-            </p:txBody>
-          </p:sp>
-          <p:grpSp>
-            <p:nvGrpSpPr>
-              <p:cNvPr id="26" name="Group 25">
-                <a:extLst>
-                  <a:ext uri="{FF2B5EF4-FFF2-40B4-BE49-F238E27FC236}">
-                    <a16:creationId xmlns:a16="http://schemas.microsoft.com/office/drawing/2014/main" id="{11C48470-85BC-B644-BC9A-5E12EFC1F6D5}"/>
-                  </a:ext>
-                </a:extLst>
-              </p:cNvPr>
-              <p:cNvGrpSpPr/>
-              <p:nvPr/>
-            </p:nvGrpSpPr>
-            <p:grpSpPr>
-              <a:xfrm>
-                <a:off x="3420226" y="5458831"/>
-                <a:ext cx="731520" cy="295041"/>
-                <a:chOff x="9699621" y="3380438"/>
-                <a:chExt cx="731520" cy="295041"/>
-              </a:xfrm>
-            </p:grpSpPr>
-            <p:sp>
-              <p:nvSpPr>
-                <p:cNvPr id="28" name="Cube 27">
-                  <a:extLst>
-                    <a:ext uri="{FF2B5EF4-FFF2-40B4-BE49-F238E27FC236}">
-                      <a16:creationId xmlns:a16="http://schemas.microsoft.com/office/drawing/2014/main" id="{9EC5B2A0-964F-4A46-BD43-4007C6FB44B1}"/>
-                    </a:ext>
-                  </a:extLst>
-                </p:cNvPr>
-                <p:cNvSpPr>
-                  <a:spLocks noChangeAspect="1"/>
-                </p:cNvSpPr>
-                <p:nvPr/>
-              </p:nvSpPr>
-              <p:spPr>
-                <a:xfrm>
-                  <a:off x="9882501" y="3492599"/>
-                  <a:ext cx="182880" cy="182880"/>
-                </a:xfrm>
-                <a:prstGeom prst="cube">
-                  <a:avLst/>
-                </a:prstGeom>
-                <a:solidFill>
-                  <a:schemeClr val="accent4">
-                    <a:lumMod val="75000"/>
-                  </a:schemeClr>
-                </a:solidFill>
-                <a:ln>
-                  <a:solidFill>
-                    <a:schemeClr val="tx1"/>
-                  </a:solidFill>
-                </a:ln>
-              </p:spPr>
-              <p:style>
-                <a:lnRef idx="2">
-                  <a:schemeClr val="accent1">
-                    <a:shade val="50000"/>
-                  </a:schemeClr>
-                </a:lnRef>
-                <a:fillRef idx="1">
-                  <a:schemeClr val="accent1"/>
-                </a:fillRef>
-                <a:effectRef idx="0">
-                  <a:schemeClr val="accent1"/>
-                </a:effectRef>
-                <a:fontRef idx="minor">
-                  <a:schemeClr val="lt1"/>
-                </a:fontRef>
-              </p:style>
-              <p:txBody>
-                <a:bodyPr rtlCol="0" anchor="ctr"/>
-                <a:lstStyle/>
-                <a:p>
-                  <a:pPr algn="ctr"/>
-                  <a:endParaRPr lang="en-US"/>
-                </a:p>
-              </p:txBody>
-            </p:sp>
-            <p:sp>
-              <p:nvSpPr>
-                <p:cNvPr id="29" name="Cube 28">
-                  <a:extLst>
-                    <a:ext uri="{FF2B5EF4-FFF2-40B4-BE49-F238E27FC236}">
-                      <a16:creationId xmlns:a16="http://schemas.microsoft.com/office/drawing/2014/main" id="{B6FA68AD-5BB6-5B4F-9724-1A21D4F4C8DA}"/>
-                    </a:ext>
-                  </a:extLst>
-                </p:cNvPr>
-                <p:cNvSpPr>
-                  <a:spLocks noChangeAspect="1"/>
-                </p:cNvSpPr>
-                <p:nvPr/>
-              </p:nvSpPr>
-              <p:spPr>
-                <a:xfrm>
-                  <a:off x="10065381" y="3492599"/>
-                  <a:ext cx="182880" cy="182880"/>
-                </a:xfrm>
-                <a:prstGeom prst="cube">
-                  <a:avLst/>
-                </a:prstGeom>
-                <a:solidFill>
-                  <a:schemeClr val="accent4">
-                    <a:lumMod val="75000"/>
-                  </a:schemeClr>
-                </a:solidFill>
-                <a:ln>
-                  <a:solidFill>
-                    <a:schemeClr val="tx1"/>
-                  </a:solidFill>
-                </a:ln>
-              </p:spPr>
-              <p:style>
-                <a:lnRef idx="2">
-                  <a:schemeClr val="accent1">
-                    <a:shade val="50000"/>
-                  </a:schemeClr>
-                </a:lnRef>
-                <a:fillRef idx="1">
-                  <a:schemeClr val="accent1"/>
-                </a:fillRef>
-                <a:effectRef idx="0">
-                  <a:schemeClr val="accent1"/>
-                </a:effectRef>
-                <a:fontRef idx="minor">
-                  <a:schemeClr val="lt1"/>
-                </a:fontRef>
-              </p:style>
-              <p:txBody>
-                <a:bodyPr rtlCol="0" anchor="ctr"/>
-                <a:lstStyle/>
-                <a:p>
-                  <a:pPr algn="ctr"/>
-                  <a:endParaRPr lang="en-US"/>
-                </a:p>
-              </p:txBody>
-            </p:sp>
-            <p:sp>
-              <p:nvSpPr>
-                <p:cNvPr id="30" name="Cube 29">
-                  <a:extLst>
-                    <a:ext uri="{FF2B5EF4-FFF2-40B4-BE49-F238E27FC236}">
-                      <a16:creationId xmlns:a16="http://schemas.microsoft.com/office/drawing/2014/main" id="{F03894EA-CA90-F544-BCB3-2ED0204FCA04}"/>
-                    </a:ext>
-                  </a:extLst>
-                </p:cNvPr>
-                <p:cNvSpPr>
-                  <a:spLocks noChangeAspect="1"/>
-                </p:cNvSpPr>
-                <p:nvPr/>
-              </p:nvSpPr>
-              <p:spPr>
-                <a:xfrm>
-                  <a:off x="9882501" y="3380438"/>
-                  <a:ext cx="182880" cy="182880"/>
-                </a:xfrm>
-                <a:prstGeom prst="cube">
-                  <a:avLst/>
-                </a:prstGeom>
-                <a:solidFill>
-                  <a:schemeClr val="accent4">
-                    <a:lumMod val="75000"/>
-                  </a:schemeClr>
-                </a:solidFill>
-                <a:ln>
-                  <a:solidFill>
-                    <a:schemeClr val="tx1"/>
-                  </a:solidFill>
-                </a:ln>
-              </p:spPr>
-              <p:style>
-                <a:lnRef idx="2">
-                  <a:schemeClr val="accent1">
-                    <a:shade val="50000"/>
-                  </a:schemeClr>
-                </a:lnRef>
-                <a:fillRef idx="1">
-                  <a:schemeClr val="accent1"/>
-                </a:fillRef>
-                <a:effectRef idx="0">
-                  <a:schemeClr val="accent1"/>
-                </a:effectRef>
-                <a:fontRef idx="minor">
-                  <a:schemeClr val="lt1"/>
-                </a:fontRef>
-              </p:style>
-              <p:txBody>
-                <a:bodyPr rtlCol="0" anchor="ctr"/>
-                <a:lstStyle/>
-                <a:p>
-                  <a:pPr algn="ctr"/>
-                  <a:endParaRPr lang="en-US"/>
-                </a:p>
-              </p:txBody>
-            </p:sp>
-            <p:sp>
-              <p:nvSpPr>
-                <p:cNvPr id="31" name="Cube 30">
-                  <a:extLst>
-                    <a:ext uri="{FF2B5EF4-FFF2-40B4-BE49-F238E27FC236}">
-                      <a16:creationId xmlns:a16="http://schemas.microsoft.com/office/drawing/2014/main" id="{AE67F440-C6FA-2A45-9E12-FD3C7302834D}"/>
-                    </a:ext>
-                  </a:extLst>
-                </p:cNvPr>
-                <p:cNvSpPr>
-                  <a:spLocks noChangeAspect="1"/>
-                </p:cNvSpPr>
-                <p:nvPr/>
-              </p:nvSpPr>
-              <p:spPr>
-                <a:xfrm>
-                  <a:off x="10065381" y="3380438"/>
-                  <a:ext cx="182880" cy="182880"/>
-                </a:xfrm>
-                <a:prstGeom prst="cube">
-                  <a:avLst/>
-                </a:prstGeom>
-                <a:solidFill>
-                  <a:schemeClr val="accent4">
-                    <a:lumMod val="75000"/>
-                  </a:schemeClr>
-                </a:solidFill>
-                <a:ln>
-                  <a:solidFill>
-                    <a:schemeClr val="tx1"/>
-                  </a:solidFill>
-                </a:ln>
-              </p:spPr>
-              <p:style>
-                <a:lnRef idx="2">
-                  <a:schemeClr val="accent1">
-                    <a:shade val="50000"/>
-                  </a:schemeClr>
-                </a:lnRef>
-                <a:fillRef idx="1">
-                  <a:schemeClr val="accent1"/>
-                </a:fillRef>
-                <a:effectRef idx="0">
-                  <a:schemeClr val="accent1"/>
-                </a:effectRef>
-                <a:fontRef idx="minor">
-                  <a:schemeClr val="lt1"/>
-                </a:fontRef>
-              </p:style>
-              <p:txBody>
-                <a:bodyPr rtlCol="0" anchor="ctr"/>
-                <a:lstStyle/>
-                <a:p>
-                  <a:pPr algn="ctr"/>
-                  <a:endParaRPr lang="en-US"/>
-                </a:p>
-              </p:txBody>
-            </p:sp>
-            <p:sp>
-              <p:nvSpPr>
-                <p:cNvPr id="32" name="Cube 31">
-                  <a:extLst>
-                    <a:ext uri="{FF2B5EF4-FFF2-40B4-BE49-F238E27FC236}">
-                      <a16:creationId xmlns:a16="http://schemas.microsoft.com/office/drawing/2014/main" id="{96654F06-5A69-1B42-B0A2-4A862A79DEC4}"/>
-                    </a:ext>
-                  </a:extLst>
-                </p:cNvPr>
-                <p:cNvSpPr>
-                  <a:spLocks noChangeAspect="1"/>
-                </p:cNvSpPr>
-                <p:nvPr/>
-              </p:nvSpPr>
-              <p:spPr>
-                <a:xfrm>
-                  <a:off x="10248261" y="3492599"/>
-                  <a:ext cx="182880" cy="182880"/>
-                </a:xfrm>
-                <a:prstGeom prst="cube">
-                  <a:avLst/>
-                </a:prstGeom>
-                <a:solidFill>
-                  <a:schemeClr val="accent4">
-                    <a:lumMod val="75000"/>
-                  </a:schemeClr>
-                </a:solidFill>
-                <a:ln>
-                  <a:solidFill>
-                    <a:schemeClr val="tx1"/>
-                  </a:solidFill>
-                </a:ln>
-              </p:spPr>
-              <p:style>
-                <a:lnRef idx="2">
-                  <a:schemeClr val="accent1">
-                    <a:shade val="50000"/>
-                  </a:schemeClr>
-                </a:lnRef>
-                <a:fillRef idx="1">
-                  <a:schemeClr val="accent1"/>
-                </a:fillRef>
-                <a:effectRef idx="0">
-                  <a:schemeClr val="accent1"/>
-                </a:effectRef>
-                <a:fontRef idx="minor">
-                  <a:schemeClr val="lt1"/>
-                </a:fontRef>
-              </p:style>
-              <p:txBody>
-                <a:bodyPr rtlCol="0" anchor="ctr"/>
-                <a:lstStyle/>
-                <a:p>
-                  <a:pPr algn="ctr"/>
-                  <a:endParaRPr lang="en-US"/>
-                </a:p>
-              </p:txBody>
-            </p:sp>
-            <p:sp>
-              <p:nvSpPr>
-                <p:cNvPr id="33" name="Cube 32">
-                  <a:extLst>
-                    <a:ext uri="{FF2B5EF4-FFF2-40B4-BE49-F238E27FC236}">
-                      <a16:creationId xmlns:a16="http://schemas.microsoft.com/office/drawing/2014/main" id="{574A102E-4A0C-B34E-B838-B65B99E87D2B}"/>
-                    </a:ext>
-                  </a:extLst>
-                </p:cNvPr>
-                <p:cNvSpPr>
-                  <a:spLocks noChangeAspect="1"/>
-                </p:cNvSpPr>
-                <p:nvPr/>
-              </p:nvSpPr>
-              <p:spPr>
-                <a:xfrm>
-                  <a:off x="10248261" y="3380438"/>
-                  <a:ext cx="182880" cy="182880"/>
-                </a:xfrm>
-                <a:prstGeom prst="cube">
-                  <a:avLst/>
-                </a:prstGeom>
-                <a:solidFill>
-                  <a:schemeClr val="accent4">
-                    <a:lumMod val="75000"/>
-                  </a:schemeClr>
-                </a:solidFill>
-                <a:ln>
-                  <a:solidFill>
-                    <a:schemeClr val="tx1"/>
-                  </a:solidFill>
-                </a:ln>
-              </p:spPr>
-              <p:style>
-                <a:lnRef idx="2">
-                  <a:schemeClr val="accent1">
-                    <a:shade val="50000"/>
-                  </a:schemeClr>
-                </a:lnRef>
-                <a:fillRef idx="1">
-                  <a:schemeClr val="accent1"/>
-                </a:fillRef>
-                <a:effectRef idx="0">
-                  <a:schemeClr val="accent1"/>
-                </a:effectRef>
-                <a:fontRef idx="minor">
-                  <a:schemeClr val="lt1"/>
-                </a:fontRef>
-              </p:style>
-              <p:txBody>
-                <a:bodyPr rtlCol="0" anchor="ctr"/>
-                <a:lstStyle/>
-                <a:p>
-                  <a:pPr algn="ctr"/>
-                  <a:endParaRPr lang="en-US"/>
-                </a:p>
-              </p:txBody>
-            </p:sp>
-            <p:sp>
-              <p:nvSpPr>
-                <p:cNvPr id="34" name="Cube 33">
-                  <a:extLst>
-                    <a:ext uri="{FF2B5EF4-FFF2-40B4-BE49-F238E27FC236}">
-                      <a16:creationId xmlns:a16="http://schemas.microsoft.com/office/drawing/2014/main" id="{03BD5E90-6A6C-E64A-980F-F8971CE9BD5C}"/>
-                    </a:ext>
-                  </a:extLst>
-                </p:cNvPr>
-                <p:cNvSpPr>
-                  <a:spLocks noChangeAspect="1"/>
-                </p:cNvSpPr>
-                <p:nvPr/>
-              </p:nvSpPr>
-              <p:spPr>
-                <a:xfrm>
-                  <a:off x="9699621" y="3492599"/>
-                  <a:ext cx="182880" cy="182880"/>
-                </a:xfrm>
-                <a:prstGeom prst="cube">
-                  <a:avLst/>
-                </a:prstGeom>
-                <a:solidFill>
-                  <a:schemeClr val="accent4">
-                    <a:lumMod val="75000"/>
-                  </a:schemeClr>
-                </a:solidFill>
-                <a:ln>
-                  <a:solidFill>
-                    <a:schemeClr val="tx1"/>
-                  </a:solidFill>
-                </a:ln>
-              </p:spPr>
-              <p:style>
-                <a:lnRef idx="2">
-                  <a:schemeClr val="accent1">
-                    <a:shade val="50000"/>
-                  </a:schemeClr>
-                </a:lnRef>
-                <a:fillRef idx="1">
-                  <a:schemeClr val="accent1"/>
-                </a:fillRef>
-                <a:effectRef idx="0">
-                  <a:schemeClr val="accent1"/>
-                </a:effectRef>
-                <a:fontRef idx="minor">
-                  <a:schemeClr val="lt1"/>
-                </a:fontRef>
-              </p:style>
-              <p:txBody>
-                <a:bodyPr rtlCol="0" anchor="ctr"/>
-                <a:lstStyle/>
-                <a:p>
-                  <a:pPr algn="ctr"/>
-                  <a:endParaRPr lang="en-US"/>
-                </a:p>
-              </p:txBody>
-            </p:sp>
-            <p:sp>
-              <p:nvSpPr>
-                <p:cNvPr id="35" name="Cube 34">
-                  <a:extLst>
-                    <a:ext uri="{FF2B5EF4-FFF2-40B4-BE49-F238E27FC236}">
-                      <a16:creationId xmlns:a16="http://schemas.microsoft.com/office/drawing/2014/main" id="{C897A663-6A15-9E4C-AA84-E9AD76D9C1EF}"/>
-                    </a:ext>
-                  </a:extLst>
-                </p:cNvPr>
-                <p:cNvSpPr>
-                  <a:spLocks noChangeAspect="1"/>
-                </p:cNvSpPr>
-                <p:nvPr/>
-              </p:nvSpPr>
-              <p:spPr>
-                <a:xfrm>
-                  <a:off x="9699621" y="3380438"/>
-                  <a:ext cx="182880" cy="182880"/>
-                </a:xfrm>
-                <a:prstGeom prst="cube">
-                  <a:avLst/>
-                </a:prstGeom>
-                <a:solidFill>
-                  <a:schemeClr val="accent4">
-                    <a:lumMod val="75000"/>
-                  </a:schemeClr>
-                </a:solidFill>
-                <a:ln>
-                  <a:solidFill>
-                    <a:schemeClr val="tx1"/>
-                  </a:solidFill>
-                </a:ln>
-              </p:spPr>
-              <p:style>
-                <a:lnRef idx="2">
-                  <a:schemeClr val="accent1">
-                    <a:shade val="50000"/>
-                  </a:schemeClr>
-                </a:lnRef>
-                <a:fillRef idx="1">
-                  <a:schemeClr val="accent1"/>
-                </a:fillRef>
-                <a:effectRef idx="0">
-                  <a:schemeClr val="accent1"/>
-                </a:effectRef>
-                <a:fontRef idx="minor">
-                  <a:schemeClr val="lt1"/>
-                </a:fontRef>
-              </p:style>
-              <p:txBody>
-                <a:bodyPr rtlCol="0" anchor="ctr"/>
-                <a:lstStyle/>
-                <a:p>
-                  <a:pPr algn="ctr"/>
-                  <a:endParaRPr lang="en-US"/>
-                </a:p>
-              </p:txBody>
-            </p:sp>
-          </p:grpSp>
-          <p:sp>
-            <p:nvSpPr>
-              <p:cNvPr id="27" name="TextBox 26">
-                <a:extLst>
-                  <a:ext uri="{FF2B5EF4-FFF2-40B4-BE49-F238E27FC236}">
-                    <a16:creationId xmlns:a16="http://schemas.microsoft.com/office/drawing/2014/main" id="{A386CAFB-001D-9F46-9946-47747C13FFDC}"/>
-                  </a:ext>
-                </a:extLst>
-              </p:cNvPr>
-              <p:cNvSpPr txBox="1"/>
-              <p:nvPr/>
-            </p:nvSpPr>
-            <p:spPr>
-              <a:xfrm>
-                <a:off x="3341601" y="5991423"/>
-                <a:ext cx="888769" cy="369332"/>
-              </a:xfrm>
-              <a:prstGeom prst="rect">
-                <a:avLst/>
-              </a:prstGeom>
-              <a:noFill/>
-            </p:spPr>
-            <p:txBody>
-              <a:bodyPr wrap="none" rtlCol="0">
-                <a:spAutoFit/>
-              </a:bodyPr>
-              <a:lstStyle/>
-              <a:p>
-                <a:r>
-                  <a:rPr lang="en-US" dirty="0"/>
-                  <a:t>0.7 m/s</a:t>
-                </a:r>
-              </a:p>
-            </p:txBody>
-          </p:sp>
-        </p:grpSp>
         <p:sp>
           <p:nvSpPr>
-            <p:cNvPr id="23" name="TextBox 22">
-              <a:extLst>
-                <a:ext uri="{FF2B5EF4-FFF2-40B4-BE49-F238E27FC236}">
-                  <a16:creationId xmlns:a16="http://schemas.microsoft.com/office/drawing/2014/main" id="{45CF74BF-BE64-6140-AD72-FBFB84102CA1}"/>
-                </a:ext>
-              </a:extLst>
-            </p:cNvPr>
-            <p:cNvSpPr txBox="1"/>
+            <p:cNvPr id="28" name="Cube 27">
+              <a:extLst>
+                <a:ext uri="{FF2B5EF4-FFF2-40B4-BE49-F238E27FC236}">
+                  <a16:creationId xmlns:a16="http://schemas.microsoft.com/office/drawing/2014/main" id="{9EC5B2A0-964F-4A46-BD43-4007C6FB44B1}"/>
+                </a:ext>
+              </a:extLst>
+            </p:cNvPr>
+            <p:cNvSpPr>
+              <a:spLocks noChangeAspect="1"/>
+            </p:cNvSpPr>
             <p:nvPr/>
           </p:nvSpPr>
           <p:spPr>
             <a:xfrm>
-              <a:off x="3529975" y="5262677"/>
-              <a:ext cx="3174459" cy="707886"/>
-            </a:xfrm>
-            <a:prstGeom prst="rect">
+              <a:off x="9882501" y="3492599"/>
+              <a:ext cx="182880" cy="182880"/>
+            </a:xfrm>
+            <a:prstGeom prst="cube">
               <a:avLst/>
             </a:prstGeom>
-            <a:noFill/>
+            <a:solidFill>
+              <a:schemeClr val="accent4">
+                <a:lumMod val="75000"/>
+              </a:schemeClr>
+            </a:solidFill>
+            <a:ln>
+              <a:solidFill>
+                <a:schemeClr val="tx1"/>
+              </a:solidFill>
+            </a:ln>
           </p:spPr>
+          <p:style>
+            <a:lnRef idx="2">
+              <a:schemeClr val="accent1">
+                <a:shade val="50000"/>
+              </a:schemeClr>
+            </a:lnRef>
+            <a:fillRef idx="1">
+              <a:schemeClr val="accent1"/>
+            </a:fillRef>
+            <a:effectRef idx="0">
+              <a:schemeClr val="accent1"/>
+            </a:effectRef>
+            <a:fontRef idx="minor">
+              <a:schemeClr val="lt1"/>
+            </a:fontRef>
+          </p:style>
           <p:txBody>
-            <a:bodyPr wrap="none" rtlCol="0">
-              <a:spAutoFit/>
-            </a:bodyPr>
+            <a:bodyPr rtlCol="0" anchor="ctr"/>
             <a:lstStyle/>
             <a:p>
-              <a:r>
-                <a:rPr lang="en-US" sz="2000" dirty="0"/>
-                <a:t>Probability of collision = </a:t>
-              </a:r>
-              <a:r>
-                <a:rPr lang="en-US" sz="2000" b="1" dirty="0"/>
-                <a:t>40%</a:t>
-              </a:r>
+              <a:pPr algn="ctr"/>
+              <a:endParaRPr lang="en-US"/>
             </a:p>
+          </p:txBody>
+        </p:sp>
+        <p:sp>
+          <p:nvSpPr>
+            <p:cNvPr id="29" name="Cube 28">
+              <a:extLst>
+                <a:ext uri="{FF2B5EF4-FFF2-40B4-BE49-F238E27FC236}">
+                  <a16:creationId xmlns:a16="http://schemas.microsoft.com/office/drawing/2014/main" id="{B6FA68AD-5BB6-5B4F-9724-1A21D4F4C8DA}"/>
+                </a:ext>
+              </a:extLst>
+            </p:cNvPr>
+            <p:cNvSpPr>
+              <a:spLocks noChangeAspect="1"/>
+            </p:cNvSpPr>
+            <p:nvPr/>
+          </p:nvSpPr>
+          <p:spPr>
+            <a:xfrm>
+              <a:off x="10065381" y="3492599"/>
+              <a:ext cx="182880" cy="182880"/>
+            </a:xfrm>
+            <a:prstGeom prst="cube">
+              <a:avLst/>
+            </a:prstGeom>
+            <a:solidFill>
+              <a:schemeClr val="accent4">
+                <a:lumMod val="75000"/>
+              </a:schemeClr>
+            </a:solidFill>
+            <a:ln>
+              <a:solidFill>
+                <a:schemeClr val="tx1"/>
+              </a:solidFill>
+            </a:ln>
+          </p:spPr>
+          <p:style>
+            <a:lnRef idx="2">
+              <a:schemeClr val="accent1">
+                <a:shade val="50000"/>
+              </a:schemeClr>
+            </a:lnRef>
+            <a:fillRef idx="1">
+              <a:schemeClr val="accent1"/>
+            </a:fillRef>
+            <a:effectRef idx="0">
+              <a:schemeClr val="accent1"/>
+            </a:effectRef>
+            <a:fontRef idx="minor">
+              <a:schemeClr val="lt1"/>
+            </a:fontRef>
+          </p:style>
+          <p:txBody>
+            <a:bodyPr rtlCol="0" anchor="ctr"/>
+            <a:lstStyle/>
             <a:p>
-              <a:r>
-                <a:rPr lang="en-US" sz="2000" dirty="0"/>
-                <a:t>(Expected collision = </a:t>
-              </a:r>
-              <a:r>
-                <a:rPr lang="en-US" sz="2000" b="1" dirty="0"/>
-                <a:t>0.4</a:t>
-              </a:r>
-              <a:r>
-                <a:rPr lang="en-US" sz="2000" dirty="0"/>
-                <a:t>)</a:t>
-              </a:r>
+              <a:pPr algn="ctr"/>
+              <a:endParaRPr lang="en-US"/>
+            </a:p>
+          </p:txBody>
+        </p:sp>
+        <p:sp>
+          <p:nvSpPr>
+            <p:cNvPr id="30" name="Cube 29">
+              <a:extLst>
+                <a:ext uri="{FF2B5EF4-FFF2-40B4-BE49-F238E27FC236}">
+                  <a16:creationId xmlns:a16="http://schemas.microsoft.com/office/drawing/2014/main" id="{F03894EA-CA90-F544-BCB3-2ED0204FCA04}"/>
+                </a:ext>
+              </a:extLst>
+            </p:cNvPr>
+            <p:cNvSpPr>
+              <a:spLocks noChangeAspect="1"/>
+            </p:cNvSpPr>
+            <p:nvPr/>
+          </p:nvSpPr>
+          <p:spPr>
+            <a:xfrm>
+              <a:off x="9882501" y="3380438"/>
+              <a:ext cx="182880" cy="182880"/>
+            </a:xfrm>
+            <a:prstGeom prst="cube">
+              <a:avLst/>
+            </a:prstGeom>
+            <a:solidFill>
+              <a:schemeClr val="accent4">
+                <a:lumMod val="75000"/>
+              </a:schemeClr>
+            </a:solidFill>
+            <a:ln>
+              <a:solidFill>
+                <a:schemeClr val="tx1"/>
+              </a:solidFill>
+            </a:ln>
+          </p:spPr>
+          <p:style>
+            <a:lnRef idx="2">
+              <a:schemeClr val="accent1">
+                <a:shade val="50000"/>
+              </a:schemeClr>
+            </a:lnRef>
+            <a:fillRef idx="1">
+              <a:schemeClr val="accent1"/>
+            </a:fillRef>
+            <a:effectRef idx="0">
+              <a:schemeClr val="accent1"/>
+            </a:effectRef>
+            <a:fontRef idx="minor">
+              <a:schemeClr val="lt1"/>
+            </a:fontRef>
+          </p:style>
+          <p:txBody>
+            <a:bodyPr rtlCol="0" anchor="ctr"/>
+            <a:lstStyle/>
+            <a:p>
+              <a:pPr algn="ctr"/>
+              <a:endParaRPr lang="en-US"/>
+            </a:p>
+          </p:txBody>
+        </p:sp>
+        <p:sp>
+          <p:nvSpPr>
+            <p:cNvPr id="31" name="Cube 30">
+              <a:extLst>
+                <a:ext uri="{FF2B5EF4-FFF2-40B4-BE49-F238E27FC236}">
+                  <a16:creationId xmlns:a16="http://schemas.microsoft.com/office/drawing/2014/main" id="{AE67F440-C6FA-2A45-9E12-FD3C7302834D}"/>
+                </a:ext>
+              </a:extLst>
+            </p:cNvPr>
+            <p:cNvSpPr>
+              <a:spLocks noChangeAspect="1"/>
+            </p:cNvSpPr>
+            <p:nvPr/>
+          </p:nvSpPr>
+          <p:spPr>
+            <a:xfrm>
+              <a:off x="10065381" y="3380438"/>
+              <a:ext cx="182880" cy="182880"/>
+            </a:xfrm>
+            <a:prstGeom prst="cube">
+              <a:avLst/>
+            </a:prstGeom>
+            <a:solidFill>
+              <a:schemeClr val="accent4">
+                <a:lumMod val="75000"/>
+              </a:schemeClr>
+            </a:solidFill>
+            <a:ln>
+              <a:solidFill>
+                <a:schemeClr val="tx1"/>
+              </a:solidFill>
+            </a:ln>
+          </p:spPr>
+          <p:style>
+            <a:lnRef idx="2">
+              <a:schemeClr val="accent1">
+                <a:shade val="50000"/>
+              </a:schemeClr>
+            </a:lnRef>
+            <a:fillRef idx="1">
+              <a:schemeClr val="accent1"/>
+            </a:fillRef>
+            <a:effectRef idx="0">
+              <a:schemeClr val="accent1"/>
+            </a:effectRef>
+            <a:fontRef idx="minor">
+              <a:schemeClr val="lt1"/>
+            </a:fontRef>
+          </p:style>
+          <p:txBody>
+            <a:bodyPr rtlCol="0" anchor="ctr"/>
+            <a:lstStyle/>
+            <a:p>
+              <a:pPr algn="ctr"/>
+              <a:endParaRPr lang="en-US"/>
+            </a:p>
+          </p:txBody>
+        </p:sp>
+        <p:sp>
+          <p:nvSpPr>
+            <p:cNvPr id="32" name="Cube 31">
+              <a:extLst>
+                <a:ext uri="{FF2B5EF4-FFF2-40B4-BE49-F238E27FC236}">
+                  <a16:creationId xmlns:a16="http://schemas.microsoft.com/office/drawing/2014/main" id="{96654F06-5A69-1B42-B0A2-4A862A79DEC4}"/>
+                </a:ext>
+              </a:extLst>
+            </p:cNvPr>
+            <p:cNvSpPr>
+              <a:spLocks noChangeAspect="1"/>
+            </p:cNvSpPr>
+            <p:nvPr/>
+          </p:nvSpPr>
+          <p:spPr>
+            <a:xfrm>
+              <a:off x="10248261" y="3492599"/>
+              <a:ext cx="182880" cy="182880"/>
+            </a:xfrm>
+            <a:prstGeom prst="cube">
+              <a:avLst/>
+            </a:prstGeom>
+            <a:solidFill>
+              <a:schemeClr val="accent4">
+                <a:lumMod val="75000"/>
+              </a:schemeClr>
+            </a:solidFill>
+            <a:ln>
+              <a:solidFill>
+                <a:schemeClr val="tx1"/>
+              </a:solidFill>
+            </a:ln>
+          </p:spPr>
+          <p:style>
+            <a:lnRef idx="2">
+              <a:schemeClr val="accent1">
+                <a:shade val="50000"/>
+              </a:schemeClr>
+            </a:lnRef>
+            <a:fillRef idx="1">
+              <a:schemeClr val="accent1"/>
+            </a:fillRef>
+            <a:effectRef idx="0">
+              <a:schemeClr val="accent1"/>
+            </a:effectRef>
+            <a:fontRef idx="minor">
+              <a:schemeClr val="lt1"/>
+            </a:fontRef>
+          </p:style>
+          <p:txBody>
+            <a:bodyPr rtlCol="0" anchor="ctr"/>
+            <a:lstStyle/>
+            <a:p>
+              <a:pPr algn="ctr"/>
+              <a:endParaRPr lang="en-US"/>
+            </a:p>
+          </p:txBody>
+        </p:sp>
+        <p:sp>
+          <p:nvSpPr>
+            <p:cNvPr id="33" name="Cube 32">
+              <a:extLst>
+                <a:ext uri="{FF2B5EF4-FFF2-40B4-BE49-F238E27FC236}">
+                  <a16:creationId xmlns:a16="http://schemas.microsoft.com/office/drawing/2014/main" id="{574A102E-4A0C-B34E-B838-B65B99E87D2B}"/>
+                </a:ext>
+              </a:extLst>
+            </p:cNvPr>
+            <p:cNvSpPr>
+              <a:spLocks noChangeAspect="1"/>
+            </p:cNvSpPr>
+            <p:nvPr/>
+          </p:nvSpPr>
+          <p:spPr>
+            <a:xfrm>
+              <a:off x="10248261" y="3380438"/>
+              <a:ext cx="182880" cy="182880"/>
+            </a:xfrm>
+            <a:prstGeom prst="cube">
+              <a:avLst/>
+            </a:prstGeom>
+            <a:solidFill>
+              <a:schemeClr val="accent4">
+                <a:lumMod val="75000"/>
+              </a:schemeClr>
+            </a:solidFill>
+            <a:ln>
+              <a:solidFill>
+                <a:schemeClr val="tx1"/>
+              </a:solidFill>
+            </a:ln>
+          </p:spPr>
+          <p:style>
+            <a:lnRef idx="2">
+              <a:schemeClr val="accent1">
+                <a:shade val="50000"/>
+              </a:schemeClr>
+            </a:lnRef>
+            <a:fillRef idx="1">
+              <a:schemeClr val="accent1"/>
+            </a:fillRef>
+            <a:effectRef idx="0">
+              <a:schemeClr val="accent1"/>
+            </a:effectRef>
+            <a:fontRef idx="minor">
+              <a:schemeClr val="lt1"/>
+            </a:fontRef>
+          </p:style>
+          <p:txBody>
+            <a:bodyPr rtlCol="0" anchor="ctr"/>
+            <a:lstStyle/>
+            <a:p>
+              <a:pPr algn="ctr"/>
+              <a:endParaRPr lang="en-US"/>
+            </a:p>
+          </p:txBody>
+        </p:sp>
+        <p:sp>
+          <p:nvSpPr>
+            <p:cNvPr id="34" name="Cube 33">
+              <a:extLst>
+                <a:ext uri="{FF2B5EF4-FFF2-40B4-BE49-F238E27FC236}">
+                  <a16:creationId xmlns:a16="http://schemas.microsoft.com/office/drawing/2014/main" id="{03BD5E90-6A6C-E64A-980F-F8971CE9BD5C}"/>
+                </a:ext>
+              </a:extLst>
+            </p:cNvPr>
+            <p:cNvSpPr>
+              <a:spLocks noChangeAspect="1"/>
+            </p:cNvSpPr>
+            <p:nvPr/>
+          </p:nvSpPr>
+          <p:spPr>
+            <a:xfrm>
+              <a:off x="9699621" y="3492599"/>
+              <a:ext cx="182880" cy="182880"/>
+            </a:xfrm>
+            <a:prstGeom prst="cube">
+              <a:avLst/>
+            </a:prstGeom>
+            <a:solidFill>
+              <a:schemeClr val="accent4">
+                <a:lumMod val="75000"/>
+              </a:schemeClr>
+            </a:solidFill>
+            <a:ln>
+              <a:solidFill>
+                <a:schemeClr val="tx1"/>
+              </a:solidFill>
+            </a:ln>
+          </p:spPr>
+          <p:style>
+            <a:lnRef idx="2">
+              <a:schemeClr val="accent1">
+                <a:shade val="50000"/>
+              </a:schemeClr>
+            </a:lnRef>
+            <a:fillRef idx="1">
+              <a:schemeClr val="accent1"/>
+            </a:fillRef>
+            <a:effectRef idx="0">
+              <a:schemeClr val="accent1"/>
+            </a:effectRef>
+            <a:fontRef idx="minor">
+              <a:schemeClr val="lt1"/>
+            </a:fontRef>
+          </p:style>
+          <p:txBody>
+            <a:bodyPr rtlCol="0" anchor="ctr"/>
+            <a:lstStyle/>
+            <a:p>
+              <a:pPr algn="ctr"/>
+              <a:endParaRPr lang="en-US"/>
+            </a:p>
+          </p:txBody>
+        </p:sp>
+        <p:sp>
+          <p:nvSpPr>
+            <p:cNvPr id="35" name="Cube 34">
+              <a:extLst>
+                <a:ext uri="{FF2B5EF4-FFF2-40B4-BE49-F238E27FC236}">
+                  <a16:creationId xmlns:a16="http://schemas.microsoft.com/office/drawing/2014/main" id="{C897A663-6A15-9E4C-AA84-E9AD76D9C1EF}"/>
+                </a:ext>
+              </a:extLst>
+            </p:cNvPr>
+            <p:cNvSpPr>
+              <a:spLocks noChangeAspect="1"/>
+            </p:cNvSpPr>
+            <p:nvPr/>
+          </p:nvSpPr>
+          <p:spPr>
+            <a:xfrm>
+              <a:off x="9699621" y="3380438"/>
+              <a:ext cx="182880" cy="182880"/>
+            </a:xfrm>
+            <a:prstGeom prst="cube">
+              <a:avLst/>
+            </a:prstGeom>
+            <a:solidFill>
+              <a:schemeClr val="accent4">
+                <a:lumMod val="75000"/>
+              </a:schemeClr>
+            </a:solidFill>
+            <a:ln>
+              <a:solidFill>
+                <a:schemeClr val="tx1"/>
+              </a:solidFill>
+            </a:ln>
+          </p:spPr>
+          <p:style>
+            <a:lnRef idx="2">
+              <a:schemeClr val="accent1">
+                <a:shade val="50000"/>
+              </a:schemeClr>
+            </a:lnRef>
+            <a:fillRef idx="1">
+              <a:schemeClr val="accent1"/>
+            </a:fillRef>
+            <a:effectRef idx="0">
+              <a:schemeClr val="accent1"/>
+            </a:effectRef>
+            <a:fontRef idx="minor">
+              <a:schemeClr val="lt1"/>
+            </a:fontRef>
+          </p:style>
+          <p:txBody>
+            <a:bodyPr rtlCol="0" anchor="ctr"/>
+            <a:lstStyle/>
+            <a:p>
+              <a:pPr algn="ctr"/>
+              <a:endParaRPr lang="en-US"/>
             </a:p>
           </p:txBody>
         </p:sp>
       </p:grpSp>
+      <p:sp>
+        <p:nvSpPr>
+          <p:cNvPr id="27" name="TextBox 26">
+            <a:extLst>
+              <a:ext uri="{FF2B5EF4-FFF2-40B4-BE49-F238E27FC236}">
+                <a16:creationId xmlns:a16="http://schemas.microsoft.com/office/drawing/2014/main" id="{A386CAFB-001D-9F46-9946-47747C13FFDC}"/>
+              </a:ext>
+            </a:extLst>
+          </p:cNvPr>
+          <p:cNvSpPr txBox="1"/>
+          <p:nvPr/>
+        </p:nvSpPr>
+        <p:spPr>
+          <a:xfrm>
+            <a:off x="2421712" y="5636318"/>
+            <a:ext cx="888769" cy="369332"/>
+          </a:xfrm>
+          <a:prstGeom prst="rect">
+            <a:avLst/>
+          </a:prstGeom>
+          <a:noFill/>
+        </p:spPr>
+        <p:txBody>
+          <a:bodyPr wrap="none" rtlCol="0">
+            <a:spAutoFit/>
+          </a:bodyPr>
+          <a:lstStyle/>
+          <a:p>
+            <a:r>
+              <a:rPr lang="en-US" dirty="0"/>
+              <a:t>0.7 m/s</a:t>
+            </a:r>
+          </a:p>
+        </p:txBody>
+      </p:sp>
+      <p:sp>
+        <p:nvSpPr>
+          <p:cNvPr id="23" name="TextBox 22">
+            <a:extLst>
+              <a:ext uri="{FF2B5EF4-FFF2-40B4-BE49-F238E27FC236}">
+                <a16:creationId xmlns:a16="http://schemas.microsoft.com/office/drawing/2014/main" id="{45CF74BF-BE64-6140-AD72-FBFB84102CA1}"/>
+              </a:ext>
+            </a:extLst>
+          </p:cNvPr>
+          <p:cNvSpPr txBox="1"/>
+          <p:nvPr/>
+        </p:nvSpPr>
+        <p:spPr>
+          <a:xfrm>
+            <a:off x="3529975" y="5200745"/>
+            <a:ext cx="3174459" cy="707886"/>
+          </a:xfrm>
+          <a:prstGeom prst="rect">
+            <a:avLst/>
+          </a:prstGeom>
+          <a:noFill/>
+        </p:spPr>
+        <p:txBody>
+          <a:bodyPr wrap="none" rtlCol="0">
+            <a:spAutoFit/>
+          </a:bodyPr>
+          <a:lstStyle/>
+          <a:p>
+            <a:r>
+              <a:rPr lang="en-US" sz="2000" dirty="0"/>
+              <a:t>Probability of collision = </a:t>
+            </a:r>
+            <a:r>
+              <a:rPr lang="en-US" sz="2000" b="1" dirty="0"/>
+              <a:t>40%</a:t>
+            </a:r>
+          </a:p>
+          <a:p>
+            <a:r>
+              <a:rPr lang="en-US" sz="2000" dirty="0"/>
+              <a:t>(Expected collision = </a:t>
+            </a:r>
+            <a:r>
+              <a:rPr lang="en-US" sz="2000" b="1" dirty="0"/>
+              <a:t>0.4</a:t>
+            </a:r>
+            <a:r>
+              <a:rPr lang="en-US" sz="2000" dirty="0"/>
+              <a:t>)</a:t>
+            </a:r>
+          </a:p>
+        </p:txBody>
+      </p:sp>
       <p:grpSp>
         <p:nvGrpSpPr>
           <p:cNvPr id="22" name="Group 21">
@@ -7658,10 +7406,10 @@
       </p:grpSp>
       <p:grpSp>
         <p:nvGrpSpPr>
-          <p:cNvPr id="36" name="Group 35">
+          <p:cNvPr id="38" name="Group 37">
             <a:extLst>
               <a:ext uri="{FF2B5EF4-FFF2-40B4-BE49-F238E27FC236}">
-                <a16:creationId xmlns:a16="http://schemas.microsoft.com/office/drawing/2014/main" id="{6266BC05-2A7A-9E49-AAB5-B865C0A3A418}"/>
+                <a16:creationId xmlns:a16="http://schemas.microsoft.com/office/drawing/2014/main" id="{0032E22C-0FB4-DA4F-8170-96728AF4B549}"/>
               </a:ext>
             </a:extLst>
           </p:cNvPr>
@@ -7670,18 +7418,71 @@
         </p:nvGrpSpPr>
         <p:grpSpPr>
           <a:xfrm>
-            <a:off x="7001904" y="3430408"/>
-            <a:ext cx="4595063" cy="937824"/>
-            <a:chOff x="7247498" y="3818672"/>
-            <a:chExt cx="4595063" cy="937824"/>
+            <a:off x="1703028" y="3434169"/>
+            <a:ext cx="4985348" cy="949086"/>
+            <a:chOff x="1703028" y="3434169"/>
+            <a:chExt cx="4985348" cy="949086"/>
           </a:xfrm>
         </p:grpSpPr>
+        <p:sp>
+          <p:nvSpPr>
+            <p:cNvPr id="12" name="TextBox 11">
+              <a:extLst>
+                <a:ext uri="{FF2B5EF4-FFF2-40B4-BE49-F238E27FC236}">
+                  <a16:creationId xmlns:a16="http://schemas.microsoft.com/office/drawing/2014/main" id="{EFBC5898-DDC6-064E-9B61-0A01AC41CB4A}"/>
+                </a:ext>
+              </a:extLst>
+            </p:cNvPr>
+            <p:cNvSpPr txBox="1"/>
+            <p:nvPr/>
+          </p:nvSpPr>
+          <p:spPr>
+            <a:xfrm>
+              <a:off x="3513917" y="3560400"/>
+              <a:ext cx="3174459" cy="707886"/>
+            </a:xfrm>
+            <a:prstGeom prst="rect">
+              <a:avLst/>
+            </a:prstGeom>
+            <a:noFill/>
+          </p:spPr>
+          <p:txBody>
+            <a:bodyPr wrap="none" rtlCol="0">
+              <a:spAutoFit/>
+            </a:bodyPr>
+            <a:lstStyle/>
+            <a:p>
+              <a:r>
+                <a:rPr lang="en-US" sz="2000" dirty="0"/>
+                <a:t>Probability of collision = </a:t>
+              </a:r>
+              <a:r>
+                <a:rPr lang="en-US" sz="2000" b="1" dirty="0"/>
+                <a:t>20%</a:t>
+              </a:r>
+            </a:p>
+            <a:p>
+              <a:r>
+                <a:rPr lang="en-US" sz="2000" dirty="0"/>
+                <a:t>(Expected collision = </a:t>
+              </a:r>
+              <a:r>
+                <a:rPr lang="en-US" sz="2000" b="1" dirty="0"/>
+                <a:t>0.2</a:t>
+              </a:r>
+              <a:r>
+                <a:rPr lang="en-US" sz="2000" dirty="0"/>
+                <a:t>)</a:t>
+              </a:r>
+            </a:p>
+          </p:txBody>
+        </p:sp>
         <p:grpSp>
           <p:nvGrpSpPr>
-            <p:cNvPr id="79" name="Group 78">
-              <a:extLst>
-                <a:ext uri="{FF2B5EF4-FFF2-40B4-BE49-F238E27FC236}">
-                  <a16:creationId xmlns:a16="http://schemas.microsoft.com/office/drawing/2014/main" id="{DD2B1B39-BB14-244F-8BE3-894E692208AF}"/>
+            <p:cNvPr id="11" name="Group 10">
+              <a:extLst>
+                <a:ext uri="{FF2B5EF4-FFF2-40B4-BE49-F238E27FC236}">
+                  <a16:creationId xmlns:a16="http://schemas.microsoft.com/office/drawing/2014/main" id="{4DCE2F23-BFCC-6147-ABF5-3AEF1C2E529F}"/>
                 </a:ext>
               </a:extLst>
             </p:cNvPr>
@@ -7690,10 +7491,286 @@
           </p:nvGrpSpPr>
           <p:grpSpPr>
             <a:xfrm>
-              <a:off x="7247498" y="3818672"/>
-              <a:ext cx="1711709" cy="937824"/>
-              <a:chOff x="2622917" y="3818672"/>
-              <a:chExt cx="1711709" cy="937824"/>
+              <a:off x="1703028" y="3434169"/>
+              <a:ext cx="1711709" cy="949086"/>
+              <a:chOff x="1703028" y="3434169"/>
+              <a:chExt cx="1711709" cy="949086"/>
+            </a:xfrm>
+          </p:grpSpPr>
+          <p:pic>
+            <p:nvPicPr>
+              <p:cNvPr id="13" name="Picture 12">
+                <a:extLst>
+                  <a:ext uri="{FF2B5EF4-FFF2-40B4-BE49-F238E27FC236}">
+                    <a16:creationId xmlns:a16="http://schemas.microsoft.com/office/drawing/2014/main" id="{A5237C1C-7D65-1C4F-9F0E-90EEC18F3C72}"/>
+                  </a:ext>
+                </a:extLst>
+              </p:cNvPr>
+              <p:cNvPicPr>
+                <a:picLocks noChangeAspect="1"/>
+              </p:cNvPicPr>
+              <p:nvPr/>
+            </p:nvPicPr>
+            <p:blipFill rotWithShape="1">
+              <a:blip r:embed="rId2"/>
+              <a:srcRect l="26302" t="1905" r="24095"/>
+              <a:stretch/>
+            </p:blipFill>
+            <p:spPr>
+              <a:xfrm>
+                <a:off x="1703028" y="3501970"/>
+                <a:ext cx="431549" cy="640080"/>
+              </a:xfrm>
+              <a:prstGeom prst="rect">
+                <a:avLst/>
+              </a:prstGeom>
+            </p:spPr>
+          </p:pic>
+          <p:sp>
+            <p:nvSpPr>
+              <p:cNvPr id="14" name="Right Arrow 13">
+                <a:extLst>
+                  <a:ext uri="{FF2B5EF4-FFF2-40B4-BE49-F238E27FC236}">
+                    <a16:creationId xmlns:a16="http://schemas.microsoft.com/office/drawing/2014/main" id="{A520BE55-5968-8F4E-9A7F-2ECEE1272B8D}"/>
+                  </a:ext>
+                </a:extLst>
+              </p:cNvPr>
+              <p:cNvSpPr/>
+              <p:nvPr/>
+            </p:nvSpPr>
+            <p:spPr>
+              <a:xfrm>
+                <a:off x="2317457" y="3822010"/>
+                <a:ext cx="1097280" cy="182880"/>
+              </a:xfrm>
+              <a:prstGeom prst="rightArrow">
+                <a:avLst/>
+              </a:prstGeom>
+              <a:solidFill>
+                <a:schemeClr val="accent1">
+                  <a:lumMod val="75000"/>
+                </a:schemeClr>
+              </a:solidFill>
+            </p:spPr>
+            <p:style>
+              <a:lnRef idx="2">
+                <a:schemeClr val="accent1">
+                  <a:shade val="50000"/>
+                </a:schemeClr>
+              </a:lnRef>
+              <a:fillRef idx="1">
+                <a:schemeClr val="accent1"/>
+              </a:fillRef>
+              <a:effectRef idx="0">
+                <a:schemeClr val="accent1"/>
+              </a:effectRef>
+              <a:fontRef idx="minor">
+                <a:schemeClr val="lt1"/>
+              </a:fontRef>
+            </p:style>
+            <p:txBody>
+              <a:bodyPr rtlCol="0" anchor="ctr"/>
+              <a:lstStyle/>
+              <a:p>
+                <a:pPr algn="ctr"/>
+                <a:endParaRPr lang="en-US"/>
+              </a:p>
+            </p:txBody>
+          </p:sp>
+          <p:sp>
+            <p:nvSpPr>
+              <p:cNvPr id="16" name="TextBox 15">
+                <a:extLst>
+                  <a:ext uri="{FF2B5EF4-FFF2-40B4-BE49-F238E27FC236}">
+                    <a16:creationId xmlns:a16="http://schemas.microsoft.com/office/drawing/2014/main" id="{4AD4F83C-5298-B246-86D8-4334CF882E53}"/>
+                  </a:ext>
+                </a:extLst>
+              </p:cNvPr>
+              <p:cNvSpPr txBox="1"/>
+              <p:nvPr/>
+            </p:nvSpPr>
+            <p:spPr>
+              <a:xfrm>
+                <a:off x="2421711" y="4013923"/>
+                <a:ext cx="888769" cy="369332"/>
+              </a:xfrm>
+              <a:prstGeom prst="rect">
+                <a:avLst/>
+              </a:prstGeom>
+              <a:noFill/>
+            </p:spPr>
+            <p:txBody>
+              <a:bodyPr wrap="none" rtlCol="0">
+                <a:spAutoFit/>
+              </a:bodyPr>
+              <a:lstStyle/>
+              <a:p>
+                <a:r>
+                  <a:rPr lang="en-US" dirty="0"/>
+                  <a:t>0.7 m/s</a:t>
+                </a:r>
+              </a:p>
+            </p:txBody>
+          </p:sp>
+          <p:sp>
+            <p:nvSpPr>
+              <p:cNvPr id="4" name="TextBox 3">
+                <a:extLst>
+                  <a:ext uri="{FF2B5EF4-FFF2-40B4-BE49-F238E27FC236}">
+                    <a16:creationId xmlns:a16="http://schemas.microsoft.com/office/drawing/2014/main" id="{445C67D2-31DA-6340-A24B-53E714065E9C}"/>
+                  </a:ext>
+                </a:extLst>
+              </p:cNvPr>
+              <p:cNvSpPr txBox="1"/>
+              <p:nvPr/>
+            </p:nvSpPr>
+            <p:spPr>
+              <a:xfrm>
+                <a:off x="2596477" y="3434169"/>
+                <a:ext cx="529312" cy="461665"/>
+              </a:xfrm>
+              <a:prstGeom prst="rect">
+                <a:avLst/>
+              </a:prstGeom>
+              <a:noFill/>
+            </p:spPr>
+            <p:txBody>
+              <a:bodyPr wrap="none" rtlCol="0">
+                <a:spAutoFit/>
+              </a:bodyPr>
+              <a:lstStyle/>
+              <a:p>
+                <a:r>
+                  <a:rPr lang="en-US" sz="2400" dirty="0"/>
+                  <a:t>SO</a:t>
+                </a:r>
+              </a:p>
+            </p:txBody>
+          </p:sp>
+        </p:grpSp>
+      </p:grpSp>
+      <p:sp>
+        <p:nvSpPr>
+          <p:cNvPr id="71" name="TextBox 70">
+            <a:extLst>
+              <a:ext uri="{FF2B5EF4-FFF2-40B4-BE49-F238E27FC236}">
+                <a16:creationId xmlns:a16="http://schemas.microsoft.com/office/drawing/2014/main" id="{5FFB550E-8E22-DD4F-BAEC-32B5DA8AAA9D}"/>
+              </a:ext>
+            </a:extLst>
+          </p:cNvPr>
+          <p:cNvSpPr txBox="1"/>
+          <p:nvPr/>
+        </p:nvSpPr>
+        <p:spPr>
+          <a:xfrm>
+            <a:off x="2572432" y="5051873"/>
+            <a:ext cx="577402" cy="461665"/>
+          </a:xfrm>
+          <a:prstGeom prst="rect">
+            <a:avLst/>
+          </a:prstGeom>
+          <a:noFill/>
+        </p:spPr>
+        <p:txBody>
+          <a:bodyPr wrap="none" rtlCol="0">
+            <a:spAutoFit/>
+          </a:bodyPr>
+          <a:lstStyle/>
+          <a:p>
+            <a:r>
+              <a:rPr lang="en-US" sz="2400" dirty="0"/>
+              <a:t>DO</a:t>
+            </a:r>
+          </a:p>
+        </p:txBody>
+      </p:sp>
+      <p:grpSp>
+        <p:nvGrpSpPr>
+          <p:cNvPr id="40" name="Group 39">
+            <a:extLst>
+              <a:ext uri="{FF2B5EF4-FFF2-40B4-BE49-F238E27FC236}">
+                <a16:creationId xmlns:a16="http://schemas.microsoft.com/office/drawing/2014/main" id="{96CEBF67-62FA-D544-9E84-63759FFA76EB}"/>
+              </a:ext>
+            </a:extLst>
+          </p:cNvPr>
+          <p:cNvGrpSpPr/>
+          <p:nvPr/>
+        </p:nvGrpSpPr>
+        <p:grpSpPr>
+          <a:xfrm>
+            <a:off x="7001904" y="3398735"/>
+            <a:ext cx="4595063" cy="969497"/>
+            <a:chOff x="7001904" y="3398735"/>
+            <a:chExt cx="4595063" cy="969497"/>
+          </a:xfrm>
+        </p:grpSpPr>
+        <p:sp>
+          <p:nvSpPr>
+            <p:cNvPr id="80" name="TextBox 79">
+              <a:extLst>
+                <a:ext uri="{FF2B5EF4-FFF2-40B4-BE49-F238E27FC236}">
+                  <a16:creationId xmlns:a16="http://schemas.microsoft.com/office/drawing/2014/main" id="{3892EE46-1E5F-A24B-9160-8EEB5DB181DF}"/>
+                </a:ext>
+              </a:extLst>
+            </p:cNvPr>
+            <p:cNvSpPr txBox="1"/>
+            <p:nvPr/>
+          </p:nvSpPr>
+          <p:spPr>
+            <a:xfrm>
+              <a:off x="8822553" y="3545377"/>
+              <a:ext cx="2774414" cy="707886"/>
+            </a:xfrm>
+            <a:prstGeom prst="rect">
+              <a:avLst/>
+            </a:prstGeom>
+            <a:noFill/>
+          </p:spPr>
+          <p:txBody>
+            <a:bodyPr wrap="none" rtlCol="0">
+              <a:spAutoFit/>
+            </a:bodyPr>
+            <a:lstStyle/>
+            <a:p>
+              <a:r>
+                <a:rPr lang="en-US" sz="2000" dirty="0"/>
+                <a:t>No collision at low speed</a:t>
+              </a:r>
+            </a:p>
+            <a:p>
+              <a:r>
+                <a:rPr lang="en-US" sz="2000" dirty="0"/>
+                <a:t>(Expected collision = </a:t>
+              </a:r>
+              <a:r>
+                <a:rPr lang="en-US" sz="2000" b="1" dirty="0"/>
+                <a:t>0.0</a:t>
+              </a:r>
+              <a:r>
+                <a:rPr lang="en-US" sz="2000" dirty="0"/>
+                <a:t>)</a:t>
+              </a:r>
+            </a:p>
+          </p:txBody>
+        </p:sp>
+        <p:grpSp>
+          <p:nvGrpSpPr>
+            <p:cNvPr id="39" name="Group 38">
+              <a:extLst>
+                <a:ext uri="{FF2B5EF4-FFF2-40B4-BE49-F238E27FC236}">
+                  <a16:creationId xmlns:a16="http://schemas.microsoft.com/office/drawing/2014/main" id="{13A98E3A-D60B-9E4F-A40C-7A0599178C7C}"/>
+                </a:ext>
+              </a:extLst>
+            </p:cNvPr>
+            <p:cNvGrpSpPr/>
+            <p:nvPr/>
+          </p:nvGrpSpPr>
+          <p:grpSpPr>
+            <a:xfrm>
+              <a:off x="7001904" y="3398735"/>
+              <a:ext cx="1711709" cy="969497"/>
+              <a:chOff x="7001904" y="3398735"/>
+              <a:chExt cx="1711709" cy="969497"/>
             </a:xfrm>
           </p:grpSpPr>
           <p:pic>
@@ -7717,7 +7794,7 @@
             </p:blipFill>
             <p:spPr>
               <a:xfrm>
-                <a:off x="2622917" y="3875211"/>
+                <a:off x="7001904" y="3486947"/>
                 <a:ext cx="431549" cy="640080"/>
               </a:xfrm>
               <a:prstGeom prst="rect">
@@ -7739,7 +7816,7 @@
             </p:nvSpPr>
             <p:spPr>
               <a:xfrm>
-                <a:off x="3237346" y="4195251"/>
+                <a:off x="7616333" y="3806987"/>
                 <a:ext cx="1097280" cy="182880"/>
               </a:xfrm>
               <a:prstGeom prst="rightArrow">
@@ -7774,259 +7851,6 @@
               </a:p>
             </p:txBody>
           </p:sp>
-          <p:grpSp>
-            <p:nvGrpSpPr>
-              <p:cNvPr id="83" name="Group 82">
-                <a:extLst>
-                  <a:ext uri="{FF2B5EF4-FFF2-40B4-BE49-F238E27FC236}">
-                    <a16:creationId xmlns:a16="http://schemas.microsoft.com/office/drawing/2014/main" id="{3510B9D1-9F53-A24B-A540-AD9D084DB8C9}"/>
-                  </a:ext>
-                </a:extLst>
-              </p:cNvPr>
-              <p:cNvGrpSpPr/>
-              <p:nvPr/>
-            </p:nvGrpSpPr>
-            <p:grpSpPr>
-              <a:xfrm>
-                <a:off x="3600240" y="3818672"/>
-                <a:ext cx="365760" cy="295041"/>
-                <a:chOff x="7803055" y="2574583"/>
-                <a:chExt cx="365760" cy="295041"/>
-              </a:xfrm>
-            </p:grpSpPr>
-            <p:sp>
-              <p:nvSpPr>
-                <p:cNvPr id="85" name="Cube 84">
-                  <a:extLst>
-                    <a:ext uri="{FF2B5EF4-FFF2-40B4-BE49-F238E27FC236}">
-                      <a16:creationId xmlns:a16="http://schemas.microsoft.com/office/drawing/2014/main" id="{7010FD88-4AF0-3E46-8251-E380DAD48FEE}"/>
-                    </a:ext>
-                  </a:extLst>
-                </p:cNvPr>
-                <p:cNvSpPr>
-                  <a:spLocks noChangeAspect="1"/>
-                </p:cNvSpPr>
-                <p:nvPr/>
-              </p:nvSpPr>
-              <p:spPr>
-                <a:xfrm>
-                  <a:off x="7803055" y="2686744"/>
-                  <a:ext cx="182880" cy="182880"/>
-                </a:xfrm>
-                <a:prstGeom prst="cube">
-                  <a:avLst/>
-                </a:prstGeom>
-                <a:solidFill>
-                  <a:schemeClr val="accent4">
-                    <a:lumMod val="75000"/>
-                  </a:schemeClr>
-                </a:solidFill>
-                <a:ln>
-                  <a:solidFill>
-                    <a:schemeClr val="tx1"/>
-                  </a:solidFill>
-                </a:ln>
-              </p:spPr>
-              <p:style>
-                <a:lnRef idx="2">
-                  <a:schemeClr val="accent1">
-                    <a:shade val="50000"/>
-                  </a:schemeClr>
-                </a:lnRef>
-                <a:fillRef idx="1">
-                  <a:schemeClr val="accent1"/>
-                </a:fillRef>
-                <a:effectRef idx="0">
-                  <a:schemeClr val="accent1"/>
-                </a:effectRef>
-                <a:fontRef idx="minor">
-                  <a:schemeClr val="lt1"/>
-                </a:fontRef>
-              </p:style>
-              <p:txBody>
-                <a:bodyPr rtlCol="0" anchor="ctr"/>
-                <a:lstStyle/>
-                <a:p>
-                  <a:pPr algn="ctr"/>
-                  <a:endParaRPr lang="en-US"/>
-                </a:p>
-              </p:txBody>
-            </p:sp>
-            <p:sp>
-              <p:nvSpPr>
-                <p:cNvPr id="86" name="Cube 85">
-                  <a:extLst>
-                    <a:ext uri="{FF2B5EF4-FFF2-40B4-BE49-F238E27FC236}">
-                      <a16:creationId xmlns:a16="http://schemas.microsoft.com/office/drawing/2014/main" id="{77D5022A-46DA-6948-82BE-A3532944F9C9}"/>
-                    </a:ext>
-                  </a:extLst>
-                </p:cNvPr>
-                <p:cNvSpPr>
-                  <a:spLocks noChangeAspect="1"/>
-                </p:cNvSpPr>
-                <p:nvPr/>
-              </p:nvSpPr>
-              <p:spPr>
-                <a:xfrm>
-                  <a:off x="7985935" y="2686744"/>
-                  <a:ext cx="182880" cy="182880"/>
-                </a:xfrm>
-                <a:prstGeom prst="cube">
-                  <a:avLst/>
-                </a:prstGeom>
-                <a:solidFill>
-                  <a:schemeClr val="accent4">
-                    <a:lumMod val="75000"/>
-                  </a:schemeClr>
-                </a:solidFill>
-                <a:ln>
-                  <a:solidFill>
-                    <a:schemeClr val="tx1"/>
-                  </a:solidFill>
-                </a:ln>
-              </p:spPr>
-              <p:style>
-                <a:lnRef idx="2">
-                  <a:schemeClr val="accent1">
-                    <a:shade val="50000"/>
-                  </a:schemeClr>
-                </a:lnRef>
-                <a:fillRef idx="1">
-                  <a:schemeClr val="accent1"/>
-                </a:fillRef>
-                <a:effectRef idx="0">
-                  <a:schemeClr val="accent1"/>
-                </a:effectRef>
-                <a:fontRef idx="minor">
-                  <a:schemeClr val="lt1"/>
-                </a:fontRef>
-              </p:style>
-              <p:txBody>
-                <a:bodyPr rtlCol="0" anchor="ctr"/>
-                <a:lstStyle/>
-                <a:p>
-                  <a:pPr algn="ctr"/>
-                  <a:endParaRPr lang="en-US"/>
-                </a:p>
-              </p:txBody>
-            </p:sp>
-            <p:sp>
-              <p:nvSpPr>
-                <p:cNvPr id="87" name="Cube 86">
-                  <a:extLst>
-                    <a:ext uri="{FF2B5EF4-FFF2-40B4-BE49-F238E27FC236}">
-                      <a16:creationId xmlns:a16="http://schemas.microsoft.com/office/drawing/2014/main" id="{E7388A6A-0492-0640-81EB-2EC320FA9AEC}"/>
-                    </a:ext>
-                  </a:extLst>
-                </p:cNvPr>
-                <p:cNvSpPr>
-                  <a:spLocks noChangeAspect="1"/>
-                </p:cNvSpPr>
-                <p:nvPr/>
-              </p:nvSpPr>
-              <p:spPr>
-                <a:xfrm>
-                  <a:off x="7803055" y="2574583"/>
-                  <a:ext cx="182880" cy="182880"/>
-                </a:xfrm>
-                <a:prstGeom prst="cube">
-                  <a:avLst/>
-                </a:prstGeom>
-                <a:solidFill>
-                  <a:schemeClr val="accent4">
-                    <a:lumMod val="75000"/>
-                  </a:schemeClr>
-                </a:solidFill>
-                <a:ln>
-                  <a:solidFill>
-                    <a:schemeClr val="tx1"/>
-                  </a:solidFill>
-                </a:ln>
-              </p:spPr>
-              <p:style>
-                <a:lnRef idx="2">
-                  <a:schemeClr val="accent1">
-                    <a:shade val="50000"/>
-                  </a:schemeClr>
-                </a:lnRef>
-                <a:fillRef idx="1">
-                  <a:schemeClr val="accent1"/>
-                </a:fillRef>
-                <a:effectRef idx="0">
-                  <a:schemeClr val="accent1"/>
-                </a:effectRef>
-                <a:fontRef idx="minor">
-                  <a:schemeClr val="lt1"/>
-                </a:fontRef>
-              </p:style>
-              <p:txBody>
-                <a:bodyPr rtlCol="0" anchor="ctr"/>
-                <a:lstStyle/>
-                <a:p>
-                  <a:pPr algn="ctr"/>
-                  <a:endParaRPr lang="en-US"/>
-                </a:p>
-              </p:txBody>
-            </p:sp>
-            <p:sp>
-              <p:nvSpPr>
-                <p:cNvPr id="88" name="Cube 87">
-                  <a:extLst>
-                    <a:ext uri="{FF2B5EF4-FFF2-40B4-BE49-F238E27FC236}">
-                      <a16:creationId xmlns:a16="http://schemas.microsoft.com/office/drawing/2014/main" id="{67292A3F-3DEF-0D4B-85B0-29EFCB0D9B37}"/>
-                    </a:ext>
-                  </a:extLst>
-                </p:cNvPr>
-                <p:cNvSpPr>
-                  <a:spLocks noChangeAspect="1"/>
-                </p:cNvSpPr>
-                <p:nvPr/>
-              </p:nvSpPr>
-              <p:spPr>
-                <a:xfrm>
-                  <a:off x="7985935" y="2574583"/>
-                  <a:ext cx="182880" cy="182880"/>
-                </a:xfrm>
-                <a:prstGeom prst="cube">
-                  <a:avLst/>
-                </a:prstGeom>
-                <a:solidFill>
-                  <a:schemeClr val="accent4">
-                    <a:lumMod val="75000"/>
-                  </a:schemeClr>
-                </a:solidFill>
-                <a:ln>
-                  <a:solidFill>
-                    <a:schemeClr val="tx1"/>
-                  </a:solidFill>
-                </a:ln>
-              </p:spPr>
-              <p:style>
-                <a:lnRef idx="2">
-                  <a:schemeClr val="accent1">
-                    <a:shade val="50000"/>
-                  </a:schemeClr>
-                </a:lnRef>
-                <a:fillRef idx="1">
-                  <a:schemeClr val="accent1"/>
-                </a:fillRef>
-                <a:effectRef idx="0">
-                  <a:schemeClr val="accent1"/>
-                </a:effectRef>
-                <a:fontRef idx="minor">
-                  <a:schemeClr val="lt1"/>
-                </a:fontRef>
-              </p:style>
-              <p:txBody>
-                <a:bodyPr rtlCol="0" anchor="ctr"/>
-                <a:lstStyle/>
-                <a:p>
-                  <a:pPr algn="ctr"/>
-                  <a:endParaRPr lang="en-US"/>
-                </a:p>
-              </p:txBody>
-            </p:sp>
-          </p:grpSp>
           <p:sp>
             <p:nvSpPr>
               <p:cNvPr id="84" name="TextBox 83">
@@ -8041,7 +7865,7 @@
             </p:nvSpPr>
             <p:spPr>
               <a:xfrm>
-                <a:off x="3280226" y="4387164"/>
+                <a:off x="7659213" y="3998900"/>
                 <a:ext cx="1005788" cy="369332"/>
               </a:xfrm>
               <a:prstGeom prst="rect">
@@ -8062,13 +7886,69 @@
               </a:p>
             </p:txBody>
           </p:sp>
+          <p:sp>
+            <p:nvSpPr>
+              <p:cNvPr id="72" name="TextBox 71">
+                <a:extLst>
+                  <a:ext uri="{FF2B5EF4-FFF2-40B4-BE49-F238E27FC236}">
+                    <a16:creationId xmlns:a16="http://schemas.microsoft.com/office/drawing/2014/main" id="{01D02C35-7E7A-A740-B48E-B22DA8EA90FF}"/>
+                  </a:ext>
+                </a:extLst>
+              </p:cNvPr>
+              <p:cNvSpPr txBox="1"/>
+              <p:nvPr/>
+            </p:nvSpPr>
+            <p:spPr>
+              <a:xfrm>
+                <a:off x="7897451" y="3398735"/>
+                <a:ext cx="529312" cy="461665"/>
+              </a:xfrm>
+              <a:prstGeom prst="rect">
+                <a:avLst/>
+              </a:prstGeom>
+              <a:noFill/>
+            </p:spPr>
+            <p:txBody>
+              <a:bodyPr wrap="none" rtlCol="0">
+                <a:spAutoFit/>
+              </a:bodyPr>
+              <a:lstStyle/>
+              <a:p>
+                <a:r>
+                  <a:rPr lang="en-US" sz="2400" dirty="0"/>
+                  <a:t>SO</a:t>
+                </a:r>
+              </a:p>
+            </p:txBody>
+          </p:sp>
         </p:grpSp>
+      </p:grpSp>
+      <p:grpSp>
+        <p:nvGrpSpPr>
+          <p:cNvPr id="42" name="Group 41">
+            <a:extLst>
+              <a:ext uri="{FF2B5EF4-FFF2-40B4-BE49-F238E27FC236}">
+                <a16:creationId xmlns:a16="http://schemas.microsoft.com/office/drawing/2014/main" id="{F902C161-489C-8740-8B55-695F5D27EB40}"/>
+              </a:ext>
+            </a:extLst>
+          </p:cNvPr>
+          <p:cNvGrpSpPr/>
+          <p:nvPr/>
+        </p:nvGrpSpPr>
+        <p:grpSpPr>
+          <a:xfrm>
+            <a:off x="7001904" y="5051872"/>
+            <a:ext cx="4595063" cy="959365"/>
+            <a:chOff x="7001904" y="5051872"/>
+            <a:chExt cx="4595063" cy="959365"/>
+          </a:xfrm>
+        </p:grpSpPr>
         <p:sp>
           <p:nvSpPr>
-            <p:cNvPr id="80" name="TextBox 79">
-              <a:extLst>
-                <a:ext uri="{FF2B5EF4-FFF2-40B4-BE49-F238E27FC236}">
-                  <a16:creationId xmlns:a16="http://schemas.microsoft.com/office/drawing/2014/main" id="{3892EE46-1E5F-A24B-9160-8EEB5DB181DF}"/>
+            <p:cNvPr id="91" name="TextBox 90">
+              <a:extLst>
+                <a:ext uri="{FF2B5EF4-FFF2-40B4-BE49-F238E27FC236}">
+                  <a16:creationId xmlns:a16="http://schemas.microsoft.com/office/drawing/2014/main" id="{26EB6D5A-D251-B748-AFD7-08C568DD5950}"/>
                 </a:ext>
               </a:extLst>
             </p:cNvPr>
@@ -8077,7 +7957,7 @@
           </p:nvSpPr>
           <p:spPr>
             <a:xfrm>
-              <a:off x="9068147" y="3933641"/>
+              <a:off x="8822553" y="5206332"/>
               <a:ext cx="2774414" cy="707886"/>
             </a:xfrm>
             <a:prstGeom prst="rect">
@@ -8112,33 +7992,12 @@
             </a:p>
           </p:txBody>
         </p:sp>
-      </p:grpSp>
-      <p:grpSp>
-        <p:nvGrpSpPr>
-          <p:cNvPr id="37" name="Group 36">
-            <a:extLst>
-              <a:ext uri="{FF2B5EF4-FFF2-40B4-BE49-F238E27FC236}">
-                <a16:creationId xmlns:a16="http://schemas.microsoft.com/office/drawing/2014/main" id="{1982E450-07AA-6245-9580-CFB72D26B80A}"/>
-              </a:ext>
-            </a:extLst>
-          </p:cNvPr>
-          <p:cNvGrpSpPr/>
-          <p:nvPr/>
-        </p:nvGrpSpPr>
-        <p:grpSpPr>
-          <a:xfrm>
-            <a:off x="7001904" y="5109313"/>
-            <a:ext cx="4595063" cy="901924"/>
-            <a:chOff x="7247498" y="5458831"/>
-            <a:chExt cx="4595063" cy="901924"/>
-          </a:xfrm>
-        </p:grpSpPr>
         <p:grpSp>
           <p:nvGrpSpPr>
-            <p:cNvPr id="90" name="Group 89">
-              <a:extLst>
-                <a:ext uri="{FF2B5EF4-FFF2-40B4-BE49-F238E27FC236}">
-                  <a16:creationId xmlns:a16="http://schemas.microsoft.com/office/drawing/2014/main" id="{AFBB365A-6E86-F34B-BB35-45237E0013F7}"/>
+            <p:cNvPr id="41" name="Group 40">
+              <a:extLst>
+                <a:ext uri="{FF2B5EF4-FFF2-40B4-BE49-F238E27FC236}">
+                  <a16:creationId xmlns:a16="http://schemas.microsoft.com/office/drawing/2014/main" id="{80B11753-B1E7-BE4E-812D-C304C9B489F8}"/>
                 </a:ext>
               </a:extLst>
             </p:cNvPr>
@@ -8147,10 +8006,10 @@
           </p:nvGrpSpPr>
           <p:grpSpPr>
             <a:xfrm>
-              <a:off x="7247498" y="5458831"/>
-              <a:ext cx="1711709" cy="901924"/>
-              <a:chOff x="2622917" y="5458831"/>
-              <a:chExt cx="1711709" cy="901924"/>
+              <a:off x="7001904" y="5051872"/>
+              <a:ext cx="1711709" cy="959365"/>
+              <a:chOff x="7001904" y="5051872"/>
+              <a:chExt cx="1711709" cy="959365"/>
             </a:xfrm>
           </p:grpSpPr>
           <p:pic>
@@ -8174,7 +8033,7 @@
             </p:blipFill>
             <p:spPr>
               <a:xfrm>
-                <a:off x="2622917" y="5488503"/>
+                <a:off x="7001904" y="5138985"/>
                 <a:ext cx="431549" cy="640080"/>
               </a:xfrm>
               <a:prstGeom prst="rect">
@@ -8196,7 +8055,7 @@
             </p:nvSpPr>
             <p:spPr>
               <a:xfrm>
-                <a:off x="3237346" y="5808543"/>
+                <a:off x="7616333" y="5459025"/>
                 <a:ext cx="1097280" cy="182880"/>
               </a:xfrm>
               <a:prstGeom prst="rightArrow">
@@ -8231,491 +8090,6 @@
               </a:p>
             </p:txBody>
           </p:sp>
-          <p:grpSp>
-            <p:nvGrpSpPr>
-              <p:cNvPr id="94" name="Group 93">
-                <a:extLst>
-                  <a:ext uri="{FF2B5EF4-FFF2-40B4-BE49-F238E27FC236}">
-                    <a16:creationId xmlns:a16="http://schemas.microsoft.com/office/drawing/2014/main" id="{3A14C0BB-05F6-1B46-A176-8CA344EB6A12}"/>
-                  </a:ext>
-                </a:extLst>
-              </p:cNvPr>
-              <p:cNvGrpSpPr/>
-              <p:nvPr/>
-            </p:nvGrpSpPr>
-            <p:grpSpPr>
-              <a:xfrm>
-                <a:off x="3420226" y="5458831"/>
-                <a:ext cx="731520" cy="295041"/>
-                <a:chOff x="9699621" y="3380438"/>
-                <a:chExt cx="731520" cy="295041"/>
-              </a:xfrm>
-            </p:grpSpPr>
-            <p:sp>
-              <p:nvSpPr>
-                <p:cNvPr id="96" name="Cube 95">
-                  <a:extLst>
-                    <a:ext uri="{FF2B5EF4-FFF2-40B4-BE49-F238E27FC236}">
-                      <a16:creationId xmlns:a16="http://schemas.microsoft.com/office/drawing/2014/main" id="{E79B10BC-A7B8-824D-A548-3A46FB6C19EB}"/>
-                    </a:ext>
-                  </a:extLst>
-                </p:cNvPr>
-                <p:cNvSpPr>
-                  <a:spLocks noChangeAspect="1"/>
-                </p:cNvSpPr>
-                <p:nvPr/>
-              </p:nvSpPr>
-              <p:spPr>
-                <a:xfrm>
-                  <a:off x="9882501" y="3492599"/>
-                  <a:ext cx="182880" cy="182880"/>
-                </a:xfrm>
-                <a:prstGeom prst="cube">
-                  <a:avLst/>
-                </a:prstGeom>
-                <a:solidFill>
-                  <a:schemeClr val="accent4">
-                    <a:lumMod val="75000"/>
-                  </a:schemeClr>
-                </a:solidFill>
-                <a:ln>
-                  <a:solidFill>
-                    <a:schemeClr val="tx1"/>
-                  </a:solidFill>
-                </a:ln>
-              </p:spPr>
-              <p:style>
-                <a:lnRef idx="2">
-                  <a:schemeClr val="accent1">
-                    <a:shade val="50000"/>
-                  </a:schemeClr>
-                </a:lnRef>
-                <a:fillRef idx="1">
-                  <a:schemeClr val="accent1"/>
-                </a:fillRef>
-                <a:effectRef idx="0">
-                  <a:schemeClr val="accent1"/>
-                </a:effectRef>
-                <a:fontRef idx="minor">
-                  <a:schemeClr val="lt1"/>
-                </a:fontRef>
-              </p:style>
-              <p:txBody>
-                <a:bodyPr rtlCol="0" anchor="ctr"/>
-                <a:lstStyle/>
-                <a:p>
-                  <a:pPr algn="ctr"/>
-                  <a:endParaRPr lang="en-US"/>
-                </a:p>
-              </p:txBody>
-            </p:sp>
-            <p:sp>
-              <p:nvSpPr>
-                <p:cNvPr id="97" name="Cube 96">
-                  <a:extLst>
-                    <a:ext uri="{FF2B5EF4-FFF2-40B4-BE49-F238E27FC236}">
-                      <a16:creationId xmlns:a16="http://schemas.microsoft.com/office/drawing/2014/main" id="{0B8E55B6-8C4B-6B48-B8DD-8A70E26EC24F}"/>
-                    </a:ext>
-                  </a:extLst>
-                </p:cNvPr>
-                <p:cNvSpPr>
-                  <a:spLocks noChangeAspect="1"/>
-                </p:cNvSpPr>
-                <p:nvPr/>
-              </p:nvSpPr>
-              <p:spPr>
-                <a:xfrm>
-                  <a:off x="10065381" y="3492599"/>
-                  <a:ext cx="182880" cy="182880"/>
-                </a:xfrm>
-                <a:prstGeom prst="cube">
-                  <a:avLst/>
-                </a:prstGeom>
-                <a:solidFill>
-                  <a:schemeClr val="accent4">
-                    <a:lumMod val="75000"/>
-                  </a:schemeClr>
-                </a:solidFill>
-                <a:ln>
-                  <a:solidFill>
-                    <a:schemeClr val="tx1"/>
-                  </a:solidFill>
-                </a:ln>
-              </p:spPr>
-              <p:style>
-                <a:lnRef idx="2">
-                  <a:schemeClr val="accent1">
-                    <a:shade val="50000"/>
-                  </a:schemeClr>
-                </a:lnRef>
-                <a:fillRef idx="1">
-                  <a:schemeClr val="accent1"/>
-                </a:fillRef>
-                <a:effectRef idx="0">
-                  <a:schemeClr val="accent1"/>
-                </a:effectRef>
-                <a:fontRef idx="minor">
-                  <a:schemeClr val="lt1"/>
-                </a:fontRef>
-              </p:style>
-              <p:txBody>
-                <a:bodyPr rtlCol="0" anchor="ctr"/>
-                <a:lstStyle/>
-                <a:p>
-                  <a:pPr algn="ctr"/>
-                  <a:endParaRPr lang="en-US"/>
-                </a:p>
-              </p:txBody>
-            </p:sp>
-            <p:sp>
-              <p:nvSpPr>
-                <p:cNvPr id="98" name="Cube 97">
-                  <a:extLst>
-                    <a:ext uri="{FF2B5EF4-FFF2-40B4-BE49-F238E27FC236}">
-                      <a16:creationId xmlns:a16="http://schemas.microsoft.com/office/drawing/2014/main" id="{4EEE438B-F098-8B49-A01C-FF8A5268C44E}"/>
-                    </a:ext>
-                  </a:extLst>
-                </p:cNvPr>
-                <p:cNvSpPr>
-                  <a:spLocks noChangeAspect="1"/>
-                </p:cNvSpPr>
-                <p:nvPr/>
-              </p:nvSpPr>
-              <p:spPr>
-                <a:xfrm>
-                  <a:off x="9882501" y="3380438"/>
-                  <a:ext cx="182880" cy="182880"/>
-                </a:xfrm>
-                <a:prstGeom prst="cube">
-                  <a:avLst/>
-                </a:prstGeom>
-                <a:solidFill>
-                  <a:schemeClr val="accent4">
-                    <a:lumMod val="75000"/>
-                  </a:schemeClr>
-                </a:solidFill>
-                <a:ln>
-                  <a:solidFill>
-                    <a:schemeClr val="tx1"/>
-                  </a:solidFill>
-                </a:ln>
-              </p:spPr>
-              <p:style>
-                <a:lnRef idx="2">
-                  <a:schemeClr val="accent1">
-                    <a:shade val="50000"/>
-                  </a:schemeClr>
-                </a:lnRef>
-                <a:fillRef idx="1">
-                  <a:schemeClr val="accent1"/>
-                </a:fillRef>
-                <a:effectRef idx="0">
-                  <a:schemeClr val="accent1"/>
-                </a:effectRef>
-                <a:fontRef idx="minor">
-                  <a:schemeClr val="lt1"/>
-                </a:fontRef>
-              </p:style>
-              <p:txBody>
-                <a:bodyPr rtlCol="0" anchor="ctr"/>
-                <a:lstStyle/>
-                <a:p>
-                  <a:pPr algn="ctr"/>
-                  <a:endParaRPr lang="en-US"/>
-                </a:p>
-              </p:txBody>
-            </p:sp>
-            <p:sp>
-              <p:nvSpPr>
-                <p:cNvPr id="99" name="Cube 98">
-                  <a:extLst>
-                    <a:ext uri="{FF2B5EF4-FFF2-40B4-BE49-F238E27FC236}">
-                      <a16:creationId xmlns:a16="http://schemas.microsoft.com/office/drawing/2014/main" id="{B33CF4CD-E23B-EF44-A534-4DFE62C235CC}"/>
-                    </a:ext>
-                  </a:extLst>
-                </p:cNvPr>
-                <p:cNvSpPr>
-                  <a:spLocks noChangeAspect="1"/>
-                </p:cNvSpPr>
-                <p:nvPr/>
-              </p:nvSpPr>
-              <p:spPr>
-                <a:xfrm>
-                  <a:off x="10065381" y="3380438"/>
-                  <a:ext cx="182880" cy="182880"/>
-                </a:xfrm>
-                <a:prstGeom prst="cube">
-                  <a:avLst/>
-                </a:prstGeom>
-                <a:solidFill>
-                  <a:schemeClr val="accent4">
-                    <a:lumMod val="75000"/>
-                  </a:schemeClr>
-                </a:solidFill>
-                <a:ln>
-                  <a:solidFill>
-                    <a:schemeClr val="tx1"/>
-                  </a:solidFill>
-                </a:ln>
-              </p:spPr>
-              <p:style>
-                <a:lnRef idx="2">
-                  <a:schemeClr val="accent1">
-                    <a:shade val="50000"/>
-                  </a:schemeClr>
-                </a:lnRef>
-                <a:fillRef idx="1">
-                  <a:schemeClr val="accent1"/>
-                </a:fillRef>
-                <a:effectRef idx="0">
-                  <a:schemeClr val="accent1"/>
-                </a:effectRef>
-                <a:fontRef idx="minor">
-                  <a:schemeClr val="lt1"/>
-                </a:fontRef>
-              </p:style>
-              <p:txBody>
-                <a:bodyPr rtlCol="0" anchor="ctr"/>
-                <a:lstStyle/>
-                <a:p>
-                  <a:pPr algn="ctr"/>
-                  <a:endParaRPr lang="en-US"/>
-                </a:p>
-              </p:txBody>
-            </p:sp>
-            <p:sp>
-              <p:nvSpPr>
-                <p:cNvPr id="100" name="Cube 99">
-                  <a:extLst>
-                    <a:ext uri="{FF2B5EF4-FFF2-40B4-BE49-F238E27FC236}">
-                      <a16:creationId xmlns:a16="http://schemas.microsoft.com/office/drawing/2014/main" id="{78F887A8-AF74-C74B-87BF-7E990393FEAF}"/>
-                    </a:ext>
-                  </a:extLst>
-                </p:cNvPr>
-                <p:cNvSpPr>
-                  <a:spLocks noChangeAspect="1"/>
-                </p:cNvSpPr>
-                <p:nvPr/>
-              </p:nvSpPr>
-              <p:spPr>
-                <a:xfrm>
-                  <a:off x="10248261" y="3492599"/>
-                  <a:ext cx="182880" cy="182880"/>
-                </a:xfrm>
-                <a:prstGeom prst="cube">
-                  <a:avLst/>
-                </a:prstGeom>
-                <a:solidFill>
-                  <a:schemeClr val="accent4">
-                    <a:lumMod val="75000"/>
-                  </a:schemeClr>
-                </a:solidFill>
-                <a:ln>
-                  <a:solidFill>
-                    <a:schemeClr val="tx1"/>
-                  </a:solidFill>
-                </a:ln>
-              </p:spPr>
-              <p:style>
-                <a:lnRef idx="2">
-                  <a:schemeClr val="accent1">
-                    <a:shade val="50000"/>
-                  </a:schemeClr>
-                </a:lnRef>
-                <a:fillRef idx="1">
-                  <a:schemeClr val="accent1"/>
-                </a:fillRef>
-                <a:effectRef idx="0">
-                  <a:schemeClr val="accent1"/>
-                </a:effectRef>
-                <a:fontRef idx="minor">
-                  <a:schemeClr val="lt1"/>
-                </a:fontRef>
-              </p:style>
-              <p:txBody>
-                <a:bodyPr rtlCol="0" anchor="ctr"/>
-                <a:lstStyle/>
-                <a:p>
-                  <a:pPr algn="ctr"/>
-                  <a:endParaRPr lang="en-US"/>
-                </a:p>
-              </p:txBody>
-            </p:sp>
-            <p:sp>
-              <p:nvSpPr>
-                <p:cNvPr id="101" name="Cube 100">
-                  <a:extLst>
-                    <a:ext uri="{FF2B5EF4-FFF2-40B4-BE49-F238E27FC236}">
-                      <a16:creationId xmlns:a16="http://schemas.microsoft.com/office/drawing/2014/main" id="{208EEB1F-4E8F-CC42-A3BD-F3A72FC3CD30}"/>
-                    </a:ext>
-                  </a:extLst>
-                </p:cNvPr>
-                <p:cNvSpPr>
-                  <a:spLocks noChangeAspect="1"/>
-                </p:cNvSpPr>
-                <p:nvPr/>
-              </p:nvSpPr>
-              <p:spPr>
-                <a:xfrm>
-                  <a:off x="10248261" y="3380438"/>
-                  <a:ext cx="182880" cy="182880"/>
-                </a:xfrm>
-                <a:prstGeom prst="cube">
-                  <a:avLst/>
-                </a:prstGeom>
-                <a:solidFill>
-                  <a:schemeClr val="accent4">
-                    <a:lumMod val="75000"/>
-                  </a:schemeClr>
-                </a:solidFill>
-                <a:ln>
-                  <a:solidFill>
-                    <a:schemeClr val="tx1"/>
-                  </a:solidFill>
-                </a:ln>
-              </p:spPr>
-              <p:style>
-                <a:lnRef idx="2">
-                  <a:schemeClr val="accent1">
-                    <a:shade val="50000"/>
-                  </a:schemeClr>
-                </a:lnRef>
-                <a:fillRef idx="1">
-                  <a:schemeClr val="accent1"/>
-                </a:fillRef>
-                <a:effectRef idx="0">
-                  <a:schemeClr val="accent1"/>
-                </a:effectRef>
-                <a:fontRef idx="minor">
-                  <a:schemeClr val="lt1"/>
-                </a:fontRef>
-              </p:style>
-              <p:txBody>
-                <a:bodyPr rtlCol="0" anchor="ctr"/>
-                <a:lstStyle/>
-                <a:p>
-                  <a:pPr algn="ctr"/>
-                  <a:endParaRPr lang="en-US"/>
-                </a:p>
-              </p:txBody>
-            </p:sp>
-            <p:sp>
-              <p:nvSpPr>
-                <p:cNvPr id="102" name="Cube 101">
-                  <a:extLst>
-                    <a:ext uri="{FF2B5EF4-FFF2-40B4-BE49-F238E27FC236}">
-                      <a16:creationId xmlns:a16="http://schemas.microsoft.com/office/drawing/2014/main" id="{8B95C315-AB55-A249-B7AB-462B7E999ABB}"/>
-                    </a:ext>
-                  </a:extLst>
-                </p:cNvPr>
-                <p:cNvSpPr>
-                  <a:spLocks noChangeAspect="1"/>
-                </p:cNvSpPr>
-                <p:nvPr/>
-              </p:nvSpPr>
-              <p:spPr>
-                <a:xfrm>
-                  <a:off x="9699621" y="3492599"/>
-                  <a:ext cx="182880" cy="182880"/>
-                </a:xfrm>
-                <a:prstGeom prst="cube">
-                  <a:avLst/>
-                </a:prstGeom>
-                <a:solidFill>
-                  <a:schemeClr val="accent4">
-                    <a:lumMod val="75000"/>
-                  </a:schemeClr>
-                </a:solidFill>
-                <a:ln>
-                  <a:solidFill>
-                    <a:schemeClr val="tx1"/>
-                  </a:solidFill>
-                </a:ln>
-              </p:spPr>
-              <p:style>
-                <a:lnRef idx="2">
-                  <a:schemeClr val="accent1">
-                    <a:shade val="50000"/>
-                  </a:schemeClr>
-                </a:lnRef>
-                <a:fillRef idx="1">
-                  <a:schemeClr val="accent1"/>
-                </a:fillRef>
-                <a:effectRef idx="0">
-                  <a:schemeClr val="accent1"/>
-                </a:effectRef>
-                <a:fontRef idx="minor">
-                  <a:schemeClr val="lt1"/>
-                </a:fontRef>
-              </p:style>
-              <p:txBody>
-                <a:bodyPr rtlCol="0" anchor="ctr"/>
-                <a:lstStyle/>
-                <a:p>
-                  <a:pPr algn="ctr"/>
-                  <a:endParaRPr lang="en-US"/>
-                </a:p>
-              </p:txBody>
-            </p:sp>
-            <p:sp>
-              <p:nvSpPr>
-                <p:cNvPr id="103" name="Cube 102">
-                  <a:extLst>
-                    <a:ext uri="{FF2B5EF4-FFF2-40B4-BE49-F238E27FC236}">
-                      <a16:creationId xmlns:a16="http://schemas.microsoft.com/office/drawing/2014/main" id="{C0A9BD37-3305-8241-94BA-0F87181BE70A}"/>
-                    </a:ext>
-                  </a:extLst>
-                </p:cNvPr>
-                <p:cNvSpPr>
-                  <a:spLocks noChangeAspect="1"/>
-                </p:cNvSpPr>
-                <p:nvPr/>
-              </p:nvSpPr>
-              <p:spPr>
-                <a:xfrm>
-                  <a:off x="9699621" y="3380438"/>
-                  <a:ext cx="182880" cy="182880"/>
-                </a:xfrm>
-                <a:prstGeom prst="cube">
-                  <a:avLst/>
-                </a:prstGeom>
-                <a:solidFill>
-                  <a:schemeClr val="accent4">
-                    <a:lumMod val="75000"/>
-                  </a:schemeClr>
-                </a:solidFill>
-                <a:ln>
-                  <a:solidFill>
-                    <a:schemeClr val="tx1"/>
-                  </a:solidFill>
-                </a:ln>
-              </p:spPr>
-              <p:style>
-                <a:lnRef idx="2">
-                  <a:schemeClr val="accent1">
-                    <a:shade val="50000"/>
-                  </a:schemeClr>
-                </a:lnRef>
-                <a:fillRef idx="1">
-                  <a:schemeClr val="accent1"/>
-                </a:fillRef>
-                <a:effectRef idx="0">
-                  <a:schemeClr val="accent1"/>
-                </a:effectRef>
-                <a:fontRef idx="minor">
-                  <a:schemeClr val="lt1"/>
-                </a:fontRef>
-              </p:style>
-              <p:txBody>
-                <a:bodyPr rtlCol="0" anchor="ctr"/>
-                <a:lstStyle/>
-                <a:p>
-                  <a:pPr algn="ctr"/>
-                  <a:endParaRPr lang="en-US"/>
-                </a:p>
-              </p:txBody>
-            </p:sp>
-          </p:grpSp>
           <p:sp>
             <p:nvSpPr>
               <p:cNvPr id="95" name="TextBox 94">
@@ -8730,7 +8104,7 @@
             </p:nvSpPr>
             <p:spPr>
               <a:xfrm>
-                <a:off x="3280226" y="5991423"/>
+                <a:off x="7659213" y="5641905"/>
                 <a:ext cx="1005788" cy="369332"/>
               </a:xfrm>
               <a:prstGeom prst="rect">
@@ -8751,56 +8125,42 @@
               </a:p>
             </p:txBody>
           </p:sp>
+          <p:sp>
+            <p:nvSpPr>
+              <p:cNvPr id="78" name="TextBox 77">
+                <a:extLst>
+                  <a:ext uri="{FF2B5EF4-FFF2-40B4-BE49-F238E27FC236}">
+                    <a16:creationId xmlns:a16="http://schemas.microsoft.com/office/drawing/2014/main" id="{BF717EF4-AD8F-1E4E-B068-E52CA5C8C6FF}"/>
+                  </a:ext>
+                </a:extLst>
+              </p:cNvPr>
+              <p:cNvSpPr txBox="1"/>
+              <p:nvPr/>
+            </p:nvSpPr>
+            <p:spPr>
+              <a:xfrm>
+                <a:off x="7873406" y="5051872"/>
+                <a:ext cx="577402" cy="461665"/>
+              </a:xfrm>
+              <a:prstGeom prst="rect">
+                <a:avLst/>
+              </a:prstGeom>
+              <a:noFill/>
+            </p:spPr>
+            <p:txBody>
+              <a:bodyPr wrap="none" rtlCol="0">
+                <a:spAutoFit/>
+              </a:bodyPr>
+              <a:lstStyle/>
+              <a:p>
+                <a:r>
+                  <a:rPr lang="en-US" sz="2400" dirty="0"/>
+                  <a:t>DO</a:t>
+                </a:r>
+              </a:p>
+            </p:txBody>
+          </p:sp>
         </p:grpSp>
-        <p:sp>
-          <p:nvSpPr>
-            <p:cNvPr id="91" name="TextBox 90">
-              <a:extLst>
-                <a:ext uri="{FF2B5EF4-FFF2-40B4-BE49-F238E27FC236}">
-                  <a16:creationId xmlns:a16="http://schemas.microsoft.com/office/drawing/2014/main" id="{26EB6D5A-D251-B748-AFD7-08C568DD5950}"/>
-                </a:ext>
-              </a:extLst>
-            </p:cNvPr>
-            <p:cNvSpPr txBox="1"/>
-            <p:nvPr/>
-          </p:nvSpPr>
-          <p:spPr>
-            <a:xfrm>
-              <a:off x="9068147" y="5555850"/>
-              <a:ext cx="2774414" cy="707886"/>
-            </a:xfrm>
-            <a:prstGeom prst="rect">
-              <a:avLst/>
-            </a:prstGeom>
-            <a:noFill/>
-          </p:spPr>
-          <p:txBody>
-            <a:bodyPr wrap="none" rtlCol="0">
-              <a:spAutoFit/>
-            </a:bodyPr>
-            <a:lstStyle/>
-            <a:p>
-              <a:r>
-                <a:rPr lang="en-US" sz="2000" dirty="0"/>
-                <a:t>No collision at low speed</a:t>
-              </a:r>
-            </a:p>
-            <a:p>
-              <a:r>
-                <a:rPr lang="en-US" sz="2000" dirty="0"/>
-                <a:t>(Expected collision = </a:t>
-              </a:r>
-              <a:r>
-                <a:rPr lang="en-US" sz="2000" b="1" dirty="0"/>
-                <a:t>0.0</a:t>
-              </a:r>
-              <a:r>
-                <a:rPr lang="en-US" sz="2000" dirty="0"/>
-                <a:t>)</a:t>
-              </a:r>
-            </a:p>
-          </p:txBody>
-        </p:sp>
       </p:grpSp>
     </p:spTree>
     <p:extLst>

</xml_diff>

<commit_message>
instruction.pptx: minor change to navigation plans
</commit_message>
<xml_diff>
--- a/XPlanningEvaluation/data/instruction/instruction.pptx
+++ b/XPlanningEvaluation/data/instruction/instruction.pptx
@@ -15326,7 +15326,7 @@
             <a:prstGeom prst="line">
               <a:avLst/>
             </a:prstGeom>
-            <a:ln w="76200">
+            <a:ln w="114300">
               <a:solidFill>
                 <a:schemeClr val="accent1">
                   <a:lumMod val="75000"/>
@@ -15373,7 +15373,7 @@
             <a:prstGeom prst="line">
               <a:avLst/>
             </a:prstGeom>
-            <a:ln w="76200">
+            <a:ln w="114300">
               <a:solidFill>
                 <a:schemeClr val="accent1">
                   <a:lumMod val="75000"/>
@@ -15420,7 +15420,7 @@
             <a:prstGeom prst="line">
               <a:avLst/>
             </a:prstGeom>
-            <a:ln w="76200">
+            <a:ln w="114300">
               <a:solidFill>
                 <a:schemeClr val="accent1">
                   <a:lumMod val="75000"/>
@@ -15467,7 +15467,7 @@
             <a:prstGeom prst="line">
               <a:avLst/>
             </a:prstGeom>
-            <a:ln w="76200">
+            <a:ln w="114300">
               <a:solidFill>
                 <a:schemeClr val="accent1">
                   <a:lumMod val="75000"/>
@@ -16493,7 +16493,7 @@
             <a:prstGeom prst="line">
               <a:avLst/>
             </a:prstGeom>
-            <a:ln w="76200">
+            <a:ln w="114300">
               <a:solidFill>
                 <a:schemeClr val="accent1">
                   <a:lumMod val="75000"/>
@@ -19202,7 +19202,7 @@
             <a:prstGeom prst="line">
               <a:avLst/>
             </a:prstGeom>
-            <a:ln w="76200">
+            <a:ln w="114300">
               <a:solidFill>
                 <a:schemeClr val="accent1">
                   <a:lumMod val="75000"/>
@@ -19383,7 +19383,7 @@
             <a:prstGeom prst="line">
               <a:avLst/>
             </a:prstGeom>
-            <a:ln w="76200">
+            <a:ln w="114300">
               <a:solidFill>
                 <a:schemeClr val="accent1">
                   <a:lumMod val="75000"/>
@@ -19475,7 +19475,7 @@
             <a:prstGeom prst="line">
               <a:avLst/>
             </a:prstGeom>
-            <a:ln w="76200">
+            <a:ln w="114300">
               <a:solidFill>
                 <a:schemeClr val="accent1">
                   <a:lumMod val="75000"/>
@@ -19522,7 +19522,7 @@
             <a:prstGeom prst="line">
               <a:avLst/>
             </a:prstGeom>
-            <a:ln w="76200">
+            <a:ln w="114300">
               <a:solidFill>
                 <a:srgbClr val="00B0F0"/>
               </a:solidFill>
@@ -19567,7 +19567,7 @@
             <a:prstGeom prst="line">
               <a:avLst/>
             </a:prstGeom>
-            <a:ln w="76200">
+            <a:ln w="114300">
               <a:solidFill>
                 <a:schemeClr val="accent1">
                   <a:lumMod val="75000"/>
@@ -19613,7 +19613,7 @@
             <a:prstGeom prst="line">
               <a:avLst/>
             </a:prstGeom>
-            <a:ln w="76200">
+            <a:ln w="114300">
               <a:solidFill>
                 <a:schemeClr val="accent1">
                   <a:lumMod val="75000"/>
@@ -20371,7 +20371,7 @@
             <a:prstGeom prst="line">
               <a:avLst/>
             </a:prstGeom>
-            <a:ln w="76200">
+            <a:ln w="114300">
               <a:solidFill>
                 <a:schemeClr val="accent1">
                   <a:lumMod val="75000"/>

</xml_diff>